<commit_message>
Merge with TFS for 8/15 drop
</commit_message>
<xml_diff>
--- a/EDU GRAPH-API Demo Script.pptx
+++ b/EDU GRAPH-API Demo Script.pptx
@@ -7,10 +7,10 @@
     <p:sldMasterId id="2147484307" r:id="rId6"/>
   </p:sldMasterIdLst>
   <p:notesMasterIdLst>
-    <p:notesMasterId r:id="rId51"/>
+    <p:notesMasterId r:id="rId52"/>
   </p:notesMasterIdLst>
   <p:handoutMasterIdLst>
-    <p:handoutMasterId r:id="rId52"/>
+    <p:handoutMasterId r:id="rId53"/>
   </p:handoutMasterIdLst>
   <p:sldIdLst>
     <p:sldId id="258" r:id="rId7"/>
@@ -25,38 +25,39 @@
     <p:sldId id="305" r:id="rId16"/>
     <p:sldId id="337" r:id="rId17"/>
     <p:sldId id="306" r:id="rId18"/>
-    <p:sldId id="352" r:id="rId19"/>
-    <p:sldId id="307" r:id="rId20"/>
-    <p:sldId id="334" r:id="rId21"/>
-    <p:sldId id="336" r:id="rId22"/>
-    <p:sldId id="308" r:id="rId23"/>
-    <p:sldId id="309" r:id="rId24"/>
-    <p:sldId id="311" r:id="rId25"/>
-    <p:sldId id="338" r:id="rId26"/>
-    <p:sldId id="339" r:id="rId27"/>
-    <p:sldId id="353" r:id="rId28"/>
-    <p:sldId id="312" r:id="rId29"/>
-    <p:sldId id="333" r:id="rId30"/>
-    <p:sldId id="313" r:id="rId31"/>
-    <p:sldId id="314" r:id="rId32"/>
-    <p:sldId id="315" r:id="rId33"/>
-    <p:sldId id="316" r:id="rId34"/>
-    <p:sldId id="340" r:id="rId35"/>
-    <p:sldId id="341" r:id="rId36"/>
-    <p:sldId id="354" r:id="rId37"/>
-    <p:sldId id="317" r:id="rId38"/>
-    <p:sldId id="318" r:id="rId39"/>
-    <p:sldId id="319" r:id="rId40"/>
-    <p:sldId id="320" r:id="rId41"/>
-    <p:sldId id="321" r:id="rId42"/>
-    <p:sldId id="322" r:id="rId43"/>
-    <p:sldId id="323" r:id="rId44"/>
-    <p:sldId id="342" r:id="rId45"/>
-    <p:sldId id="343" r:id="rId46"/>
-    <p:sldId id="349" r:id="rId47"/>
-    <p:sldId id="350" r:id="rId48"/>
-    <p:sldId id="347" r:id="rId49"/>
-    <p:sldId id="348" r:id="rId50"/>
+    <p:sldId id="355" r:id="rId19"/>
+    <p:sldId id="352" r:id="rId20"/>
+    <p:sldId id="307" r:id="rId21"/>
+    <p:sldId id="334" r:id="rId22"/>
+    <p:sldId id="336" r:id="rId23"/>
+    <p:sldId id="308" r:id="rId24"/>
+    <p:sldId id="309" r:id="rId25"/>
+    <p:sldId id="311" r:id="rId26"/>
+    <p:sldId id="338" r:id="rId27"/>
+    <p:sldId id="339" r:id="rId28"/>
+    <p:sldId id="353" r:id="rId29"/>
+    <p:sldId id="312" r:id="rId30"/>
+    <p:sldId id="333" r:id="rId31"/>
+    <p:sldId id="313" r:id="rId32"/>
+    <p:sldId id="314" r:id="rId33"/>
+    <p:sldId id="315" r:id="rId34"/>
+    <p:sldId id="316" r:id="rId35"/>
+    <p:sldId id="340" r:id="rId36"/>
+    <p:sldId id="341" r:id="rId37"/>
+    <p:sldId id="354" r:id="rId38"/>
+    <p:sldId id="317" r:id="rId39"/>
+    <p:sldId id="318" r:id="rId40"/>
+    <p:sldId id="319" r:id="rId41"/>
+    <p:sldId id="320" r:id="rId42"/>
+    <p:sldId id="321" r:id="rId43"/>
+    <p:sldId id="322" r:id="rId44"/>
+    <p:sldId id="323" r:id="rId45"/>
+    <p:sldId id="342" r:id="rId46"/>
+    <p:sldId id="343" r:id="rId47"/>
+    <p:sldId id="349" r:id="rId48"/>
+    <p:sldId id="350" r:id="rId49"/>
+    <p:sldId id="347" r:id="rId50"/>
+    <p:sldId id="348" r:id="rId51"/>
   </p:sldIdLst>
   <p:sldSz cx="12436475" cy="6994525"/>
   <p:notesSz cx="6858000" cy="9144000"/>
@@ -176,6 +177,7 @@
             <p14:sldId id="305"/>
             <p14:sldId id="337"/>
             <p14:sldId id="306"/>
+            <p14:sldId id="355"/>
             <p14:sldId id="352"/>
           </p14:sldIdLst>
         </p14:section>
@@ -267,6 +269,10 @@
 </p:cmAuthorLst>
 </file>
 
+<file path=ppt/revisionInfo.xml><?xml version="1.0" encoding="utf-8"?>
+<p1510:revInfo xmlns:a="http://schemas.openxmlformats.org/drawingml/2006/main" xmlns:r="http://schemas.openxmlformats.org/officeDocument/2006/relationships" xmlns:p1510="http://schemas.microsoft.com/office/powerpoint/2015/10/main"/>
+</file>
+
 <file path=ppt/handoutMasters/handoutMaster1.xml><?xml version="1.0" encoding="utf-8"?>
 <p:handoutMaster xmlns:a="http://schemas.openxmlformats.org/drawingml/2006/main" xmlns:r="http://schemas.openxmlformats.org/officeDocument/2006/relationships" xmlns:p="http://schemas.openxmlformats.org/presentationml/2006/main">
   <p:cSld>
@@ -356,7 +362,7 @@
               <a:rPr lang="en-US" smtClean="0">
                 <a:latin typeface="Segoe UI" pitchFamily="34" charset="0"/>
               </a:rPr>
-              <a:t>3/3/2017 2:52 PM</a:t>
+              <a:t>8/7/2017 9:05 AM</a:t>
             </a:fld>
             <a:endParaRPr lang="en-US" dirty="0">
               <a:latin typeface="Segoe UI" pitchFamily="34" charset="0"/>
@@ -639,7 +645,7 @@
           <a:p>
             <a:fld id="{38EEC551-8CDA-4EB6-89BB-2A86C9F091C8}" type="datetime8">
               <a:rPr lang="en-US" smtClean="0"/>
-              <a:t>3/3/2017 2:52 PM</a:t>
+              <a:t>8/7/2017 9:05 AM</a:t>
             </a:fld>
             <a:endParaRPr lang="en-US" dirty="0"/>
           </a:p>
@@ -1003,7 +1009,7 @@
           <a:p>
             <a:fld id="{C6996B83-60CF-42A8-BA06-F99D0BEC30B3}" type="datetime1">
               <a:rPr lang="en-US" smtClean="0"/>
-              <a:t>3/3/2017</a:t>
+              <a:t>8/7/2017</a:t>
             </a:fld>
             <a:endParaRPr lang="en-US" dirty="0"/>
           </a:p>
@@ -1223,7 +1229,7 @@
                 </a:solidFill>
               </a:rPr>
               <a:pPr/>
-              <a:t>3/3/2017</a:t>
+              <a:t>8/7/2017</a:t>
             </a:fld>
             <a:endParaRPr lang="en-US" dirty="0">
               <a:solidFill>
@@ -1433,7 +1439,7 @@
                 </a:solidFill>
               </a:rPr>
               <a:pPr/>
-              <a:t>3/3/2017</a:t>
+              <a:t>8/7/2017</a:t>
             </a:fld>
             <a:endParaRPr lang="en-US" dirty="0">
               <a:solidFill>
@@ -1489,6 +1495,216 @@
 </file>
 
 <file path=ppt/notesSlides/notesSlide12.xml><?xml version="1.0" encoding="utf-8"?>
+<p:notes xmlns:a="http://schemas.openxmlformats.org/drawingml/2006/main" xmlns:r="http://schemas.openxmlformats.org/officeDocument/2006/relationships" xmlns:p="http://schemas.openxmlformats.org/presentationml/2006/main">
+  <p:cSld>
+    <p:spTree>
+      <p:nvGrpSpPr>
+        <p:cNvPr id="1" name=""/>
+        <p:cNvGrpSpPr/>
+        <p:nvPr/>
+      </p:nvGrpSpPr>
+      <p:grpSpPr>
+        <a:xfrm>
+          <a:off x="0" y="0"/>
+          <a:ext cx="0" cy="0"/>
+          <a:chOff x="0" y="0"/>
+          <a:chExt cx="0" cy="0"/>
+        </a:xfrm>
+      </p:grpSpPr>
+      <p:sp>
+        <p:nvSpPr>
+          <p:cNvPr id="2" name="Slide Image Placeholder 1"/>
+          <p:cNvSpPr>
+            <a:spLocks noGrp="1" noRot="1" noChangeAspect="1"/>
+          </p:cNvSpPr>
+          <p:nvPr>
+            <p:ph type="sldImg"/>
+          </p:nvPr>
+        </p:nvSpPr>
+        <p:spPr/>
+      </p:sp>
+      <p:sp>
+        <p:nvSpPr>
+          <p:cNvPr id="3" name="Notes Placeholder 2"/>
+          <p:cNvSpPr>
+            <a:spLocks noGrp="1"/>
+          </p:cNvSpPr>
+          <p:nvPr>
+            <p:ph type="body" idx="1"/>
+          </p:nvPr>
+        </p:nvSpPr>
+        <p:spPr/>
+        <p:txBody>
+          <a:bodyPr/>
+          <a:lstStyle/>
+          <a:p>
+            <a:endParaRPr lang="en-US"/>
+          </a:p>
+        </p:txBody>
+      </p:sp>
+      <p:sp>
+        <p:nvSpPr>
+          <p:cNvPr id="4" name="Header Placeholder 3"/>
+          <p:cNvSpPr>
+            <a:spLocks noGrp="1"/>
+          </p:cNvSpPr>
+          <p:nvPr>
+            <p:ph type="hdr" sz="quarter" idx="10"/>
+          </p:nvPr>
+        </p:nvSpPr>
+        <p:spPr/>
+        <p:txBody>
+          <a:bodyPr/>
+          <a:lstStyle/>
+          <a:p>
+            <a:r>
+              <a:rPr lang="en-US">
+                <a:solidFill>
+                  <a:prstClr val="black"/>
+                </a:solidFill>
+              </a:rPr>
+              <a:t>Build 2014</a:t>
+            </a:r>
+            <a:endParaRPr lang="en-US" dirty="0">
+              <a:solidFill>
+                <a:prstClr val="black"/>
+              </a:solidFill>
+            </a:endParaRPr>
+          </a:p>
+        </p:txBody>
+      </p:sp>
+      <p:sp>
+        <p:nvSpPr>
+          <p:cNvPr id="5" name="Footer Placeholder 4"/>
+          <p:cNvSpPr>
+            <a:spLocks noGrp="1"/>
+          </p:cNvSpPr>
+          <p:nvPr>
+            <p:ph type="ftr" sz="quarter" idx="11"/>
+          </p:nvPr>
+        </p:nvSpPr>
+        <p:spPr/>
+        <p:txBody>
+          <a:bodyPr/>
+          <a:lstStyle/>
+          <a:p>
+            <a:pPr defTabSz="914099" eaLnBrk="0" hangingPunct="0"/>
+            <a:r>
+              <a:rPr lang="en-US" sz="400">
+                <a:gradFill>
+                  <a:gsLst>
+                    <a:gs pos="0">
+                      <a:prstClr val="black"/>
+                    </a:gs>
+                    <a:gs pos="100000">
+                      <a:prstClr val="black"/>
+                    </a:gs>
+                  </a:gsLst>
+                  <a:lin ang="5400000" scaled="0"/>
+                </a:gradFill>
+                <a:latin typeface="Segoe UI" pitchFamily="34" charset="0"/>
+                <a:ea typeface="Segoe UI" pitchFamily="34" charset="0"/>
+                <a:cs typeface="Segoe UI" pitchFamily="34" charset="0"/>
+              </a:rPr>
+              <a:t>© 2014 Microsoft Corporation. All rights reserved. Microsoft, Windows, and other product names are or may be registered trademarks and/or trademarks in the U.S. and/or other countries. The information herein is for informational purposes only and represents the current view of Microsoft Corporation as of the date of this presentation.  Because Microsoft must respond to changing market conditions, it should not be interpreted to be a commitment on the part of Microsoft, and Microsoft cannot guarantee the accuracy of any information provided after the date of this presentation.  MICROSOFT MAKES NO WARRANTIES, EXPRESS, IMPLIED OR STATUTORY, AS TO THE INFORMATION IN THIS PRESENTATION.</a:t>
+            </a:r>
+            <a:endParaRPr lang="en-US" sz="400" dirty="0">
+              <a:gradFill>
+                <a:gsLst>
+                  <a:gs pos="0">
+                    <a:prstClr val="black"/>
+                  </a:gs>
+                  <a:gs pos="100000">
+                    <a:prstClr val="black"/>
+                  </a:gs>
+                </a:gsLst>
+                <a:lin ang="5400000" scaled="0"/>
+              </a:gradFill>
+              <a:latin typeface="Segoe UI" pitchFamily="34" charset="0"/>
+              <a:ea typeface="Segoe UI" pitchFamily="34" charset="0"/>
+              <a:cs typeface="Segoe UI" pitchFamily="34" charset="0"/>
+            </a:endParaRPr>
+          </a:p>
+        </p:txBody>
+      </p:sp>
+      <p:sp>
+        <p:nvSpPr>
+          <p:cNvPr id="6" name="Date Placeholder 5"/>
+          <p:cNvSpPr>
+            <a:spLocks noGrp="1"/>
+          </p:cNvSpPr>
+          <p:nvPr>
+            <p:ph type="dt" idx="12"/>
+          </p:nvPr>
+        </p:nvSpPr>
+        <p:spPr/>
+        <p:txBody>
+          <a:bodyPr/>
+          <a:lstStyle/>
+          <a:p>
+            <a:fld id="{9F00D60D-1703-4D24-8308-FEE06A50A69C}" type="datetime1">
+              <a:rPr lang="en-US" smtClean="0">
+                <a:solidFill>
+                  <a:prstClr val="black"/>
+                </a:solidFill>
+              </a:rPr>
+              <a:pPr/>
+              <a:t>8/7/2017</a:t>
+            </a:fld>
+            <a:endParaRPr lang="en-US" dirty="0">
+              <a:solidFill>
+                <a:prstClr val="black"/>
+              </a:solidFill>
+            </a:endParaRPr>
+          </a:p>
+        </p:txBody>
+      </p:sp>
+      <p:sp>
+        <p:nvSpPr>
+          <p:cNvPr id="7" name="Slide Number Placeholder 6"/>
+          <p:cNvSpPr>
+            <a:spLocks noGrp="1"/>
+          </p:cNvSpPr>
+          <p:nvPr>
+            <p:ph type="sldNum" sz="quarter" idx="13"/>
+          </p:nvPr>
+        </p:nvSpPr>
+        <p:spPr/>
+        <p:txBody>
+          <a:bodyPr/>
+          <a:lstStyle/>
+          <a:p>
+            <a:fld id="{B4008EB6-D09E-4580-8CD6-DDB14511944F}" type="slidenum">
+              <a:rPr lang="en-US" smtClean="0">
+                <a:solidFill>
+                  <a:prstClr val="black"/>
+                </a:solidFill>
+              </a:rPr>
+              <a:pPr/>
+              <a:t>13</a:t>
+            </a:fld>
+            <a:endParaRPr lang="en-US" dirty="0">
+              <a:solidFill>
+                <a:prstClr val="black"/>
+              </a:solidFill>
+            </a:endParaRPr>
+          </a:p>
+        </p:txBody>
+      </p:sp>
+    </p:spTree>
+    <p:extLst>
+      <p:ext uri="{BB962C8B-B14F-4D97-AF65-F5344CB8AC3E}">
+        <p14:creationId xmlns:p14="http://schemas.microsoft.com/office/powerpoint/2010/main" val="3633352235"/>
+      </p:ext>
+    </p:extLst>
+  </p:cSld>
+  <p:clrMapOvr>
+    <a:masterClrMapping/>
+  </p:clrMapOvr>
+</p:notes>
+</file>
+
+<file path=ppt/notesSlides/notesSlide13.xml><?xml version="1.0" encoding="utf-8"?>
 <p:notes xmlns:a="http://schemas.openxmlformats.org/drawingml/2006/main" xmlns:r="http://schemas.openxmlformats.org/officeDocument/2006/relationships" xmlns:p="http://schemas.openxmlformats.org/presentationml/2006/main">
   <p:cSld>
     <p:spTree>
@@ -1739,7 +1955,7 @@
                 <a:tabLst/>
                 <a:defRPr/>
               </a:pPr>
-              <a:t>3/3/2017</a:t>
+              <a:t>8/7/2017</a:t>
             </a:fld>
             <a:endParaRPr kumimoji="0" lang="en-US" sz="1800" b="0" i="0" u="none" strike="noStrike" kern="0" cap="none" spc="0" normalizeH="0" baseline="0" noProof="0" dirty="0">
               <a:ln>
@@ -1816,7 +2032,7 @@
                 <a:tabLst/>
                 <a:defRPr/>
               </a:pPr>
-              <a:t>13</a:t>
+              <a:t>14</a:t>
             </a:fld>
             <a:endParaRPr kumimoji="0" lang="en-US" sz="1800" b="0" i="0" u="none" strike="noStrike" kern="0" cap="none" spc="0" normalizeH="0" baseline="0" noProof="0" dirty="0">
               <a:ln>
@@ -1836,216 +2052,6 @@
     <p:extLst>
       <p:ext uri="{BB962C8B-B14F-4D97-AF65-F5344CB8AC3E}">
         <p14:creationId xmlns:p14="http://schemas.microsoft.com/office/powerpoint/2010/main" val="2094861003"/>
-      </p:ext>
-    </p:extLst>
-  </p:cSld>
-  <p:clrMapOvr>
-    <a:masterClrMapping/>
-  </p:clrMapOvr>
-</p:notes>
-</file>
-
-<file path=ppt/notesSlides/notesSlide13.xml><?xml version="1.0" encoding="utf-8"?>
-<p:notes xmlns:a="http://schemas.openxmlformats.org/drawingml/2006/main" xmlns:r="http://schemas.openxmlformats.org/officeDocument/2006/relationships" xmlns:p="http://schemas.openxmlformats.org/presentationml/2006/main">
-  <p:cSld>
-    <p:spTree>
-      <p:nvGrpSpPr>
-        <p:cNvPr id="1" name=""/>
-        <p:cNvGrpSpPr/>
-        <p:nvPr/>
-      </p:nvGrpSpPr>
-      <p:grpSpPr>
-        <a:xfrm>
-          <a:off x="0" y="0"/>
-          <a:ext cx="0" cy="0"/>
-          <a:chOff x="0" y="0"/>
-          <a:chExt cx="0" cy="0"/>
-        </a:xfrm>
-      </p:grpSpPr>
-      <p:sp>
-        <p:nvSpPr>
-          <p:cNvPr id="2" name="Slide Image Placeholder 1"/>
-          <p:cNvSpPr>
-            <a:spLocks noGrp="1" noRot="1" noChangeAspect="1"/>
-          </p:cNvSpPr>
-          <p:nvPr>
-            <p:ph type="sldImg"/>
-          </p:nvPr>
-        </p:nvSpPr>
-        <p:spPr/>
-      </p:sp>
-      <p:sp>
-        <p:nvSpPr>
-          <p:cNvPr id="3" name="Notes Placeholder 2"/>
-          <p:cNvSpPr>
-            <a:spLocks noGrp="1"/>
-          </p:cNvSpPr>
-          <p:nvPr>
-            <p:ph type="body" idx="1"/>
-          </p:nvPr>
-        </p:nvSpPr>
-        <p:spPr/>
-        <p:txBody>
-          <a:bodyPr/>
-          <a:lstStyle/>
-          <a:p>
-            <a:endParaRPr lang="en-US"/>
-          </a:p>
-        </p:txBody>
-      </p:sp>
-      <p:sp>
-        <p:nvSpPr>
-          <p:cNvPr id="4" name="Footer Placeholder 3"/>
-          <p:cNvSpPr>
-            <a:spLocks noGrp="1"/>
-          </p:cNvSpPr>
-          <p:nvPr>
-            <p:ph type="ftr" sz="quarter" idx="10"/>
-          </p:nvPr>
-        </p:nvSpPr>
-        <p:spPr/>
-        <p:txBody>
-          <a:bodyPr/>
-          <a:lstStyle/>
-          <a:p>
-            <a:pPr defTabSz="914099" eaLnBrk="0" hangingPunct="0"/>
-            <a:r>
-              <a:rPr lang="en-US" sz="400">
-                <a:gradFill>
-                  <a:gsLst>
-                    <a:gs pos="0">
-                      <a:prstClr val="black"/>
-                    </a:gs>
-                    <a:gs pos="100000">
-                      <a:prstClr val="black"/>
-                    </a:gs>
-                  </a:gsLst>
-                  <a:lin ang="5400000" scaled="0"/>
-                </a:gradFill>
-                <a:latin typeface="Segoe UI" pitchFamily="34" charset="0"/>
-                <a:ea typeface="Segoe UI" pitchFamily="34" charset="0"/>
-                <a:cs typeface="Segoe UI" pitchFamily="34" charset="0"/>
-              </a:rPr>
-              <a:t>© 2014 Microsoft Corporation. All rights reserved. Microsoft, Windows, and other product names are or may be registered trademarks and/or trademarks in the U.S. and/or other countries. The information herein is for informational purposes only and represents the current view of Microsoft Corporation as of the date of this presentation.  Because Microsoft must respond to changing market conditions, it should not be interpreted to be a commitment on the part of Microsoft, and Microsoft cannot guarantee the accuracy of any information provided after the date of this presentation.  MICROSOFT MAKES NO WARRANTIES, EXPRESS, IMPLIED OR STATUTORY, AS TO THE INFORMATION IN THIS PRESENTATION.</a:t>
-            </a:r>
-            <a:endParaRPr lang="en-US" sz="400" dirty="0">
-              <a:gradFill>
-                <a:gsLst>
-                  <a:gs pos="0">
-                    <a:prstClr val="black"/>
-                  </a:gs>
-                  <a:gs pos="100000">
-                    <a:prstClr val="black"/>
-                  </a:gs>
-                </a:gsLst>
-                <a:lin ang="5400000" scaled="0"/>
-              </a:gradFill>
-              <a:latin typeface="Segoe UI" pitchFamily="34" charset="0"/>
-              <a:ea typeface="Segoe UI" pitchFamily="34" charset="0"/>
-              <a:cs typeface="Segoe UI" pitchFamily="34" charset="0"/>
-            </a:endParaRPr>
-          </a:p>
-        </p:txBody>
-      </p:sp>
-      <p:sp>
-        <p:nvSpPr>
-          <p:cNvPr id="5" name="Date Placeholder 4"/>
-          <p:cNvSpPr>
-            <a:spLocks noGrp="1"/>
-          </p:cNvSpPr>
-          <p:nvPr>
-            <p:ph type="dt" idx="11"/>
-          </p:nvPr>
-        </p:nvSpPr>
-        <p:spPr/>
-        <p:txBody>
-          <a:bodyPr/>
-          <a:lstStyle/>
-          <a:p>
-            <a:fld id="{FCF63DAE-D37E-4C44-BD81-0E251F1BE300}" type="datetime1">
-              <a:rPr lang="en-US" smtClean="0">
-                <a:solidFill>
-                  <a:prstClr val="black"/>
-                </a:solidFill>
-              </a:rPr>
-              <a:pPr/>
-              <a:t>3/3/2017</a:t>
-            </a:fld>
-            <a:endParaRPr lang="en-US" dirty="0">
-              <a:solidFill>
-                <a:prstClr val="black"/>
-              </a:solidFill>
-            </a:endParaRPr>
-          </a:p>
-        </p:txBody>
-      </p:sp>
-      <p:sp>
-        <p:nvSpPr>
-          <p:cNvPr id="6" name="Slide Number Placeholder 5"/>
-          <p:cNvSpPr>
-            <a:spLocks noGrp="1"/>
-          </p:cNvSpPr>
-          <p:nvPr>
-            <p:ph type="sldNum" sz="quarter" idx="12"/>
-          </p:nvPr>
-        </p:nvSpPr>
-        <p:spPr/>
-        <p:txBody>
-          <a:bodyPr/>
-          <a:lstStyle/>
-          <a:p>
-            <a:fld id="{B4008EB6-D09E-4580-8CD6-DDB14511944F}" type="slidenum">
-              <a:rPr lang="en-US" smtClean="0">
-                <a:solidFill>
-                  <a:prstClr val="black"/>
-                </a:solidFill>
-              </a:rPr>
-              <a:pPr/>
-              <a:t>14</a:t>
-            </a:fld>
-            <a:endParaRPr lang="en-US" dirty="0">
-              <a:solidFill>
-                <a:prstClr val="black"/>
-              </a:solidFill>
-            </a:endParaRPr>
-          </a:p>
-        </p:txBody>
-      </p:sp>
-      <p:sp>
-        <p:nvSpPr>
-          <p:cNvPr id="7" name="Header Placeholder 6"/>
-          <p:cNvSpPr>
-            <a:spLocks noGrp="1"/>
-          </p:cNvSpPr>
-          <p:nvPr>
-            <p:ph type="hdr" sz="quarter" idx="13"/>
-          </p:nvPr>
-        </p:nvSpPr>
-        <p:spPr/>
-        <p:txBody>
-          <a:bodyPr/>
-          <a:lstStyle/>
-          <a:p>
-            <a:r>
-              <a:rPr lang="en-US">
-                <a:solidFill>
-                  <a:prstClr val="black"/>
-                </a:solidFill>
-              </a:rPr>
-              <a:t>Build 2014</a:t>
-            </a:r>
-            <a:endParaRPr lang="en-US" dirty="0">
-              <a:solidFill>
-                <a:prstClr val="black"/>
-              </a:solidFill>
-            </a:endParaRPr>
-          </a:p>
-        </p:txBody>
-      </p:sp>
-    </p:spTree>
-    <p:extLst>
-      <p:ext uri="{BB962C8B-B14F-4D97-AF65-F5344CB8AC3E}">
-        <p14:creationId xmlns:p14="http://schemas.microsoft.com/office/powerpoint/2010/main" val="1796512126"/>
       </p:ext>
     </p:extLst>
   </p:cSld>
@@ -2105,43 +2111,12 @@
       </p:sp>
       <p:sp>
         <p:nvSpPr>
-          <p:cNvPr id="4" name="Header Placeholder 3"/>
-          <p:cNvSpPr>
-            <a:spLocks noGrp="1"/>
-          </p:cNvSpPr>
-          <p:nvPr>
-            <p:ph type="hdr" sz="quarter" idx="10"/>
-          </p:nvPr>
-        </p:nvSpPr>
-        <p:spPr/>
-        <p:txBody>
-          <a:bodyPr/>
-          <a:lstStyle/>
-          <a:p>
-            <a:r>
-              <a:rPr lang="en-US">
-                <a:solidFill>
-                  <a:prstClr val="black"/>
-                </a:solidFill>
-              </a:rPr>
-              <a:t>Build 2014</a:t>
-            </a:r>
-            <a:endParaRPr lang="en-US" dirty="0">
-              <a:solidFill>
-                <a:prstClr val="black"/>
-              </a:solidFill>
-            </a:endParaRPr>
-          </a:p>
-        </p:txBody>
-      </p:sp>
-      <p:sp>
-        <p:nvSpPr>
-          <p:cNvPr id="5" name="Footer Placeholder 4"/>
-          <p:cNvSpPr>
-            <a:spLocks noGrp="1"/>
-          </p:cNvSpPr>
-          <p:nvPr>
-            <p:ph type="ftr" sz="quarter" idx="11"/>
+          <p:cNvPr id="4" name="Footer Placeholder 3"/>
+          <p:cNvSpPr>
+            <a:spLocks noGrp="1"/>
+          </p:cNvSpPr>
+          <p:nvPr>
+            <p:ph type="ftr" sz="quarter" idx="10"/>
           </p:nvPr>
         </p:nvSpPr>
         <p:spPr/>
@@ -2190,12 +2165,12 @@
       </p:sp>
       <p:sp>
         <p:nvSpPr>
-          <p:cNvPr id="6" name="Date Placeholder 5"/>
-          <p:cNvSpPr>
-            <a:spLocks noGrp="1"/>
-          </p:cNvSpPr>
-          <p:nvPr>
-            <p:ph type="dt" idx="12"/>
+          <p:cNvPr id="5" name="Date Placeholder 4"/>
+          <p:cNvSpPr>
+            <a:spLocks noGrp="1"/>
+          </p:cNvSpPr>
+          <p:nvPr>
+            <p:ph type="dt" idx="11"/>
           </p:nvPr>
         </p:nvSpPr>
         <p:spPr/>
@@ -2203,14 +2178,14 @@
           <a:bodyPr/>
           <a:lstStyle/>
           <a:p>
-            <a:fld id="{9F00D60D-1703-4D24-8308-FEE06A50A69C}" type="datetime1">
+            <a:fld id="{FCF63DAE-D37E-4C44-BD81-0E251F1BE300}" type="datetime1">
               <a:rPr lang="en-US" smtClean="0">
                 <a:solidFill>
                   <a:prstClr val="black"/>
                 </a:solidFill>
               </a:rPr>
               <a:pPr/>
-              <a:t>3/3/2017</a:t>
+              <a:t>8/7/2017</a:t>
             </a:fld>
             <a:endParaRPr lang="en-US" dirty="0">
               <a:solidFill>
@@ -2222,12 +2197,12 @@
       </p:sp>
       <p:sp>
         <p:nvSpPr>
-          <p:cNvPr id="7" name="Slide Number Placeholder 6"/>
-          <p:cNvSpPr>
-            <a:spLocks noGrp="1"/>
-          </p:cNvSpPr>
-          <p:nvPr>
-            <p:ph type="sldNum" sz="quarter" idx="13"/>
+          <p:cNvPr id="6" name="Slide Number Placeholder 5"/>
+          <p:cNvSpPr>
+            <a:spLocks noGrp="1"/>
+          </p:cNvSpPr>
+          <p:nvPr>
+            <p:ph type="sldNum" sz="quarter" idx="12"/>
           </p:nvPr>
         </p:nvSpPr>
         <p:spPr/>
@@ -2242,7 +2217,7 @@
                 </a:solidFill>
               </a:rPr>
               <a:pPr/>
-              <a:t>16</a:t>
+              <a:t>15</a:t>
             </a:fld>
             <a:endParaRPr lang="en-US" dirty="0">
               <a:solidFill>
@@ -2252,10 +2227,41 @@
           </a:p>
         </p:txBody>
       </p:sp>
+      <p:sp>
+        <p:nvSpPr>
+          <p:cNvPr id="7" name="Header Placeholder 6"/>
+          <p:cNvSpPr>
+            <a:spLocks noGrp="1"/>
+          </p:cNvSpPr>
+          <p:nvPr>
+            <p:ph type="hdr" sz="quarter" idx="13"/>
+          </p:nvPr>
+        </p:nvSpPr>
+        <p:spPr/>
+        <p:txBody>
+          <a:bodyPr/>
+          <a:lstStyle/>
+          <a:p>
+            <a:r>
+              <a:rPr lang="en-US">
+                <a:solidFill>
+                  <a:prstClr val="black"/>
+                </a:solidFill>
+              </a:rPr>
+              <a:t>Build 2014</a:t>
+            </a:r>
+            <a:endParaRPr lang="en-US" dirty="0">
+              <a:solidFill>
+                <a:prstClr val="black"/>
+              </a:solidFill>
+            </a:endParaRPr>
+          </a:p>
+        </p:txBody>
+      </p:sp>
     </p:spTree>
     <p:extLst>
       <p:ext uri="{BB962C8B-B14F-4D97-AF65-F5344CB8AC3E}">
-        <p14:creationId xmlns:p14="http://schemas.microsoft.com/office/powerpoint/2010/main" val="1767268135"/>
+        <p14:creationId xmlns:p14="http://schemas.microsoft.com/office/powerpoint/2010/main" val="1796512126"/>
       </p:ext>
     </p:extLst>
   </p:cSld>
@@ -2420,7 +2426,7 @@
                 </a:solidFill>
               </a:rPr>
               <a:pPr/>
-              <a:t>3/3/2017</a:t>
+              <a:t>8/7/2017</a:t>
             </a:fld>
             <a:endParaRPr lang="en-US" dirty="0">
               <a:solidFill>
@@ -2465,7 +2471,7 @@
     </p:spTree>
     <p:extLst>
       <p:ext uri="{BB962C8B-B14F-4D97-AF65-F5344CB8AC3E}">
-        <p14:creationId xmlns:p14="http://schemas.microsoft.com/office/powerpoint/2010/main" val="2079953536"/>
+        <p14:creationId xmlns:p14="http://schemas.microsoft.com/office/powerpoint/2010/main" val="1767268135"/>
       </p:ext>
     </p:extLst>
   </p:cSld>
@@ -2630,7 +2636,7 @@
                 </a:solidFill>
               </a:rPr>
               <a:pPr/>
-              <a:t>3/3/2017</a:t>
+              <a:t>8/7/2017</a:t>
             </a:fld>
             <a:endParaRPr lang="en-US" dirty="0">
               <a:solidFill>
@@ -2675,7 +2681,7 @@
     </p:spTree>
     <p:extLst>
       <p:ext uri="{BB962C8B-B14F-4D97-AF65-F5344CB8AC3E}">
-        <p14:creationId xmlns:p14="http://schemas.microsoft.com/office/powerpoint/2010/main" val="2160785054"/>
+        <p14:creationId xmlns:p14="http://schemas.microsoft.com/office/powerpoint/2010/main" val="2079953536"/>
       </p:ext>
     </p:extLst>
   </p:cSld>
@@ -2840,7 +2846,7 @@
                 </a:solidFill>
               </a:rPr>
               <a:pPr/>
-              <a:t>3/3/2017</a:t>
+              <a:t>8/7/2017</a:t>
             </a:fld>
             <a:endParaRPr lang="en-US" dirty="0">
               <a:solidFill>
@@ -2885,7 +2891,7 @@
     </p:spTree>
     <p:extLst>
       <p:ext uri="{BB962C8B-B14F-4D97-AF65-F5344CB8AC3E}">
-        <p14:creationId xmlns:p14="http://schemas.microsoft.com/office/powerpoint/2010/main" val="2499110562"/>
+        <p14:creationId xmlns:p14="http://schemas.microsoft.com/office/powerpoint/2010/main" val="2160785054"/>
       </p:ext>
     </p:extLst>
   </p:cSld>
@@ -3050,7 +3056,7 @@
                 </a:solidFill>
               </a:rPr>
               <a:pPr/>
-              <a:t>3/3/2017</a:t>
+              <a:t>8/7/2017</a:t>
             </a:fld>
             <a:endParaRPr lang="en-US" dirty="0">
               <a:solidFill>
@@ -3095,7 +3101,7 @@
     </p:spTree>
     <p:extLst>
       <p:ext uri="{BB962C8B-B14F-4D97-AF65-F5344CB8AC3E}">
-        <p14:creationId xmlns:p14="http://schemas.microsoft.com/office/powerpoint/2010/main" val="3533442395"/>
+        <p14:creationId xmlns:p14="http://schemas.microsoft.com/office/powerpoint/2010/main" val="2499110562"/>
       </p:ext>
     </p:extLst>
   </p:cSld>
@@ -3260,7 +3266,7 @@
                 </a:solidFill>
               </a:rPr>
               <a:pPr/>
-              <a:t>3/3/2017</a:t>
+              <a:t>8/7/2017</a:t>
             </a:fld>
             <a:endParaRPr lang="en-US" dirty="0">
               <a:solidFill>
@@ -3305,7 +3311,7 @@
     </p:spTree>
     <p:extLst>
       <p:ext uri="{BB962C8B-B14F-4D97-AF65-F5344CB8AC3E}">
-        <p14:creationId xmlns:p14="http://schemas.microsoft.com/office/powerpoint/2010/main" val="1459406460"/>
+        <p14:creationId xmlns:p14="http://schemas.microsoft.com/office/powerpoint/2010/main" val="3533442395"/>
       </p:ext>
     </p:extLst>
   </p:cSld>
@@ -3434,7 +3440,7 @@
           <a:p>
             <a:fld id="{B079C3B8-7366-4A44-A34B-3977080C19E7}" type="datetime1">
               <a:rPr lang="en-US" smtClean="0"/>
-              <a:t>3/3/2017</a:t>
+              <a:t>8/7/2017</a:t>
             </a:fld>
             <a:endParaRPr lang="en-US" dirty="0"/>
           </a:p>
@@ -3501,6 +3507,216 @@
 </file>
 
 <file path=ppt/notesSlides/notesSlide20.xml><?xml version="1.0" encoding="utf-8"?>
+<p:notes xmlns:a="http://schemas.openxmlformats.org/drawingml/2006/main" xmlns:r="http://schemas.openxmlformats.org/officeDocument/2006/relationships" xmlns:p="http://schemas.openxmlformats.org/presentationml/2006/main">
+  <p:cSld>
+    <p:spTree>
+      <p:nvGrpSpPr>
+        <p:cNvPr id="1" name=""/>
+        <p:cNvGrpSpPr/>
+        <p:nvPr/>
+      </p:nvGrpSpPr>
+      <p:grpSpPr>
+        <a:xfrm>
+          <a:off x="0" y="0"/>
+          <a:ext cx="0" cy="0"/>
+          <a:chOff x="0" y="0"/>
+          <a:chExt cx="0" cy="0"/>
+        </a:xfrm>
+      </p:grpSpPr>
+      <p:sp>
+        <p:nvSpPr>
+          <p:cNvPr id="2" name="Slide Image Placeholder 1"/>
+          <p:cNvSpPr>
+            <a:spLocks noGrp="1" noRot="1" noChangeAspect="1"/>
+          </p:cNvSpPr>
+          <p:nvPr>
+            <p:ph type="sldImg"/>
+          </p:nvPr>
+        </p:nvSpPr>
+        <p:spPr/>
+      </p:sp>
+      <p:sp>
+        <p:nvSpPr>
+          <p:cNvPr id="3" name="Notes Placeholder 2"/>
+          <p:cNvSpPr>
+            <a:spLocks noGrp="1"/>
+          </p:cNvSpPr>
+          <p:nvPr>
+            <p:ph type="body" idx="1"/>
+          </p:nvPr>
+        </p:nvSpPr>
+        <p:spPr/>
+        <p:txBody>
+          <a:bodyPr/>
+          <a:lstStyle/>
+          <a:p>
+            <a:endParaRPr lang="en-US"/>
+          </a:p>
+        </p:txBody>
+      </p:sp>
+      <p:sp>
+        <p:nvSpPr>
+          <p:cNvPr id="4" name="Header Placeholder 3"/>
+          <p:cNvSpPr>
+            <a:spLocks noGrp="1"/>
+          </p:cNvSpPr>
+          <p:nvPr>
+            <p:ph type="hdr" sz="quarter" idx="10"/>
+          </p:nvPr>
+        </p:nvSpPr>
+        <p:spPr/>
+        <p:txBody>
+          <a:bodyPr/>
+          <a:lstStyle/>
+          <a:p>
+            <a:r>
+              <a:rPr lang="en-US">
+                <a:solidFill>
+                  <a:prstClr val="black"/>
+                </a:solidFill>
+              </a:rPr>
+              <a:t>Build 2014</a:t>
+            </a:r>
+            <a:endParaRPr lang="en-US" dirty="0">
+              <a:solidFill>
+                <a:prstClr val="black"/>
+              </a:solidFill>
+            </a:endParaRPr>
+          </a:p>
+        </p:txBody>
+      </p:sp>
+      <p:sp>
+        <p:nvSpPr>
+          <p:cNvPr id="5" name="Footer Placeholder 4"/>
+          <p:cNvSpPr>
+            <a:spLocks noGrp="1"/>
+          </p:cNvSpPr>
+          <p:nvPr>
+            <p:ph type="ftr" sz="quarter" idx="11"/>
+          </p:nvPr>
+        </p:nvSpPr>
+        <p:spPr/>
+        <p:txBody>
+          <a:bodyPr/>
+          <a:lstStyle/>
+          <a:p>
+            <a:pPr defTabSz="914099" eaLnBrk="0" hangingPunct="0"/>
+            <a:r>
+              <a:rPr lang="en-US" sz="400">
+                <a:gradFill>
+                  <a:gsLst>
+                    <a:gs pos="0">
+                      <a:prstClr val="black"/>
+                    </a:gs>
+                    <a:gs pos="100000">
+                      <a:prstClr val="black"/>
+                    </a:gs>
+                  </a:gsLst>
+                  <a:lin ang="5400000" scaled="0"/>
+                </a:gradFill>
+                <a:latin typeface="Segoe UI" pitchFamily="34" charset="0"/>
+                <a:ea typeface="Segoe UI" pitchFamily="34" charset="0"/>
+                <a:cs typeface="Segoe UI" pitchFamily="34" charset="0"/>
+              </a:rPr>
+              <a:t>© 2014 Microsoft Corporation. All rights reserved. Microsoft, Windows, and other product names are or may be registered trademarks and/or trademarks in the U.S. and/or other countries. The information herein is for informational purposes only and represents the current view of Microsoft Corporation as of the date of this presentation.  Because Microsoft must respond to changing market conditions, it should not be interpreted to be a commitment on the part of Microsoft, and Microsoft cannot guarantee the accuracy of any information provided after the date of this presentation.  MICROSOFT MAKES NO WARRANTIES, EXPRESS, IMPLIED OR STATUTORY, AS TO THE INFORMATION IN THIS PRESENTATION.</a:t>
+            </a:r>
+            <a:endParaRPr lang="en-US" sz="400" dirty="0">
+              <a:gradFill>
+                <a:gsLst>
+                  <a:gs pos="0">
+                    <a:prstClr val="black"/>
+                  </a:gs>
+                  <a:gs pos="100000">
+                    <a:prstClr val="black"/>
+                  </a:gs>
+                </a:gsLst>
+                <a:lin ang="5400000" scaled="0"/>
+              </a:gradFill>
+              <a:latin typeface="Segoe UI" pitchFamily="34" charset="0"/>
+              <a:ea typeface="Segoe UI" pitchFamily="34" charset="0"/>
+              <a:cs typeface="Segoe UI" pitchFamily="34" charset="0"/>
+            </a:endParaRPr>
+          </a:p>
+        </p:txBody>
+      </p:sp>
+      <p:sp>
+        <p:nvSpPr>
+          <p:cNvPr id="6" name="Date Placeholder 5"/>
+          <p:cNvSpPr>
+            <a:spLocks noGrp="1"/>
+          </p:cNvSpPr>
+          <p:nvPr>
+            <p:ph type="dt" idx="12"/>
+          </p:nvPr>
+        </p:nvSpPr>
+        <p:spPr/>
+        <p:txBody>
+          <a:bodyPr/>
+          <a:lstStyle/>
+          <a:p>
+            <a:fld id="{9F00D60D-1703-4D24-8308-FEE06A50A69C}" type="datetime1">
+              <a:rPr lang="en-US" smtClean="0">
+                <a:solidFill>
+                  <a:prstClr val="black"/>
+                </a:solidFill>
+              </a:rPr>
+              <a:pPr/>
+              <a:t>8/7/2017</a:t>
+            </a:fld>
+            <a:endParaRPr lang="en-US" dirty="0">
+              <a:solidFill>
+                <a:prstClr val="black"/>
+              </a:solidFill>
+            </a:endParaRPr>
+          </a:p>
+        </p:txBody>
+      </p:sp>
+      <p:sp>
+        <p:nvSpPr>
+          <p:cNvPr id="7" name="Slide Number Placeholder 6"/>
+          <p:cNvSpPr>
+            <a:spLocks noGrp="1"/>
+          </p:cNvSpPr>
+          <p:nvPr>
+            <p:ph type="sldNum" sz="quarter" idx="13"/>
+          </p:nvPr>
+        </p:nvSpPr>
+        <p:spPr/>
+        <p:txBody>
+          <a:bodyPr/>
+          <a:lstStyle/>
+          <a:p>
+            <a:fld id="{B4008EB6-D09E-4580-8CD6-DDB14511944F}" type="slidenum">
+              <a:rPr lang="en-US" smtClean="0">
+                <a:solidFill>
+                  <a:prstClr val="black"/>
+                </a:solidFill>
+              </a:rPr>
+              <a:pPr/>
+              <a:t>22</a:t>
+            </a:fld>
+            <a:endParaRPr lang="en-US" dirty="0">
+              <a:solidFill>
+                <a:prstClr val="black"/>
+              </a:solidFill>
+            </a:endParaRPr>
+          </a:p>
+        </p:txBody>
+      </p:sp>
+    </p:spTree>
+    <p:extLst>
+      <p:ext uri="{BB962C8B-B14F-4D97-AF65-F5344CB8AC3E}">
+        <p14:creationId xmlns:p14="http://schemas.microsoft.com/office/powerpoint/2010/main" val="1459406460"/>
+      </p:ext>
+    </p:extLst>
+  </p:cSld>
+  <p:clrMapOvr>
+    <a:masterClrMapping/>
+  </p:clrMapOvr>
+</p:notes>
+</file>
+
+<file path=ppt/notesSlides/notesSlide21.xml><?xml version="1.0" encoding="utf-8"?>
 <p:notes xmlns:a="http://schemas.openxmlformats.org/drawingml/2006/main" xmlns:r="http://schemas.openxmlformats.org/officeDocument/2006/relationships" xmlns:p="http://schemas.openxmlformats.org/presentationml/2006/main">
   <p:cSld>
     <p:spTree>
@@ -3751,7 +3967,7 @@
                 <a:tabLst/>
                 <a:defRPr/>
               </a:pPr>
-              <a:t>3/3/2017</a:t>
+              <a:t>8/7/2017</a:t>
             </a:fld>
             <a:endParaRPr kumimoji="0" lang="en-US" sz="1800" b="0" i="0" u="none" strike="noStrike" kern="0" cap="none" spc="0" normalizeH="0" baseline="0" noProof="0" dirty="0">
               <a:ln>
@@ -3828,7 +4044,7 @@
                 <a:tabLst/>
                 <a:defRPr/>
               </a:pPr>
-              <a:t>22</a:t>
+              <a:t>23</a:t>
             </a:fld>
             <a:endParaRPr kumimoji="0" lang="en-US" sz="1800" b="0" i="0" u="none" strike="noStrike" kern="0" cap="none" spc="0" normalizeH="0" baseline="0" noProof="0" dirty="0">
               <a:ln>
@@ -3848,216 +4064,6 @@
     <p:extLst>
       <p:ext uri="{BB962C8B-B14F-4D97-AF65-F5344CB8AC3E}">
         <p14:creationId xmlns:p14="http://schemas.microsoft.com/office/powerpoint/2010/main" val="476893638"/>
-      </p:ext>
-    </p:extLst>
-  </p:cSld>
-  <p:clrMapOvr>
-    <a:masterClrMapping/>
-  </p:clrMapOvr>
-</p:notes>
-</file>
-
-<file path=ppt/notesSlides/notesSlide21.xml><?xml version="1.0" encoding="utf-8"?>
-<p:notes xmlns:a="http://schemas.openxmlformats.org/drawingml/2006/main" xmlns:r="http://schemas.openxmlformats.org/officeDocument/2006/relationships" xmlns:p="http://schemas.openxmlformats.org/presentationml/2006/main">
-  <p:cSld>
-    <p:spTree>
-      <p:nvGrpSpPr>
-        <p:cNvPr id="1" name=""/>
-        <p:cNvGrpSpPr/>
-        <p:nvPr/>
-      </p:nvGrpSpPr>
-      <p:grpSpPr>
-        <a:xfrm>
-          <a:off x="0" y="0"/>
-          <a:ext cx="0" cy="0"/>
-          <a:chOff x="0" y="0"/>
-          <a:chExt cx="0" cy="0"/>
-        </a:xfrm>
-      </p:grpSpPr>
-      <p:sp>
-        <p:nvSpPr>
-          <p:cNvPr id="2" name="Slide Image Placeholder 1"/>
-          <p:cNvSpPr>
-            <a:spLocks noGrp="1" noRot="1" noChangeAspect="1"/>
-          </p:cNvSpPr>
-          <p:nvPr>
-            <p:ph type="sldImg"/>
-          </p:nvPr>
-        </p:nvSpPr>
-        <p:spPr/>
-      </p:sp>
-      <p:sp>
-        <p:nvSpPr>
-          <p:cNvPr id="3" name="Notes Placeholder 2"/>
-          <p:cNvSpPr>
-            <a:spLocks noGrp="1"/>
-          </p:cNvSpPr>
-          <p:nvPr>
-            <p:ph type="body" idx="1"/>
-          </p:nvPr>
-        </p:nvSpPr>
-        <p:spPr/>
-        <p:txBody>
-          <a:bodyPr/>
-          <a:lstStyle/>
-          <a:p>
-            <a:endParaRPr lang="en-US"/>
-          </a:p>
-        </p:txBody>
-      </p:sp>
-      <p:sp>
-        <p:nvSpPr>
-          <p:cNvPr id="4" name="Footer Placeholder 3"/>
-          <p:cNvSpPr>
-            <a:spLocks noGrp="1"/>
-          </p:cNvSpPr>
-          <p:nvPr>
-            <p:ph type="ftr" sz="quarter" idx="10"/>
-          </p:nvPr>
-        </p:nvSpPr>
-        <p:spPr/>
-        <p:txBody>
-          <a:bodyPr/>
-          <a:lstStyle/>
-          <a:p>
-            <a:pPr defTabSz="914099" eaLnBrk="0" hangingPunct="0"/>
-            <a:r>
-              <a:rPr lang="en-US" sz="400">
-                <a:gradFill>
-                  <a:gsLst>
-                    <a:gs pos="0">
-                      <a:prstClr val="black"/>
-                    </a:gs>
-                    <a:gs pos="100000">
-                      <a:prstClr val="black"/>
-                    </a:gs>
-                  </a:gsLst>
-                  <a:lin ang="5400000" scaled="0"/>
-                </a:gradFill>
-                <a:latin typeface="Segoe UI" pitchFamily="34" charset="0"/>
-                <a:ea typeface="Segoe UI" pitchFamily="34" charset="0"/>
-                <a:cs typeface="Segoe UI" pitchFamily="34" charset="0"/>
-              </a:rPr>
-              <a:t>© 2014 Microsoft Corporation. All rights reserved. Microsoft, Windows, and other product names are or may be registered trademarks and/or trademarks in the U.S. and/or other countries. The information herein is for informational purposes only and represents the current view of Microsoft Corporation as of the date of this presentation.  Because Microsoft must respond to changing market conditions, it should not be interpreted to be a commitment on the part of Microsoft, and Microsoft cannot guarantee the accuracy of any information provided after the date of this presentation.  MICROSOFT MAKES NO WARRANTIES, EXPRESS, IMPLIED OR STATUTORY, AS TO THE INFORMATION IN THIS PRESENTATION.</a:t>
-            </a:r>
-            <a:endParaRPr lang="en-US" sz="400" dirty="0">
-              <a:gradFill>
-                <a:gsLst>
-                  <a:gs pos="0">
-                    <a:prstClr val="black"/>
-                  </a:gs>
-                  <a:gs pos="100000">
-                    <a:prstClr val="black"/>
-                  </a:gs>
-                </a:gsLst>
-                <a:lin ang="5400000" scaled="0"/>
-              </a:gradFill>
-              <a:latin typeface="Segoe UI" pitchFamily="34" charset="0"/>
-              <a:ea typeface="Segoe UI" pitchFamily="34" charset="0"/>
-              <a:cs typeface="Segoe UI" pitchFamily="34" charset="0"/>
-            </a:endParaRPr>
-          </a:p>
-        </p:txBody>
-      </p:sp>
-      <p:sp>
-        <p:nvSpPr>
-          <p:cNvPr id="5" name="Date Placeholder 4"/>
-          <p:cNvSpPr>
-            <a:spLocks noGrp="1"/>
-          </p:cNvSpPr>
-          <p:nvPr>
-            <p:ph type="dt" idx="11"/>
-          </p:nvPr>
-        </p:nvSpPr>
-        <p:spPr/>
-        <p:txBody>
-          <a:bodyPr/>
-          <a:lstStyle/>
-          <a:p>
-            <a:fld id="{FCF63DAE-D37E-4C44-BD81-0E251F1BE300}" type="datetime1">
-              <a:rPr lang="en-US" smtClean="0">
-                <a:solidFill>
-                  <a:prstClr val="black"/>
-                </a:solidFill>
-              </a:rPr>
-              <a:pPr/>
-              <a:t>3/3/2017</a:t>
-            </a:fld>
-            <a:endParaRPr lang="en-US" dirty="0">
-              <a:solidFill>
-                <a:prstClr val="black"/>
-              </a:solidFill>
-            </a:endParaRPr>
-          </a:p>
-        </p:txBody>
-      </p:sp>
-      <p:sp>
-        <p:nvSpPr>
-          <p:cNvPr id="6" name="Slide Number Placeholder 5"/>
-          <p:cNvSpPr>
-            <a:spLocks noGrp="1"/>
-          </p:cNvSpPr>
-          <p:nvPr>
-            <p:ph type="sldNum" sz="quarter" idx="12"/>
-          </p:nvPr>
-        </p:nvSpPr>
-        <p:spPr/>
-        <p:txBody>
-          <a:bodyPr/>
-          <a:lstStyle/>
-          <a:p>
-            <a:fld id="{B4008EB6-D09E-4580-8CD6-DDB14511944F}" type="slidenum">
-              <a:rPr lang="en-US" smtClean="0">
-                <a:solidFill>
-                  <a:prstClr val="black"/>
-                </a:solidFill>
-              </a:rPr>
-              <a:pPr/>
-              <a:t>23</a:t>
-            </a:fld>
-            <a:endParaRPr lang="en-US" dirty="0">
-              <a:solidFill>
-                <a:prstClr val="black"/>
-              </a:solidFill>
-            </a:endParaRPr>
-          </a:p>
-        </p:txBody>
-      </p:sp>
-      <p:sp>
-        <p:nvSpPr>
-          <p:cNvPr id="7" name="Header Placeholder 6"/>
-          <p:cNvSpPr>
-            <a:spLocks noGrp="1"/>
-          </p:cNvSpPr>
-          <p:nvPr>
-            <p:ph type="hdr" sz="quarter" idx="13"/>
-          </p:nvPr>
-        </p:nvSpPr>
-        <p:spPr/>
-        <p:txBody>
-          <a:bodyPr/>
-          <a:lstStyle/>
-          <a:p>
-            <a:r>
-              <a:rPr lang="en-US">
-                <a:solidFill>
-                  <a:prstClr val="black"/>
-                </a:solidFill>
-              </a:rPr>
-              <a:t>Build 2014</a:t>
-            </a:r>
-            <a:endParaRPr lang="en-US" dirty="0">
-              <a:solidFill>
-                <a:prstClr val="black"/>
-              </a:solidFill>
-            </a:endParaRPr>
-          </a:p>
-        </p:txBody>
-      </p:sp>
-    </p:spTree>
-    <p:extLst>
-      <p:ext uri="{BB962C8B-B14F-4D97-AF65-F5344CB8AC3E}">
-        <p14:creationId xmlns:p14="http://schemas.microsoft.com/office/powerpoint/2010/main" val="2327117907"/>
       </p:ext>
     </p:extLst>
   </p:cSld>
@@ -4117,43 +4123,12 @@
       </p:sp>
       <p:sp>
         <p:nvSpPr>
-          <p:cNvPr id="4" name="Header Placeholder 3"/>
-          <p:cNvSpPr>
-            <a:spLocks noGrp="1"/>
-          </p:cNvSpPr>
-          <p:nvPr>
-            <p:ph type="hdr" sz="quarter" idx="10"/>
-          </p:nvPr>
-        </p:nvSpPr>
-        <p:spPr/>
-        <p:txBody>
-          <a:bodyPr/>
-          <a:lstStyle/>
-          <a:p>
-            <a:r>
-              <a:rPr lang="en-US">
-                <a:solidFill>
-                  <a:prstClr val="black"/>
-                </a:solidFill>
-              </a:rPr>
-              <a:t>Build 2014</a:t>
-            </a:r>
-            <a:endParaRPr lang="en-US" dirty="0">
-              <a:solidFill>
-                <a:prstClr val="black"/>
-              </a:solidFill>
-            </a:endParaRPr>
-          </a:p>
-        </p:txBody>
-      </p:sp>
-      <p:sp>
-        <p:nvSpPr>
-          <p:cNvPr id="5" name="Footer Placeholder 4"/>
-          <p:cNvSpPr>
-            <a:spLocks noGrp="1"/>
-          </p:cNvSpPr>
-          <p:nvPr>
-            <p:ph type="ftr" sz="quarter" idx="11"/>
+          <p:cNvPr id="4" name="Footer Placeholder 3"/>
+          <p:cNvSpPr>
+            <a:spLocks noGrp="1"/>
+          </p:cNvSpPr>
+          <p:nvPr>
+            <p:ph type="ftr" sz="quarter" idx="10"/>
           </p:nvPr>
         </p:nvSpPr>
         <p:spPr/>
@@ -4202,12 +4177,12 @@
       </p:sp>
       <p:sp>
         <p:nvSpPr>
-          <p:cNvPr id="6" name="Date Placeholder 5"/>
-          <p:cNvSpPr>
-            <a:spLocks noGrp="1"/>
-          </p:cNvSpPr>
-          <p:nvPr>
-            <p:ph type="dt" idx="12"/>
+          <p:cNvPr id="5" name="Date Placeholder 4"/>
+          <p:cNvSpPr>
+            <a:spLocks noGrp="1"/>
+          </p:cNvSpPr>
+          <p:nvPr>
+            <p:ph type="dt" idx="11"/>
           </p:nvPr>
         </p:nvSpPr>
         <p:spPr/>
@@ -4215,14 +4190,14 @@
           <a:bodyPr/>
           <a:lstStyle/>
           <a:p>
-            <a:fld id="{9F00D60D-1703-4D24-8308-FEE06A50A69C}" type="datetime1">
+            <a:fld id="{FCF63DAE-D37E-4C44-BD81-0E251F1BE300}" type="datetime1">
               <a:rPr lang="en-US" smtClean="0">
                 <a:solidFill>
                   <a:prstClr val="black"/>
                 </a:solidFill>
               </a:rPr>
               <a:pPr/>
-              <a:t>3/3/2017</a:t>
+              <a:t>8/7/2017</a:t>
             </a:fld>
             <a:endParaRPr lang="en-US" dirty="0">
               <a:solidFill>
@@ -4234,12 +4209,12 @@
       </p:sp>
       <p:sp>
         <p:nvSpPr>
-          <p:cNvPr id="7" name="Slide Number Placeholder 6"/>
-          <p:cNvSpPr>
-            <a:spLocks noGrp="1"/>
-          </p:cNvSpPr>
-          <p:nvPr>
-            <p:ph type="sldNum" sz="quarter" idx="13"/>
+          <p:cNvPr id="6" name="Slide Number Placeholder 5"/>
+          <p:cNvSpPr>
+            <a:spLocks noGrp="1"/>
+          </p:cNvSpPr>
+          <p:nvPr>
+            <p:ph type="sldNum" sz="quarter" idx="12"/>
           </p:nvPr>
         </p:nvSpPr>
         <p:spPr/>
@@ -4254,7 +4229,7 @@
                 </a:solidFill>
               </a:rPr>
               <a:pPr/>
-              <a:t>25</a:t>
+              <a:t>24</a:t>
             </a:fld>
             <a:endParaRPr lang="en-US" dirty="0">
               <a:solidFill>
@@ -4264,10 +4239,41 @@
           </a:p>
         </p:txBody>
       </p:sp>
+      <p:sp>
+        <p:nvSpPr>
+          <p:cNvPr id="7" name="Header Placeholder 6"/>
+          <p:cNvSpPr>
+            <a:spLocks noGrp="1"/>
+          </p:cNvSpPr>
+          <p:nvPr>
+            <p:ph type="hdr" sz="quarter" idx="13"/>
+          </p:nvPr>
+        </p:nvSpPr>
+        <p:spPr/>
+        <p:txBody>
+          <a:bodyPr/>
+          <a:lstStyle/>
+          <a:p>
+            <a:r>
+              <a:rPr lang="en-US">
+                <a:solidFill>
+                  <a:prstClr val="black"/>
+                </a:solidFill>
+              </a:rPr>
+              <a:t>Build 2014</a:t>
+            </a:r>
+            <a:endParaRPr lang="en-US" dirty="0">
+              <a:solidFill>
+                <a:prstClr val="black"/>
+              </a:solidFill>
+            </a:endParaRPr>
+          </a:p>
+        </p:txBody>
+      </p:sp>
     </p:spTree>
     <p:extLst>
       <p:ext uri="{BB962C8B-B14F-4D97-AF65-F5344CB8AC3E}">
-        <p14:creationId xmlns:p14="http://schemas.microsoft.com/office/powerpoint/2010/main" val="2934531598"/>
+        <p14:creationId xmlns:p14="http://schemas.microsoft.com/office/powerpoint/2010/main" val="2327117907"/>
       </p:ext>
     </p:extLst>
   </p:cSld>
@@ -4432,7 +4438,7 @@
                 </a:solidFill>
               </a:rPr>
               <a:pPr/>
-              <a:t>3/3/2017</a:t>
+              <a:t>8/7/2017</a:t>
             </a:fld>
             <a:endParaRPr lang="en-US" dirty="0">
               <a:solidFill>
@@ -4477,7 +4483,7 @@
     </p:spTree>
     <p:extLst>
       <p:ext uri="{BB962C8B-B14F-4D97-AF65-F5344CB8AC3E}">
-        <p14:creationId xmlns:p14="http://schemas.microsoft.com/office/powerpoint/2010/main" val="3906853571"/>
+        <p14:creationId xmlns:p14="http://schemas.microsoft.com/office/powerpoint/2010/main" val="2934531598"/>
       </p:ext>
     </p:extLst>
   </p:cSld>
@@ -4642,7 +4648,7 @@
                 </a:solidFill>
               </a:rPr>
               <a:pPr/>
-              <a:t>3/3/2017</a:t>
+              <a:t>8/7/2017</a:t>
             </a:fld>
             <a:endParaRPr lang="en-US" dirty="0">
               <a:solidFill>
@@ -4687,7 +4693,7 @@
     </p:spTree>
     <p:extLst>
       <p:ext uri="{BB962C8B-B14F-4D97-AF65-F5344CB8AC3E}">
-        <p14:creationId xmlns:p14="http://schemas.microsoft.com/office/powerpoint/2010/main" val="528904937"/>
+        <p14:creationId xmlns:p14="http://schemas.microsoft.com/office/powerpoint/2010/main" val="3906853571"/>
       </p:ext>
     </p:extLst>
   </p:cSld>
@@ -4852,7 +4858,7 @@
                 </a:solidFill>
               </a:rPr>
               <a:pPr/>
-              <a:t>3/3/2017</a:t>
+              <a:t>8/7/2017</a:t>
             </a:fld>
             <a:endParaRPr lang="en-US" dirty="0">
               <a:solidFill>
@@ -4897,7 +4903,7 @@
     </p:spTree>
     <p:extLst>
       <p:ext uri="{BB962C8B-B14F-4D97-AF65-F5344CB8AC3E}">
-        <p14:creationId xmlns:p14="http://schemas.microsoft.com/office/powerpoint/2010/main" val="1370500354"/>
+        <p14:creationId xmlns:p14="http://schemas.microsoft.com/office/powerpoint/2010/main" val="528904937"/>
       </p:ext>
     </p:extLst>
   </p:cSld>
@@ -5062,7 +5068,7 @@
                 </a:solidFill>
               </a:rPr>
               <a:pPr/>
-              <a:t>3/3/2017</a:t>
+              <a:t>8/7/2017</a:t>
             </a:fld>
             <a:endParaRPr lang="en-US" dirty="0">
               <a:solidFill>
@@ -5107,7 +5113,7 @@
     </p:spTree>
     <p:extLst>
       <p:ext uri="{BB962C8B-B14F-4D97-AF65-F5344CB8AC3E}">
-        <p14:creationId xmlns:p14="http://schemas.microsoft.com/office/powerpoint/2010/main" val="3470729680"/>
+        <p14:creationId xmlns:p14="http://schemas.microsoft.com/office/powerpoint/2010/main" val="1370500354"/>
       </p:ext>
     </p:extLst>
   </p:cSld>
@@ -5272,7 +5278,7 @@
                 </a:solidFill>
               </a:rPr>
               <a:pPr/>
-              <a:t>3/3/2017</a:t>
+              <a:t>8/7/2017</a:t>
             </a:fld>
             <a:endParaRPr lang="en-US" dirty="0">
               <a:solidFill>
@@ -5317,6 +5323,216 @@
     </p:spTree>
     <p:extLst>
       <p:ext uri="{BB962C8B-B14F-4D97-AF65-F5344CB8AC3E}">
+        <p14:creationId xmlns:p14="http://schemas.microsoft.com/office/powerpoint/2010/main" val="3470729680"/>
+      </p:ext>
+    </p:extLst>
+  </p:cSld>
+  <p:clrMapOvr>
+    <a:masterClrMapping/>
+  </p:clrMapOvr>
+</p:notes>
+</file>
+
+<file path=ppt/notesSlides/notesSlide28.xml><?xml version="1.0" encoding="utf-8"?>
+<p:notes xmlns:a="http://schemas.openxmlformats.org/drawingml/2006/main" xmlns:r="http://schemas.openxmlformats.org/officeDocument/2006/relationships" xmlns:p="http://schemas.openxmlformats.org/presentationml/2006/main">
+  <p:cSld>
+    <p:spTree>
+      <p:nvGrpSpPr>
+        <p:cNvPr id="1" name=""/>
+        <p:cNvGrpSpPr/>
+        <p:nvPr/>
+      </p:nvGrpSpPr>
+      <p:grpSpPr>
+        <a:xfrm>
+          <a:off x="0" y="0"/>
+          <a:ext cx="0" cy="0"/>
+          <a:chOff x="0" y="0"/>
+          <a:chExt cx="0" cy="0"/>
+        </a:xfrm>
+      </p:grpSpPr>
+      <p:sp>
+        <p:nvSpPr>
+          <p:cNvPr id="2" name="Slide Image Placeholder 1"/>
+          <p:cNvSpPr>
+            <a:spLocks noGrp="1" noRot="1" noChangeAspect="1"/>
+          </p:cNvSpPr>
+          <p:nvPr>
+            <p:ph type="sldImg"/>
+          </p:nvPr>
+        </p:nvSpPr>
+        <p:spPr/>
+      </p:sp>
+      <p:sp>
+        <p:nvSpPr>
+          <p:cNvPr id="3" name="Notes Placeholder 2"/>
+          <p:cNvSpPr>
+            <a:spLocks noGrp="1"/>
+          </p:cNvSpPr>
+          <p:nvPr>
+            <p:ph type="body" idx="1"/>
+          </p:nvPr>
+        </p:nvSpPr>
+        <p:spPr/>
+        <p:txBody>
+          <a:bodyPr/>
+          <a:lstStyle/>
+          <a:p>
+            <a:endParaRPr lang="en-US"/>
+          </a:p>
+        </p:txBody>
+      </p:sp>
+      <p:sp>
+        <p:nvSpPr>
+          <p:cNvPr id="4" name="Header Placeholder 3"/>
+          <p:cNvSpPr>
+            <a:spLocks noGrp="1"/>
+          </p:cNvSpPr>
+          <p:nvPr>
+            <p:ph type="hdr" sz="quarter" idx="10"/>
+          </p:nvPr>
+        </p:nvSpPr>
+        <p:spPr/>
+        <p:txBody>
+          <a:bodyPr/>
+          <a:lstStyle/>
+          <a:p>
+            <a:r>
+              <a:rPr lang="en-US">
+                <a:solidFill>
+                  <a:prstClr val="black"/>
+                </a:solidFill>
+              </a:rPr>
+              <a:t>Build 2014</a:t>
+            </a:r>
+            <a:endParaRPr lang="en-US" dirty="0">
+              <a:solidFill>
+                <a:prstClr val="black"/>
+              </a:solidFill>
+            </a:endParaRPr>
+          </a:p>
+        </p:txBody>
+      </p:sp>
+      <p:sp>
+        <p:nvSpPr>
+          <p:cNvPr id="5" name="Footer Placeholder 4"/>
+          <p:cNvSpPr>
+            <a:spLocks noGrp="1"/>
+          </p:cNvSpPr>
+          <p:nvPr>
+            <p:ph type="ftr" sz="quarter" idx="11"/>
+          </p:nvPr>
+        </p:nvSpPr>
+        <p:spPr/>
+        <p:txBody>
+          <a:bodyPr/>
+          <a:lstStyle/>
+          <a:p>
+            <a:pPr defTabSz="914099" eaLnBrk="0" hangingPunct="0"/>
+            <a:r>
+              <a:rPr lang="en-US" sz="400">
+                <a:gradFill>
+                  <a:gsLst>
+                    <a:gs pos="0">
+                      <a:prstClr val="black"/>
+                    </a:gs>
+                    <a:gs pos="100000">
+                      <a:prstClr val="black"/>
+                    </a:gs>
+                  </a:gsLst>
+                  <a:lin ang="5400000" scaled="0"/>
+                </a:gradFill>
+                <a:latin typeface="Segoe UI" pitchFamily="34" charset="0"/>
+                <a:ea typeface="Segoe UI" pitchFamily="34" charset="0"/>
+                <a:cs typeface="Segoe UI" pitchFamily="34" charset="0"/>
+              </a:rPr>
+              <a:t>© 2014 Microsoft Corporation. All rights reserved. Microsoft, Windows, and other product names are or may be registered trademarks and/or trademarks in the U.S. and/or other countries. The information herein is for informational purposes only and represents the current view of Microsoft Corporation as of the date of this presentation.  Because Microsoft must respond to changing market conditions, it should not be interpreted to be a commitment on the part of Microsoft, and Microsoft cannot guarantee the accuracy of any information provided after the date of this presentation.  MICROSOFT MAKES NO WARRANTIES, EXPRESS, IMPLIED OR STATUTORY, AS TO THE INFORMATION IN THIS PRESENTATION.</a:t>
+            </a:r>
+            <a:endParaRPr lang="en-US" sz="400" dirty="0">
+              <a:gradFill>
+                <a:gsLst>
+                  <a:gs pos="0">
+                    <a:prstClr val="black"/>
+                  </a:gs>
+                  <a:gs pos="100000">
+                    <a:prstClr val="black"/>
+                  </a:gs>
+                </a:gsLst>
+                <a:lin ang="5400000" scaled="0"/>
+              </a:gradFill>
+              <a:latin typeface="Segoe UI" pitchFamily="34" charset="0"/>
+              <a:ea typeface="Segoe UI" pitchFamily="34" charset="0"/>
+              <a:cs typeface="Segoe UI" pitchFamily="34" charset="0"/>
+            </a:endParaRPr>
+          </a:p>
+        </p:txBody>
+      </p:sp>
+      <p:sp>
+        <p:nvSpPr>
+          <p:cNvPr id="6" name="Date Placeholder 5"/>
+          <p:cNvSpPr>
+            <a:spLocks noGrp="1"/>
+          </p:cNvSpPr>
+          <p:nvPr>
+            <p:ph type="dt" idx="12"/>
+          </p:nvPr>
+        </p:nvSpPr>
+        <p:spPr/>
+        <p:txBody>
+          <a:bodyPr/>
+          <a:lstStyle/>
+          <a:p>
+            <a:fld id="{9F00D60D-1703-4D24-8308-FEE06A50A69C}" type="datetime1">
+              <a:rPr lang="en-US" smtClean="0">
+                <a:solidFill>
+                  <a:prstClr val="black"/>
+                </a:solidFill>
+              </a:rPr>
+              <a:pPr/>
+              <a:t>8/7/2017</a:t>
+            </a:fld>
+            <a:endParaRPr lang="en-US" dirty="0">
+              <a:solidFill>
+                <a:prstClr val="black"/>
+              </a:solidFill>
+            </a:endParaRPr>
+          </a:p>
+        </p:txBody>
+      </p:sp>
+      <p:sp>
+        <p:nvSpPr>
+          <p:cNvPr id="7" name="Slide Number Placeholder 6"/>
+          <p:cNvSpPr>
+            <a:spLocks noGrp="1"/>
+          </p:cNvSpPr>
+          <p:nvPr>
+            <p:ph type="sldNum" sz="quarter" idx="13"/>
+          </p:nvPr>
+        </p:nvSpPr>
+        <p:spPr/>
+        <p:txBody>
+          <a:bodyPr/>
+          <a:lstStyle/>
+          <a:p>
+            <a:fld id="{B4008EB6-D09E-4580-8CD6-DDB14511944F}" type="slidenum">
+              <a:rPr lang="en-US" smtClean="0">
+                <a:solidFill>
+                  <a:prstClr val="black"/>
+                </a:solidFill>
+              </a:rPr>
+              <a:pPr/>
+              <a:t>31</a:t>
+            </a:fld>
+            <a:endParaRPr lang="en-US" dirty="0">
+              <a:solidFill>
+                <a:prstClr val="black"/>
+              </a:solidFill>
+            </a:endParaRPr>
+          </a:p>
+        </p:txBody>
+      </p:sp>
+    </p:spTree>
+    <p:extLst>
+      <p:ext uri="{BB962C8B-B14F-4D97-AF65-F5344CB8AC3E}">
         <p14:creationId xmlns:p14="http://schemas.microsoft.com/office/powerpoint/2010/main" val="1796095888"/>
       </p:ext>
     </p:extLst>
@@ -5327,7 +5543,7 @@
 </p:notes>
 </file>
 
-<file path=ppt/notesSlides/notesSlide28.xml><?xml version="1.0" encoding="utf-8"?>
+<file path=ppt/notesSlides/notesSlide29.xml><?xml version="1.0" encoding="utf-8"?>
 <p:notes xmlns:a="http://schemas.openxmlformats.org/drawingml/2006/main" xmlns:r="http://schemas.openxmlformats.org/officeDocument/2006/relationships" xmlns:p="http://schemas.openxmlformats.org/presentationml/2006/main">
   <p:cSld>
     <p:spTree>
@@ -5578,7 +5794,7 @@
                 <a:tabLst/>
                 <a:defRPr/>
               </a:pPr>
-              <a:t>3/3/2017</a:t>
+              <a:t>8/7/2017</a:t>
             </a:fld>
             <a:endParaRPr kumimoji="0" lang="en-US" sz="1800" b="0" i="0" u="none" strike="noStrike" kern="0" cap="none" spc="0" normalizeH="0" baseline="0" noProof="0" dirty="0">
               <a:ln>
@@ -5655,7 +5871,7 @@
                 <a:tabLst/>
                 <a:defRPr/>
               </a:pPr>
-              <a:t>31</a:t>
+              <a:t>32</a:t>
             </a:fld>
             <a:endParaRPr kumimoji="0" lang="en-US" sz="1800" b="0" i="0" u="none" strike="noStrike" kern="0" cap="none" spc="0" normalizeH="0" baseline="0" noProof="0" dirty="0">
               <a:ln>
@@ -5675,216 +5891,6 @@
     <p:extLst>
       <p:ext uri="{BB962C8B-B14F-4D97-AF65-F5344CB8AC3E}">
         <p14:creationId xmlns:p14="http://schemas.microsoft.com/office/powerpoint/2010/main" val="1968014362"/>
-      </p:ext>
-    </p:extLst>
-  </p:cSld>
-  <p:clrMapOvr>
-    <a:masterClrMapping/>
-  </p:clrMapOvr>
-</p:notes>
-</file>
-
-<file path=ppt/notesSlides/notesSlide29.xml><?xml version="1.0" encoding="utf-8"?>
-<p:notes xmlns:a="http://schemas.openxmlformats.org/drawingml/2006/main" xmlns:r="http://schemas.openxmlformats.org/officeDocument/2006/relationships" xmlns:p="http://schemas.openxmlformats.org/presentationml/2006/main">
-  <p:cSld>
-    <p:spTree>
-      <p:nvGrpSpPr>
-        <p:cNvPr id="1" name=""/>
-        <p:cNvGrpSpPr/>
-        <p:nvPr/>
-      </p:nvGrpSpPr>
-      <p:grpSpPr>
-        <a:xfrm>
-          <a:off x="0" y="0"/>
-          <a:ext cx="0" cy="0"/>
-          <a:chOff x="0" y="0"/>
-          <a:chExt cx="0" cy="0"/>
-        </a:xfrm>
-      </p:grpSpPr>
-      <p:sp>
-        <p:nvSpPr>
-          <p:cNvPr id="2" name="Slide Image Placeholder 1"/>
-          <p:cNvSpPr>
-            <a:spLocks noGrp="1" noRot="1" noChangeAspect="1"/>
-          </p:cNvSpPr>
-          <p:nvPr>
-            <p:ph type="sldImg"/>
-          </p:nvPr>
-        </p:nvSpPr>
-        <p:spPr/>
-      </p:sp>
-      <p:sp>
-        <p:nvSpPr>
-          <p:cNvPr id="3" name="Notes Placeholder 2"/>
-          <p:cNvSpPr>
-            <a:spLocks noGrp="1"/>
-          </p:cNvSpPr>
-          <p:nvPr>
-            <p:ph type="body" idx="1"/>
-          </p:nvPr>
-        </p:nvSpPr>
-        <p:spPr/>
-        <p:txBody>
-          <a:bodyPr/>
-          <a:lstStyle/>
-          <a:p>
-            <a:endParaRPr lang="en-US"/>
-          </a:p>
-        </p:txBody>
-      </p:sp>
-      <p:sp>
-        <p:nvSpPr>
-          <p:cNvPr id="4" name="Footer Placeholder 3"/>
-          <p:cNvSpPr>
-            <a:spLocks noGrp="1"/>
-          </p:cNvSpPr>
-          <p:nvPr>
-            <p:ph type="ftr" sz="quarter" idx="10"/>
-          </p:nvPr>
-        </p:nvSpPr>
-        <p:spPr/>
-        <p:txBody>
-          <a:bodyPr/>
-          <a:lstStyle/>
-          <a:p>
-            <a:pPr defTabSz="914099" eaLnBrk="0" hangingPunct="0"/>
-            <a:r>
-              <a:rPr lang="en-US" sz="400">
-                <a:gradFill>
-                  <a:gsLst>
-                    <a:gs pos="0">
-                      <a:prstClr val="black"/>
-                    </a:gs>
-                    <a:gs pos="100000">
-                      <a:prstClr val="black"/>
-                    </a:gs>
-                  </a:gsLst>
-                  <a:lin ang="5400000" scaled="0"/>
-                </a:gradFill>
-                <a:latin typeface="Segoe UI" pitchFamily="34" charset="0"/>
-                <a:ea typeface="Segoe UI" pitchFamily="34" charset="0"/>
-                <a:cs typeface="Segoe UI" pitchFamily="34" charset="0"/>
-              </a:rPr>
-              <a:t>© 2014 Microsoft Corporation. All rights reserved. Microsoft, Windows, and other product names are or may be registered trademarks and/or trademarks in the U.S. and/or other countries. The information herein is for informational purposes only and represents the current view of Microsoft Corporation as of the date of this presentation.  Because Microsoft must respond to changing market conditions, it should not be interpreted to be a commitment on the part of Microsoft, and Microsoft cannot guarantee the accuracy of any information provided after the date of this presentation.  MICROSOFT MAKES NO WARRANTIES, EXPRESS, IMPLIED OR STATUTORY, AS TO THE INFORMATION IN THIS PRESENTATION.</a:t>
-            </a:r>
-            <a:endParaRPr lang="en-US" sz="400" dirty="0">
-              <a:gradFill>
-                <a:gsLst>
-                  <a:gs pos="0">
-                    <a:prstClr val="black"/>
-                  </a:gs>
-                  <a:gs pos="100000">
-                    <a:prstClr val="black"/>
-                  </a:gs>
-                </a:gsLst>
-                <a:lin ang="5400000" scaled="0"/>
-              </a:gradFill>
-              <a:latin typeface="Segoe UI" pitchFamily="34" charset="0"/>
-              <a:ea typeface="Segoe UI" pitchFamily="34" charset="0"/>
-              <a:cs typeface="Segoe UI" pitchFamily="34" charset="0"/>
-            </a:endParaRPr>
-          </a:p>
-        </p:txBody>
-      </p:sp>
-      <p:sp>
-        <p:nvSpPr>
-          <p:cNvPr id="5" name="Date Placeholder 4"/>
-          <p:cNvSpPr>
-            <a:spLocks noGrp="1"/>
-          </p:cNvSpPr>
-          <p:nvPr>
-            <p:ph type="dt" idx="11"/>
-          </p:nvPr>
-        </p:nvSpPr>
-        <p:spPr/>
-        <p:txBody>
-          <a:bodyPr/>
-          <a:lstStyle/>
-          <a:p>
-            <a:fld id="{FCF63DAE-D37E-4C44-BD81-0E251F1BE300}" type="datetime1">
-              <a:rPr lang="en-US" smtClean="0">
-                <a:solidFill>
-                  <a:prstClr val="black"/>
-                </a:solidFill>
-              </a:rPr>
-              <a:pPr/>
-              <a:t>3/3/2017</a:t>
-            </a:fld>
-            <a:endParaRPr lang="en-US" dirty="0">
-              <a:solidFill>
-                <a:prstClr val="black"/>
-              </a:solidFill>
-            </a:endParaRPr>
-          </a:p>
-        </p:txBody>
-      </p:sp>
-      <p:sp>
-        <p:nvSpPr>
-          <p:cNvPr id="6" name="Slide Number Placeholder 5"/>
-          <p:cNvSpPr>
-            <a:spLocks noGrp="1"/>
-          </p:cNvSpPr>
-          <p:nvPr>
-            <p:ph type="sldNum" sz="quarter" idx="12"/>
-          </p:nvPr>
-        </p:nvSpPr>
-        <p:spPr/>
-        <p:txBody>
-          <a:bodyPr/>
-          <a:lstStyle/>
-          <a:p>
-            <a:fld id="{B4008EB6-D09E-4580-8CD6-DDB14511944F}" type="slidenum">
-              <a:rPr lang="en-US" smtClean="0">
-                <a:solidFill>
-                  <a:prstClr val="black"/>
-                </a:solidFill>
-              </a:rPr>
-              <a:pPr/>
-              <a:t>32</a:t>
-            </a:fld>
-            <a:endParaRPr lang="en-US" dirty="0">
-              <a:solidFill>
-                <a:prstClr val="black"/>
-              </a:solidFill>
-            </a:endParaRPr>
-          </a:p>
-        </p:txBody>
-      </p:sp>
-      <p:sp>
-        <p:nvSpPr>
-          <p:cNvPr id="7" name="Header Placeholder 6"/>
-          <p:cNvSpPr>
-            <a:spLocks noGrp="1"/>
-          </p:cNvSpPr>
-          <p:nvPr>
-            <p:ph type="hdr" sz="quarter" idx="13"/>
-          </p:nvPr>
-        </p:nvSpPr>
-        <p:spPr/>
-        <p:txBody>
-          <a:bodyPr/>
-          <a:lstStyle/>
-          <a:p>
-            <a:r>
-              <a:rPr lang="en-US">
-                <a:solidFill>
-                  <a:prstClr val="black"/>
-                </a:solidFill>
-              </a:rPr>
-              <a:t>Build 2014</a:t>
-            </a:r>
-            <a:endParaRPr lang="en-US" dirty="0">
-              <a:solidFill>
-                <a:prstClr val="black"/>
-              </a:solidFill>
-            </a:endParaRPr>
-          </a:p>
-        </p:txBody>
-      </p:sp>
-    </p:spTree>
-    <p:extLst>
-      <p:ext uri="{BB962C8B-B14F-4D97-AF65-F5344CB8AC3E}">
-        <p14:creationId xmlns:p14="http://schemas.microsoft.com/office/powerpoint/2010/main" val="777518763"/>
       </p:ext>
     </p:extLst>
   </p:cSld>
@@ -6018,7 +6024,7 @@
                 </a:solidFill>
               </a:rPr>
               <a:pPr/>
-              <a:t>3/3/2017</a:t>
+              <a:t>8/7/2017</a:t>
             </a:fld>
             <a:endParaRPr lang="en-US" dirty="0">
               <a:solidFill>
@@ -6154,43 +6160,12 @@
       </p:sp>
       <p:sp>
         <p:nvSpPr>
-          <p:cNvPr id="4" name="Header Placeholder 3"/>
-          <p:cNvSpPr>
-            <a:spLocks noGrp="1"/>
-          </p:cNvSpPr>
-          <p:nvPr>
-            <p:ph type="hdr" sz="quarter" idx="10"/>
-          </p:nvPr>
-        </p:nvSpPr>
-        <p:spPr/>
-        <p:txBody>
-          <a:bodyPr/>
-          <a:lstStyle/>
-          <a:p>
-            <a:r>
-              <a:rPr lang="en-US">
-                <a:solidFill>
-                  <a:prstClr val="black"/>
-                </a:solidFill>
-              </a:rPr>
-              <a:t>Build 2014</a:t>
-            </a:r>
-            <a:endParaRPr lang="en-US" dirty="0">
-              <a:solidFill>
-                <a:prstClr val="black"/>
-              </a:solidFill>
-            </a:endParaRPr>
-          </a:p>
-        </p:txBody>
-      </p:sp>
-      <p:sp>
-        <p:nvSpPr>
-          <p:cNvPr id="5" name="Footer Placeholder 4"/>
-          <p:cNvSpPr>
-            <a:spLocks noGrp="1"/>
-          </p:cNvSpPr>
-          <p:nvPr>
-            <p:ph type="ftr" sz="quarter" idx="11"/>
+          <p:cNvPr id="4" name="Footer Placeholder 3"/>
+          <p:cNvSpPr>
+            <a:spLocks noGrp="1"/>
+          </p:cNvSpPr>
+          <p:nvPr>
+            <p:ph type="ftr" sz="quarter" idx="10"/>
           </p:nvPr>
         </p:nvSpPr>
         <p:spPr/>
@@ -6239,12 +6214,12 @@
       </p:sp>
       <p:sp>
         <p:nvSpPr>
-          <p:cNvPr id="6" name="Date Placeholder 5"/>
-          <p:cNvSpPr>
-            <a:spLocks noGrp="1"/>
-          </p:cNvSpPr>
-          <p:nvPr>
-            <p:ph type="dt" idx="12"/>
+          <p:cNvPr id="5" name="Date Placeholder 4"/>
+          <p:cNvSpPr>
+            <a:spLocks noGrp="1"/>
+          </p:cNvSpPr>
+          <p:nvPr>
+            <p:ph type="dt" idx="11"/>
           </p:nvPr>
         </p:nvSpPr>
         <p:spPr/>
@@ -6252,14 +6227,14 @@
           <a:bodyPr/>
           <a:lstStyle/>
           <a:p>
-            <a:fld id="{9F00D60D-1703-4D24-8308-FEE06A50A69C}" type="datetime1">
+            <a:fld id="{FCF63DAE-D37E-4C44-BD81-0E251F1BE300}" type="datetime1">
               <a:rPr lang="en-US" smtClean="0">
                 <a:solidFill>
                   <a:prstClr val="black"/>
                 </a:solidFill>
               </a:rPr>
               <a:pPr/>
-              <a:t>3/3/2017</a:t>
+              <a:t>8/7/2017</a:t>
             </a:fld>
             <a:endParaRPr lang="en-US" dirty="0">
               <a:solidFill>
@@ -6271,12 +6246,12 @@
       </p:sp>
       <p:sp>
         <p:nvSpPr>
-          <p:cNvPr id="7" name="Slide Number Placeholder 6"/>
-          <p:cNvSpPr>
-            <a:spLocks noGrp="1"/>
-          </p:cNvSpPr>
-          <p:nvPr>
-            <p:ph type="sldNum" sz="quarter" idx="13"/>
+          <p:cNvPr id="6" name="Slide Number Placeholder 5"/>
+          <p:cNvSpPr>
+            <a:spLocks noGrp="1"/>
+          </p:cNvSpPr>
+          <p:nvPr>
+            <p:ph type="sldNum" sz="quarter" idx="12"/>
           </p:nvPr>
         </p:nvSpPr>
         <p:spPr/>
@@ -6301,10 +6276,41 @@
           </a:p>
         </p:txBody>
       </p:sp>
+      <p:sp>
+        <p:nvSpPr>
+          <p:cNvPr id="7" name="Header Placeholder 6"/>
+          <p:cNvSpPr>
+            <a:spLocks noGrp="1"/>
+          </p:cNvSpPr>
+          <p:nvPr>
+            <p:ph type="hdr" sz="quarter" idx="13"/>
+          </p:nvPr>
+        </p:nvSpPr>
+        <p:spPr/>
+        <p:txBody>
+          <a:bodyPr/>
+          <a:lstStyle/>
+          <a:p>
+            <a:r>
+              <a:rPr lang="en-US">
+                <a:solidFill>
+                  <a:prstClr val="black"/>
+                </a:solidFill>
+              </a:rPr>
+              <a:t>Build 2014</a:t>
+            </a:r>
+            <a:endParaRPr lang="en-US" dirty="0">
+              <a:solidFill>
+                <a:prstClr val="black"/>
+              </a:solidFill>
+            </a:endParaRPr>
+          </a:p>
+        </p:txBody>
+      </p:sp>
     </p:spTree>
     <p:extLst>
       <p:ext uri="{BB962C8B-B14F-4D97-AF65-F5344CB8AC3E}">
-        <p14:creationId xmlns:p14="http://schemas.microsoft.com/office/powerpoint/2010/main" val="2808479397"/>
+        <p14:creationId xmlns:p14="http://schemas.microsoft.com/office/powerpoint/2010/main" val="777518763"/>
       </p:ext>
     </p:extLst>
   </p:cSld>
@@ -6364,12 +6370,43 @@
       </p:sp>
       <p:sp>
         <p:nvSpPr>
-          <p:cNvPr id="4" name="Footer Placeholder 3"/>
-          <p:cNvSpPr>
-            <a:spLocks noGrp="1"/>
-          </p:cNvSpPr>
-          <p:nvPr>
-            <p:ph type="ftr" sz="quarter" idx="10"/>
+          <p:cNvPr id="4" name="Header Placeholder 3"/>
+          <p:cNvSpPr>
+            <a:spLocks noGrp="1"/>
+          </p:cNvSpPr>
+          <p:nvPr>
+            <p:ph type="hdr" sz="quarter" idx="10"/>
+          </p:nvPr>
+        </p:nvSpPr>
+        <p:spPr/>
+        <p:txBody>
+          <a:bodyPr/>
+          <a:lstStyle/>
+          <a:p>
+            <a:r>
+              <a:rPr lang="en-US">
+                <a:solidFill>
+                  <a:prstClr val="black"/>
+                </a:solidFill>
+              </a:rPr>
+              <a:t>Build 2014</a:t>
+            </a:r>
+            <a:endParaRPr lang="en-US" dirty="0">
+              <a:solidFill>
+                <a:prstClr val="black"/>
+              </a:solidFill>
+            </a:endParaRPr>
+          </a:p>
+        </p:txBody>
+      </p:sp>
+      <p:sp>
+        <p:nvSpPr>
+          <p:cNvPr id="5" name="Footer Placeholder 4"/>
+          <p:cNvSpPr>
+            <a:spLocks noGrp="1"/>
+          </p:cNvSpPr>
+          <p:nvPr>
+            <p:ph type="ftr" sz="quarter" idx="11"/>
           </p:nvPr>
         </p:nvSpPr>
         <p:spPr/>
@@ -6418,12 +6455,12 @@
       </p:sp>
       <p:sp>
         <p:nvSpPr>
-          <p:cNvPr id="5" name="Date Placeholder 4"/>
-          <p:cNvSpPr>
-            <a:spLocks noGrp="1"/>
-          </p:cNvSpPr>
-          <p:nvPr>
-            <p:ph type="dt" idx="11"/>
+          <p:cNvPr id="6" name="Date Placeholder 5"/>
+          <p:cNvSpPr>
+            <a:spLocks noGrp="1"/>
+          </p:cNvSpPr>
+          <p:nvPr>
+            <p:ph type="dt" idx="12"/>
           </p:nvPr>
         </p:nvSpPr>
         <p:spPr/>
@@ -6431,14 +6468,14 @@
           <a:bodyPr/>
           <a:lstStyle/>
           <a:p>
-            <a:fld id="{FCF63DAE-D37E-4C44-BD81-0E251F1BE300}" type="datetime1">
+            <a:fld id="{9F00D60D-1703-4D24-8308-FEE06A50A69C}" type="datetime1">
               <a:rPr lang="en-US" smtClean="0">
                 <a:solidFill>
                   <a:prstClr val="black"/>
                 </a:solidFill>
               </a:rPr>
               <a:pPr/>
-              <a:t>3/3/2017</a:t>
+              <a:t>8/7/2017</a:t>
             </a:fld>
             <a:endParaRPr lang="en-US" dirty="0">
               <a:solidFill>
@@ -6450,12 +6487,12 @@
       </p:sp>
       <p:sp>
         <p:nvSpPr>
-          <p:cNvPr id="6" name="Slide Number Placeholder 5"/>
-          <p:cNvSpPr>
-            <a:spLocks noGrp="1"/>
-          </p:cNvSpPr>
-          <p:nvPr>
-            <p:ph type="sldNum" sz="quarter" idx="12"/>
+          <p:cNvPr id="7" name="Slide Number Placeholder 6"/>
+          <p:cNvSpPr>
+            <a:spLocks noGrp="1"/>
+          </p:cNvSpPr>
+          <p:nvPr>
+            <p:ph type="sldNum" sz="quarter" idx="13"/>
           </p:nvPr>
         </p:nvSpPr>
         <p:spPr/>
@@ -6480,41 +6517,10 @@
           </a:p>
         </p:txBody>
       </p:sp>
-      <p:sp>
-        <p:nvSpPr>
-          <p:cNvPr id="7" name="Header Placeholder 6"/>
-          <p:cNvSpPr>
-            <a:spLocks noGrp="1"/>
-          </p:cNvSpPr>
-          <p:nvPr>
-            <p:ph type="hdr" sz="quarter" idx="13"/>
-          </p:nvPr>
-        </p:nvSpPr>
-        <p:spPr/>
-        <p:txBody>
-          <a:bodyPr/>
-          <a:lstStyle/>
-          <a:p>
-            <a:r>
-              <a:rPr lang="en-US">
-                <a:solidFill>
-                  <a:prstClr val="black"/>
-                </a:solidFill>
-              </a:rPr>
-              <a:t>Build 2014</a:t>
-            </a:r>
-            <a:endParaRPr lang="en-US" dirty="0">
-              <a:solidFill>
-                <a:prstClr val="black"/>
-              </a:solidFill>
-            </a:endParaRPr>
-          </a:p>
-        </p:txBody>
-      </p:sp>
     </p:spTree>
     <p:extLst>
       <p:ext uri="{BB962C8B-B14F-4D97-AF65-F5344CB8AC3E}">
-        <p14:creationId xmlns:p14="http://schemas.microsoft.com/office/powerpoint/2010/main" val="809730823"/>
+        <p14:creationId xmlns:p14="http://schemas.microsoft.com/office/powerpoint/2010/main" val="2808479397"/>
       </p:ext>
     </p:extLst>
   </p:cSld>
@@ -6574,43 +6580,12 @@
       </p:sp>
       <p:sp>
         <p:nvSpPr>
-          <p:cNvPr id="4" name="Header Placeholder 3"/>
-          <p:cNvSpPr>
-            <a:spLocks noGrp="1"/>
-          </p:cNvSpPr>
-          <p:nvPr>
-            <p:ph type="hdr" sz="quarter" idx="10"/>
-          </p:nvPr>
-        </p:nvSpPr>
-        <p:spPr/>
-        <p:txBody>
-          <a:bodyPr/>
-          <a:lstStyle/>
-          <a:p>
-            <a:r>
-              <a:rPr lang="en-US">
-                <a:solidFill>
-                  <a:prstClr val="black"/>
-                </a:solidFill>
-              </a:rPr>
-              <a:t>Build 2014</a:t>
-            </a:r>
-            <a:endParaRPr lang="en-US" dirty="0">
-              <a:solidFill>
-                <a:prstClr val="black"/>
-              </a:solidFill>
-            </a:endParaRPr>
-          </a:p>
-        </p:txBody>
-      </p:sp>
-      <p:sp>
-        <p:nvSpPr>
-          <p:cNvPr id="5" name="Footer Placeholder 4"/>
-          <p:cNvSpPr>
-            <a:spLocks noGrp="1"/>
-          </p:cNvSpPr>
-          <p:nvPr>
-            <p:ph type="ftr" sz="quarter" idx="11"/>
+          <p:cNvPr id="4" name="Footer Placeholder 3"/>
+          <p:cNvSpPr>
+            <a:spLocks noGrp="1"/>
+          </p:cNvSpPr>
+          <p:nvPr>
+            <p:ph type="ftr" sz="quarter" idx="10"/>
           </p:nvPr>
         </p:nvSpPr>
         <p:spPr/>
@@ -6659,12 +6634,12 @@
       </p:sp>
       <p:sp>
         <p:nvSpPr>
-          <p:cNvPr id="6" name="Date Placeholder 5"/>
-          <p:cNvSpPr>
-            <a:spLocks noGrp="1"/>
-          </p:cNvSpPr>
-          <p:nvPr>
-            <p:ph type="dt" idx="12"/>
+          <p:cNvPr id="5" name="Date Placeholder 4"/>
+          <p:cNvSpPr>
+            <a:spLocks noGrp="1"/>
+          </p:cNvSpPr>
+          <p:nvPr>
+            <p:ph type="dt" idx="11"/>
           </p:nvPr>
         </p:nvSpPr>
         <p:spPr/>
@@ -6672,14 +6647,14 @@
           <a:bodyPr/>
           <a:lstStyle/>
           <a:p>
-            <a:fld id="{9F00D60D-1703-4D24-8308-FEE06A50A69C}" type="datetime1">
+            <a:fld id="{FCF63DAE-D37E-4C44-BD81-0E251F1BE300}" type="datetime1">
               <a:rPr lang="en-US" smtClean="0">
                 <a:solidFill>
                   <a:prstClr val="black"/>
                 </a:solidFill>
               </a:rPr>
               <a:pPr/>
-              <a:t>3/3/2017</a:t>
+              <a:t>8/7/2017</a:t>
             </a:fld>
             <a:endParaRPr lang="en-US" dirty="0">
               <a:solidFill>
@@ -6691,12 +6666,12 @@
       </p:sp>
       <p:sp>
         <p:nvSpPr>
-          <p:cNvPr id="7" name="Slide Number Placeholder 6"/>
-          <p:cNvSpPr>
-            <a:spLocks noGrp="1"/>
-          </p:cNvSpPr>
-          <p:nvPr>
-            <p:ph type="sldNum" sz="quarter" idx="13"/>
+          <p:cNvPr id="6" name="Slide Number Placeholder 5"/>
+          <p:cNvSpPr>
+            <a:spLocks noGrp="1"/>
+          </p:cNvSpPr>
+          <p:nvPr>
+            <p:ph type="sldNum" sz="quarter" idx="12"/>
           </p:nvPr>
         </p:nvSpPr>
         <p:spPr/>
@@ -6721,10 +6696,41 @@
           </a:p>
         </p:txBody>
       </p:sp>
+      <p:sp>
+        <p:nvSpPr>
+          <p:cNvPr id="7" name="Header Placeholder 6"/>
+          <p:cNvSpPr>
+            <a:spLocks noGrp="1"/>
+          </p:cNvSpPr>
+          <p:nvPr>
+            <p:ph type="hdr" sz="quarter" idx="13"/>
+          </p:nvPr>
+        </p:nvSpPr>
+        <p:spPr/>
+        <p:txBody>
+          <a:bodyPr/>
+          <a:lstStyle/>
+          <a:p>
+            <a:r>
+              <a:rPr lang="en-US">
+                <a:solidFill>
+                  <a:prstClr val="black"/>
+                </a:solidFill>
+              </a:rPr>
+              <a:t>Build 2014</a:t>
+            </a:r>
+            <a:endParaRPr lang="en-US" dirty="0">
+              <a:solidFill>
+                <a:prstClr val="black"/>
+              </a:solidFill>
+            </a:endParaRPr>
+          </a:p>
+        </p:txBody>
+      </p:sp>
     </p:spTree>
     <p:extLst>
       <p:ext uri="{BB962C8B-B14F-4D97-AF65-F5344CB8AC3E}">
-        <p14:creationId xmlns:p14="http://schemas.microsoft.com/office/powerpoint/2010/main" val="3222582736"/>
+        <p14:creationId xmlns:p14="http://schemas.microsoft.com/office/powerpoint/2010/main" val="809730823"/>
       </p:ext>
     </p:extLst>
   </p:cSld>
@@ -6889,7 +6895,7 @@
                 </a:solidFill>
               </a:rPr>
               <a:pPr/>
-              <a:t>3/3/2017</a:t>
+              <a:t>8/7/2017</a:t>
             </a:fld>
             <a:endParaRPr lang="en-US" dirty="0">
               <a:solidFill>
@@ -6934,7 +6940,7 @@
     </p:spTree>
     <p:extLst>
       <p:ext uri="{BB962C8B-B14F-4D97-AF65-F5344CB8AC3E}">
-        <p14:creationId xmlns:p14="http://schemas.microsoft.com/office/powerpoint/2010/main" val="2882451625"/>
+        <p14:creationId xmlns:p14="http://schemas.microsoft.com/office/powerpoint/2010/main" val="3222582736"/>
       </p:ext>
     </p:extLst>
   </p:cSld>
@@ -6994,12 +7000,43 @@
       </p:sp>
       <p:sp>
         <p:nvSpPr>
-          <p:cNvPr id="4" name="Footer Placeholder 3"/>
-          <p:cNvSpPr>
-            <a:spLocks noGrp="1"/>
-          </p:cNvSpPr>
-          <p:nvPr>
-            <p:ph type="ftr" sz="quarter" idx="10"/>
+          <p:cNvPr id="4" name="Header Placeholder 3"/>
+          <p:cNvSpPr>
+            <a:spLocks noGrp="1"/>
+          </p:cNvSpPr>
+          <p:nvPr>
+            <p:ph type="hdr" sz="quarter" idx="10"/>
+          </p:nvPr>
+        </p:nvSpPr>
+        <p:spPr/>
+        <p:txBody>
+          <a:bodyPr/>
+          <a:lstStyle/>
+          <a:p>
+            <a:r>
+              <a:rPr lang="en-US">
+                <a:solidFill>
+                  <a:prstClr val="black"/>
+                </a:solidFill>
+              </a:rPr>
+              <a:t>Build 2014</a:t>
+            </a:r>
+            <a:endParaRPr lang="en-US" dirty="0">
+              <a:solidFill>
+                <a:prstClr val="black"/>
+              </a:solidFill>
+            </a:endParaRPr>
+          </a:p>
+        </p:txBody>
+      </p:sp>
+      <p:sp>
+        <p:nvSpPr>
+          <p:cNvPr id="5" name="Footer Placeholder 4"/>
+          <p:cNvSpPr>
+            <a:spLocks noGrp="1"/>
+          </p:cNvSpPr>
+          <p:nvPr>
+            <p:ph type="ftr" sz="quarter" idx="11"/>
           </p:nvPr>
         </p:nvSpPr>
         <p:spPr/>
@@ -7048,12 +7085,12 @@
       </p:sp>
       <p:sp>
         <p:nvSpPr>
-          <p:cNvPr id="5" name="Date Placeholder 4"/>
-          <p:cNvSpPr>
-            <a:spLocks noGrp="1"/>
-          </p:cNvSpPr>
-          <p:nvPr>
-            <p:ph type="dt" idx="11"/>
+          <p:cNvPr id="6" name="Date Placeholder 5"/>
+          <p:cNvSpPr>
+            <a:spLocks noGrp="1"/>
+          </p:cNvSpPr>
+          <p:nvPr>
+            <p:ph type="dt" idx="12"/>
           </p:nvPr>
         </p:nvSpPr>
         <p:spPr/>
@@ -7061,14 +7098,14 @@
           <a:bodyPr/>
           <a:lstStyle/>
           <a:p>
-            <a:fld id="{FCF63DAE-D37E-4C44-BD81-0E251F1BE300}" type="datetime1">
+            <a:fld id="{9F00D60D-1703-4D24-8308-FEE06A50A69C}" type="datetime1">
               <a:rPr lang="en-US" smtClean="0">
                 <a:solidFill>
                   <a:prstClr val="black"/>
                 </a:solidFill>
               </a:rPr>
               <a:pPr/>
-              <a:t>3/3/2017</a:t>
+              <a:t>8/7/2017</a:t>
             </a:fld>
             <a:endParaRPr lang="en-US" dirty="0">
               <a:solidFill>
@@ -7080,12 +7117,12 @@
       </p:sp>
       <p:sp>
         <p:nvSpPr>
-          <p:cNvPr id="6" name="Slide Number Placeholder 5"/>
-          <p:cNvSpPr>
-            <a:spLocks noGrp="1"/>
-          </p:cNvSpPr>
-          <p:nvPr>
-            <p:ph type="sldNum" sz="quarter" idx="12"/>
+          <p:cNvPr id="7" name="Slide Number Placeholder 6"/>
+          <p:cNvSpPr>
+            <a:spLocks noGrp="1"/>
+          </p:cNvSpPr>
+          <p:nvPr>
+            <p:ph type="sldNum" sz="quarter" idx="13"/>
           </p:nvPr>
         </p:nvSpPr>
         <p:spPr/>
@@ -7110,41 +7147,10 @@
           </a:p>
         </p:txBody>
       </p:sp>
-      <p:sp>
-        <p:nvSpPr>
-          <p:cNvPr id="7" name="Header Placeholder 6"/>
-          <p:cNvSpPr>
-            <a:spLocks noGrp="1"/>
-          </p:cNvSpPr>
-          <p:nvPr>
-            <p:ph type="hdr" sz="quarter" idx="13"/>
-          </p:nvPr>
-        </p:nvSpPr>
-        <p:spPr/>
-        <p:txBody>
-          <a:bodyPr/>
-          <a:lstStyle/>
-          <a:p>
-            <a:r>
-              <a:rPr lang="en-US">
-                <a:solidFill>
-                  <a:prstClr val="black"/>
-                </a:solidFill>
-              </a:rPr>
-              <a:t>Build 2014</a:t>
-            </a:r>
-            <a:endParaRPr lang="en-US" dirty="0">
-              <a:solidFill>
-                <a:prstClr val="black"/>
-              </a:solidFill>
-            </a:endParaRPr>
-          </a:p>
-        </p:txBody>
-      </p:sp>
     </p:spTree>
     <p:extLst>
       <p:ext uri="{BB962C8B-B14F-4D97-AF65-F5344CB8AC3E}">
-        <p14:creationId xmlns:p14="http://schemas.microsoft.com/office/powerpoint/2010/main" val="230311256"/>
+        <p14:creationId xmlns:p14="http://schemas.microsoft.com/office/powerpoint/2010/main" val="2882451625"/>
       </p:ext>
     </p:extLst>
   </p:cSld>
@@ -7204,43 +7210,12 @@
       </p:sp>
       <p:sp>
         <p:nvSpPr>
-          <p:cNvPr id="4" name="Header Placeholder 3"/>
-          <p:cNvSpPr>
-            <a:spLocks noGrp="1"/>
-          </p:cNvSpPr>
-          <p:nvPr>
-            <p:ph type="hdr" sz="quarter" idx="10"/>
-          </p:nvPr>
-        </p:nvSpPr>
-        <p:spPr/>
-        <p:txBody>
-          <a:bodyPr/>
-          <a:lstStyle/>
-          <a:p>
-            <a:r>
-              <a:rPr lang="en-US">
-                <a:solidFill>
-                  <a:prstClr val="black"/>
-                </a:solidFill>
-              </a:rPr>
-              <a:t>Build 2014</a:t>
-            </a:r>
-            <a:endParaRPr lang="en-US" dirty="0">
-              <a:solidFill>
-                <a:prstClr val="black"/>
-              </a:solidFill>
-            </a:endParaRPr>
-          </a:p>
-        </p:txBody>
-      </p:sp>
-      <p:sp>
-        <p:nvSpPr>
-          <p:cNvPr id="5" name="Footer Placeholder 4"/>
-          <p:cNvSpPr>
-            <a:spLocks noGrp="1"/>
-          </p:cNvSpPr>
-          <p:nvPr>
-            <p:ph type="ftr" sz="quarter" idx="11"/>
+          <p:cNvPr id="4" name="Footer Placeholder 3"/>
+          <p:cNvSpPr>
+            <a:spLocks noGrp="1"/>
+          </p:cNvSpPr>
+          <p:nvPr>
+            <p:ph type="ftr" sz="quarter" idx="10"/>
           </p:nvPr>
         </p:nvSpPr>
         <p:spPr/>
@@ -7289,12 +7264,12 @@
       </p:sp>
       <p:sp>
         <p:nvSpPr>
-          <p:cNvPr id="6" name="Date Placeholder 5"/>
-          <p:cNvSpPr>
-            <a:spLocks noGrp="1"/>
-          </p:cNvSpPr>
-          <p:nvPr>
-            <p:ph type="dt" idx="12"/>
+          <p:cNvPr id="5" name="Date Placeholder 4"/>
+          <p:cNvSpPr>
+            <a:spLocks noGrp="1"/>
+          </p:cNvSpPr>
+          <p:nvPr>
+            <p:ph type="dt" idx="11"/>
           </p:nvPr>
         </p:nvSpPr>
         <p:spPr/>
@@ -7302,14 +7277,14 @@
           <a:bodyPr/>
           <a:lstStyle/>
           <a:p>
-            <a:fld id="{9F00D60D-1703-4D24-8308-FEE06A50A69C}" type="datetime1">
+            <a:fld id="{FCF63DAE-D37E-4C44-BD81-0E251F1BE300}" type="datetime1">
               <a:rPr lang="en-US" smtClean="0">
                 <a:solidFill>
                   <a:prstClr val="black"/>
                 </a:solidFill>
               </a:rPr>
               <a:pPr/>
-              <a:t>3/3/2017</a:t>
+              <a:t>8/7/2017</a:t>
             </a:fld>
             <a:endParaRPr lang="en-US" dirty="0">
               <a:solidFill>
@@ -7321,12 +7296,12 @@
       </p:sp>
       <p:sp>
         <p:nvSpPr>
-          <p:cNvPr id="7" name="Slide Number Placeholder 6"/>
-          <p:cNvSpPr>
-            <a:spLocks noGrp="1"/>
-          </p:cNvSpPr>
-          <p:nvPr>
-            <p:ph type="sldNum" sz="quarter" idx="13"/>
+          <p:cNvPr id="6" name="Slide Number Placeholder 5"/>
+          <p:cNvSpPr>
+            <a:spLocks noGrp="1"/>
+          </p:cNvSpPr>
+          <p:nvPr>
+            <p:ph type="sldNum" sz="quarter" idx="12"/>
           </p:nvPr>
         </p:nvSpPr>
         <p:spPr/>
@@ -7351,10 +7326,41 @@
           </a:p>
         </p:txBody>
       </p:sp>
+      <p:sp>
+        <p:nvSpPr>
+          <p:cNvPr id="7" name="Header Placeholder 6"/>
+          <p:cNvSpPr>
+            <a:spLocks noGrp="1"/>
+          </p:cNvSpPr>
+          <p:nvPr>
+            <p:ph type="hdr" sz="quarter" idx="13"/>
+          </p:nvPr>
+        </p:nvSpPr>
+        <p:spPr/>
+        <p:txBody>
+          <a:bodyPr/>
+          <a:lstStyle/>
+          <a:p>
+            <a:r>
+              <a:rPr lang="en-US">
+                <a:solidFill>
+                  <a:prstClr val="black"/>
+                </a:solidFill>
+              </a:rPr>
+              <a:t>Build 2014</a:t>
+            </a:r>
+            <a:endParaRPr lang="en-US" dirty="0">
+              <a:solidFill>
+                <a:prstClr val="black"/>
+              </a:solidFill>
+            </a:endParaRPr>
+          </a:p>
+        </p:txBody>
+      </p:sp>
     </p:spTree>
     <p:extLst>
       <p:ext uri="{BB962C8B-B14F-4D97-AF65-F5344CB8AC3E}">
-        <p14:creationId xmlns:p14="http://schemas.microsoft.com/office/powerpoint/2010/main" val="3133682360"/>
+        <p14:creationId xmlns:p14="http://schemas.microsoft.com/office/powerpoint/2010/main" val="230311256"/>
       </p:ext>
     </p:extLst>
   </p:cSld>
@@ -7519,7 +7525,7 @@
                 </a:solidFill>
               </a:rPr>
               <a:pPr/>
-              <a:t>3/3/2017</a:t>
+              <a:t>8/7/2017</a:t>
             </a:fld>
             <a:endParaRPr lang="en-US" dirty="0">
               <a:solidFill>
@@ -7564,7 +7570,7 @@
     </p:spTree>
     <p:extLst>
       <p:ext uri="{BB962C8B-B14F-4D97-AF65-F5344CB8AC3E}">
-        <p14:creationId xmlns:p14="http://schemas.microsoft.com/office/powerpoint/2010/main" val="3662995644"/>
+        <p14:creationId xmlns:p14="http://schemas.microsoft.com/office/powerpoint/2010/main" val="3133682360"/>
       </p:ext>
     </p:extLst>
   </p:cSld>
@@ -7729,7 +7735,7 @@
                 </a:solidFill>
               </a:rPr>
               <a:pPr/>
-              <a:t>3/3/2017</a:t>
+              <a:t>8/7/2017</a:t>
             </a:fld>
             <a:endParaRPr lang="en-US" dirty="0">
               <a:solidFill>
@@ -7774,7 +7780,7 @@
     </p:spTree>
     <p:extLst>
       <p:ext uri="{BB962C8B-B14F-4D97-AF65-F5344CB8AC3E}">
-        <p14:creationId xmlns:p14="http://schemas.microsoft.com/office/powerpoint/2010/main" val="2906120500"/>
+        <p14:creationId xmlns:p14="http://schemas.microsoft.com/office/powerpoint/2010/main" val="3662995644"/>
       </p:ext>
     </p:extLst>
   </p:cSld>
@@ -7834,12 +7840,43 @@
       </p:sp>
       <p:sp>
         <p:nvSpPr>
-          <p:cNvPr id="4" name="Footer Placeholder 3"/>
-          <p:cNvSpPr>
-            <a:spLocks noGrp="1"/>
-          </p:cNvSpPr>
-          <p:nvPr>
-            <p:ph type="ftr" sz="quarter" idx="10"/>
+          <p:cNvPr id="4" name="Header Placeholder 3"/>
+          <p:cNvSpPr>
+            <a:spLocks noGrp="1"/>
+          </p:cNvSpPr>
+          <p:nvPr>
+            <p:ph type="hdr" sz="quarter" idx="10"/>
+          </p:nvPr>
+        </p:nvSpPr>
+        <p:spPr/>
+        <p:txBody>
+          <a:bodyPr/>
+          <a:lstStyle/>
+          <a:p>
+            <a:r>
+              <a:rPr lang="en-US">
+                <a:solidFill>
+                  <a:prstClr val="black"/>
+                </a:solidFill>
+              </a:rPr>
+              <a:t>Build 2014</a:t>
+            </a:r>
+            <a:endParaRPr lang="en-US" dirty="0">
+              <a:solidFill>
+                <a:prstClr val="black"/>
+              </a:solidFill>
+            </a:endParaRPr>
+          </a:p>
+        </p:txBody>
+      </p:sp>
+      <p:sp>
+        <p:nvSpPr>
+          <p:cNvPr id="5" name="Footer Placeholder 4"/>
+          <p:cNvSpPr>
+            <a:spLocks noGrp="1"/>
+          </p:cNvSpPr>
+          <p:nvPr>
+            <p:ph type="ftr" sz="quarter" idx="11"/>
           </p:nvPr>
         </p:nvSpPr>
         <p:spPr/>
@@ -7888,12 +7925,12 @@
       </p:sp>
       <p:sp>
         <p:nvSpPr>
-          <p:cNvPr id="5" name="Date Placeholder 4"/>
-          <p:cNvSpPr>
-            <a:spLocks noGrp="1"/>
-          </p:cNvSpPr>
-          <p:nvPr>
-            <p:ph type="dt" idx="11"/>
+          <p:cNvPr id="6" name="Date Placeholder 5"/>
+          <p:cNvSpPr>
+            <a:spLocks noGrp="1"/>
+          </p:cNvSpPr>
+          <p:nvPr>
+            <p:ph type="dt" idx="12"/>
           </p:nvPr>
         </p:nvSpPr>
         <p:spPr/>
@@ -7901,14 +7938,14 @@
           <a:bodyPr/>
           <a:lstStyle/>
           <a:p>
-            <a:fld id="{FCF63DAE-D37E-4C44-BD81-0E251F1BE300}" type="datetime1">
+            <a:fld id="{9F00D60D-1703-4D24-8308-FEE06A50A69C}" type="datetime1">
               <a:rPr lang="en-US" smtClean="0">
                 <a:solidFill>
                   <a:prstClr val="black"/>
                 </a:solidFill>
               </a:rPr>
               <a:pPr/>
-              <a:t>3/3/2017</a:t>
+              <a:t>8/7/2017</a:t>
             </a:fld>
             <a:endParaRPr lang="en-US" dirty="0">
               <a:solidFill>
@@ -7920,12 +7957,12 @@
       </p:sp>
       <p:sp>
         <p:nvSpPr>
-          <p:cNvPr id="6" name="Slide Number Placeholder 5"/>
-          <p:cNvSpPr>
-            <a:spLocks noGrp="1"/>
-          </p:cNvSpPr>
-          <p:nvPr>
-            <p:ph type="sldNum" sz="quarter" idx="12"/>
+          <p:cNvPr id="7" name="Slide Number Placeholder 6"/>
+          <p:cNvSpPr>
+            <a:spLocks noGrp="1"/>
+          </p:cNvSpPr>
+          <p:nvPr>
+            <p:ph type="sldNum" sz="quarter" idx="13"/>
           </p:nvPr>
         </p:nvSpPr>
         <p:spPr/>
@@ -7950,41 +7987,10 @@
           </a:p>
         </p:txBody>
       </p:sp>
-      <p:sp>
-        <p:nvSpPr>
-          <p:cNvPr id="7" name="Header Placeholder 6"/>
-          <p:cNvSpPr>
-            <a:spLocks noGrp="1"/>
-          </p:cNvSpPr>
-          <p:nvPr>
-            <p:ph type="hdr" sz="quarter" idx="13"/>
-          </p:nvPr>
-        </p:nvSpPr>
-        <p:spPr/>
-        <p:txBody>
-          <a:bodyPr/>
-          <a:lstStyle/>
-          <a:p>
-            <a:r>
-              <a:rPr lang="en-US">
-                <a:solidFill>
-                  <a:prstClr val="black"/>
-                </a:solidFill>
-              </a:rPr>
-              <a:t>Build 2014</a:t>
-            </a:r>
-            <a:endParaRPr lang="en-US" dirty="0">
-              <a:solidFill>
-                <a:prstClr val="black"/>
-              </a:solidFill>
-            </a:endParaRPr>
-          </a:p>
-        </p:txBody>
-      </p:sp>
     </p:spTree>
     <p:extLst>
       <p:ext uri="{BB962C8B-B14F-4D97-AF65-F5344CB8AC3E}">
-        <p14:creationId xmlns:p14="http://schemas.microsoft.com/office/powerpoint/2010/main" val="472659781"/>
+        <p14:creationId xmlns:p14="http://schemas.microsoft.com/office/powerpoint/2010/main" val="2906120500"/>
       </p:ext>
     </p:extLst>
   </p:cSld>
@@ -8044,43 +8050,12 @@
       </p:sp>
       <p:sp>
         <p:nvSpPr>
-          <p:cNvPr id="4" name="Header Placeholder 3"/>
-          <p:cNvSpPr>
-            <a:spLocks noGrp="1"/>
-          </p:cNvSpPr>
-          <p:nvPr>
-            <p:ph type="hdr" sz="quarter" idx="10"/>
-          </p:nvPr>
-        </p:nvSpPr>
-        <p:spPr/>
-        <p:txBody>
-          <a:bodyPr/>
-          <a:lstStyle/>
-          <a:p>
-            <a:r>
-              <a:rPr lang="en-US">
-                <a:solidFill>
-                  <a:prstClr val="black"/>
-                </a:solidFill>
-              </a:rPr>
-              <a:t>Build 2014</a:t>
-            </a:r>
-            <a:endParaRPr lang="en-US" dirty="0">
-              <a:solidFill>
-                <a:prstClr val="black"/>
-              </a:solidFill>
-            </a:endParaRPr>
-          </a:p>
-        </p:txBody>
-      </p:sp>
-      <p:sp>
-        <p:nvSpPr>
-          <p:cNvPr id="5" name="Footer Placeholder 4"/>
-          <p:cNvSpPr>
-            <a:spLocks noGrp="1"/>
-          </p:cNvSpPr>
-          <p:nvPr>
-            <p:ph type="ftr" sz="quarter" idx="11"/>
+          <p:cNvPr id="4" name="Footer Placeholder 3"/>
+          <p:cNvSpPr>
+            <a:spLocks noGrp="1"/>
+          </p:cNvSpPr>
+          <p:nvPr>
+            <p:ph type="ftr" sz="quarter" idx="10"/>
           </p:nvPr>
         </p:nvSpPr>
         <p:spPr/>
@@ -8129,12 +8104,12 @@
       </p:sp>
       <p:sp>
         <p:nvSpPr>
-          <p:cNvPr id="6" name="Date Placeholder 5"/>
-          <p:cNvSpPr>
-            <a:spLocks noGrp="1"/>
-          </p:cNvSpPr>
-          <p:nvPr>
-            <p:ph type="dt" idx="12"/>
+          <p:cNvPr id="5" name="Date Placeholder 4"/>
+          <p:cNvSpPr>
+            <a:spLocks noGrp="1"/>
+          </p:cNvSpPr>
+          <p:nvPr>
+            <p:ph type="dt" idx="11"/>
           </p:nvPr>
         </p:nvSpPr>
         <p:spPr/>
@@ -8142,14 +8117,14 @@
           <a:bodyPr/>
           <a:lstStyle/>
           <a:p>
-            <a:fld id="{9F00D60D-1703-4D24-8308-FEE06A50A69C}" type="datetime1">
+            <a:fld id="{FCF63DAE-D37E-4C44-BD81-0E251F1BE300}" type="datetime1">
               <a:rPr lang="en-US" smtClean="0">
                 <a:solidFill>
                   <a:prstClr val="black"/>
                 </a:solidFill>
               </a:rPr>
               <a:pPr/>
-              <a:t>3/3/2017</a:t>
+              <a:t>8/7/2017</a:t>
             </a:fld>
             <a:endParaRPr lang="en-US" dirty="0">
               <a:solidFill>
@@ -8161,12 +8136,12 @@
       </p:sp>
       <p:sp>
         <p:nvSpPr>
-          <p:cNvPr id="7" name="Slide Number Placeholder 6"/>
-          <p:cNvSpPr>
-            <a:spLocks noGrp="1"/>
-          </p:cNvSpPr>
-          <p:nvPr>
-            <p:ph type="sldNum" sz="quarter" idx="13"/>
+          <p:cNvPr id="6" name="Slide Number Placeholder 5"/>
+          <p:cNvSpPr>
+            <a:spLocks noGrp="1"/>
+          </p:cNvSpPr>
+          <p:nvPr>
+            <p:ph type="sldNum" sz="quarter" idx="12"/>
           </p:nvPr>
         </p:nvSpPr>
         <p:spPr/>
@@ -8191,10 +8166,41 @@
           </a:p>
         </p:txBody>
       </p:sp>
+      <p:sp>
+        <p:nvSpPr>
+          <p:cNvPr id="7" name="Header Placeholder 6"/>
+          <p:cNvSpPr>
+            <a:spLocks noGrp="1"/>
+          </p:cNvSpPr>
+          <p:nvPr>
+            <p:ph type="hdr" sz="quarter" idx="13"/>
+          </p:nvPr>
+        </p:nvSpPr>
+        <p:spPr/>
+        <p:txBody>
+          <a:bodyPr/>
+          <a:lstStyle/>
+          <a:p>
+            <a:r>
+              <a:rPr lang="en-US">
+                <a:solidFill>
+                  <a:prstClr val="black"/>
+                </a:solidFill>
+              </a:rPr>
+              <a:t>Build 2014</a:t>
+            </a:r>
+            <a:endParaRPr lang="en-US" dirty="0">
+              <a:solidFill>
+                <a:prstClr val="black"/>
+              </a:solidFill>
+            </a:endParaRPr>
+          </a:p>
+        </p:txBody>
+      </p:sp>
     </p:spTree>
     <p:extLst>
       <p:ext uri="{BB962C8B-B14F-4D97-AF65-F5344CB8AC3E}">
-        <p14:creationId xmlns:p14="http://schemas.microsoft.com/office/powerpoint/2010/main" val="2639183544"/>
+        <p14:creationId xmlns:p14="http://schemas.microsoft.com/office/powerpoint/2010/main" val="472659781"/>
       </p:ext>
     </p:extLst>
   </p:cSld>
@@ -8359,7 +8365,7 @@
                 </a:solidFill>
               </a:rPr>
               <a:pPr/>
-              <a:t>3/3/2017</a:t>
+              <a:t>8/7/2017</a:t>
             </a:fld>
             <a:endParaRPr lang="en-US" dirty="0">
               <a:solidFill>
@@ -8464,12 +8470,43 @@
       </p:sp>
       <p:sp>
         <p:nvSpPr>
-          <p:cNvPr id="4" name="Footer Placeholder 3"/>
-          <p:cNvSpPr>
-            <a:spLocks noGrp="1"/>
-          </p:cNvSpPr>
-          <p:nvPr>
-            <p:ph type="ftr" sz="quarter" idx="10"/>
+          <p:cNvPr id="4" name="Header Placeholder 3"/>
+          <p:cNvSpPr>
+            <a:spLocks noGrp="1"/>
+          </p:cNvSpPr>
+          <p:nvPr>
+            <p:ph type="hdr" sz="quarter" idx="10"/>
+          </p:nvPr>
+        </p:nvSpPr>
+        <p:spPr/>
+        <p:txBody>
+          <a:bodyPr/>
+          <a:lstStyle/>
+          <a:p>
+            <a:r>
+              <a:rPr lang="en-US">
+                <a:solidFill>
+                  <a:prstClr val="black"/>
+                </a:solidFill>
+              </a:rPr>
+              <a:t>Build 2014</a:t>
+            </a:r>
+            <a:endParaRPr lang="en-US" dirty="0">
+              <a:solidFill>
+                <a:prstClr val="black"/>
+              </a:solidFill>
+            </a:endParaRPr>
+          </a:p>
+        </p:txBody>
+      </p:sp>
+      <p:sp>
+        <p:nvSpPr>
+          <p:cNvPr id="5" name="Footer Placeholder 4"/>
+          <p:cNvSpPr>
+            <a:spLocks noGrp="1"/>
+          </p:cNvSpPr>
+          <p:nvPr>
+            <p:ph type="ftr" sz="quarter" idx="11"/>
           </p:nvPr>
         </p:nvSpPr>
         <p:spPr/>
@@ -8518,12 +8555,12 @@
       </p:sp>
       <p:sp>
         <p:nvSpPr>
-          <p:cNvPr id="5" name="Date Placeholder 4"/>
-          <p:cNvSpPr>
-            <a:spLocks noGrp="1"/>
-          </p:cNvSpPr>
-          <p:nvPr>
-            <p:ph type="dt" idx="11"/>
+          <p:cNvPr id="6" name="Date Placeholder 5"/>
+          <p:cNvSpPr>
+            <a:spLocks noGrp="1"/>
+          </p:cNvSpPr>
+          <p:nvPr>
+            <p:ph type="dt" idx="12"/>
           </p:nvPr>
         </p:nvSpPr>
         <p:spPr/>
@@ -8531,14 +8568,14 @@
           <a:bodyPr/>
           <a:lstStyle/>
           <a:p>
-            <a:fld id="{FCF63DAE-D37E-4C44-BD81-0E251F1BE300}" type="datetime1">
+            <a:fld id="{9F00D60D-1703-4D24-8308-FEE06A50A69C}" type="datetime1">
               <a:rPr lang="en-US" smtClean="0">
                 <a:solidFill>
                   <a:prstClr val="black"/>
                 </a:solidFill>
               </a:rPr>
               <a:pPr/>
-              <a:t>3/3/2017</a:t>
+              <a:t>8/7/2017</a:t>
             </a:fld>
             <a:endParaRPr lang="en-US" dirty="0">
               <a:solidFill>
@@ -8550,12 +8587,12 @@
       </p:sp>
       <p:sp>
         <p:nvSpPr>
-          <p:cNvPr id="6" name="Slide Number Placeholder 5"/>
-          <p:cNvSpPr>
-            <a:spLocks noGrp="1"/>
-          </p:cNvSpPr>
-          <p:nvPr>
-            <p:ph type="sldNum" sz="quarter" idx="12"/>
+          <p:cNvPr id="7" name="Slide Number Placeholder 6"/>
+          <p:cNvSpPr>
+            <a:spLocks noGrp="1"/>
+          </p:cNvSpPr>
+          <p:nvPr>
+            <p:ph type="sldNum" sz="quarter" idx="13"/>
           </p:nvPr>
         </p:nvSpPr>
         <p:spPr/>
@@ -8580,41 +8617,10 @@
           </a:p>
         </p:txBody>
       </p:sp>
-      <p:sp>
-        <p:nvSpPr>
-          <p:cNvPr id="7" name="Header Placeholder 6"/>
-          <p:cNvSpPr>
-            <a:spLocks noGrp="1"/>
-          </p:cNvSpPr>
-          <p:nvPr>
-            <p:ph type="hdr" sz="quarter" idx="13"/>
-          </p:nvPr>
-        </p:nvSpPr>
-        <p:spPr/>
-        <p:txBody>
-          <a:bodyPr/>
-          <a:lstStyle/>
-          <a:p>
-            <a:r>
-              <a:rPr lang="en-US">
-                <a:solidFill>
-                  <a:prstClr val="black"/>
-                </a:solidFill>
-              </a:rPr>
-              <a:t>Build 2014</a:t>
-            </a:r>
-            <a:endParaRPr lang="en-US" dirty="0">
-              <a:solidFill>
-                <a:prstClr val="black"/>
-              </a:solidFill>
-            </a:endParaRPr>
-          </a:p>
-        </p:txBody>
-      </p:sp>
     </p:spTree>
     <p:extLst>
       <p:ext uri="{BB962C8B-B14F-4D97-AF65-F5344CB8AC3E}">
-        <p14:creationId xmlns:p14="http://schemas.microsoft.com/office/powerpoint/2010/main" val="585965803"/>
+        <p14:creationId xmlns:p14="http://schemas.microsoft.com/office/powerpoint/2010/main" val="2639183544"/>
       </p:ext>
     </p:extLst>
   </p:cSld>
@@ -8674,43 +8680,12 @@
       </p:sp>
       <p:sp>
         <p:nvSpPr>
-          <p:cNvPr id="4" name="Header Placeholder 3"/>
-          <p:cNvSpPr>
-            <a:spLocks noGrp="1"/>
-          </p:cNvSpPr>
-          <p:nvPr>
-            <p:ph type="hdr" sz="quarter" idx="10"/>
-          </p:nvPr>
-        </p:nvSpPr>
-        <p:spPr/>
-        <p:txBody>
-          <a:bodyPr/>
-          <a:lstStyle/>
-          <a:p>
-            <a:r>
-              <a:rPr lang="en-US">
-                <a:solidFill>
-                  <a:prstClr val="black"/>
-                </a:solidFill>
-              </a:rPr>
-              <a:t>Build 2014</a:t>
-            </a:r>
-            <a:endParaRPr lang="en-US" dirty="0">
-              <a:solidFill>
-                <a:prstClr val="black"/>
-              </a:solidFill>
-            </a:endParaRPr>
-          </a:p>
-        </p:txBody>
-      </p:sp>
-      <p:sp>
-        <p:nvSpPr>
-          <p:cNvPr id="5" name="Footer Placeholder 4"/>
-          <p:cNvSpPr>
-            <a:spLocks noGrp="1"/>
-          </p:cNvSpPr>
-          <p:nvPr>
-            <p:ph type="ftr" sz="quarter" idx="11"/>
+          <p:cNvPr id="4" name="Footer Placeholder 3"/>
+          <p:cNvSpPr>
+            <a:spLocks noGrp="1"/>
+          </p:cNvSpPr>
+          <p:nvPr>
+            <p:ph type="ftr" sz="quarter" idx="10"/>
           </p:nvPr>
         </p:nvSpPr>
         <p:spPr/>
@@ -8759,12 +8734,12 @@
       </p:sp>
       <p:sp>
         <p:nvSpPr>
-          <p:cNvPr id="6" name="Date Placeholder 5"/>
-          <p:cNvSpPr>
-            <a:spLocks noGrp="1"/>
-          </p:cNvSpPr>
-          <p:nvPr>
-            <p:ph type="dt" idx="12"/>
+          <p:cNvPr id="5" name="Date Placeholder 4"/>
+          <p:cNvSpPr>
+            <a:spLocks noGrp="1"/>
+          </p:cNvSpPr>
+          <p:nvPr>
+            <p:ph type="dt" idx="11"/>
           </p:nvPr>
         </p:nvSpPr>
         <p:spPr/>
@@ -8772,14 +8747,14 @@
           <a:bodyPr/>
           <a:lstStyle/>
           <a:p>
-            <a:fld id="{9F00D60D-1703-4D24-8308-FEE06A50A69C}" type="datetime1">
+            <a:fld id="{FCF63DAE-D37E-4C44-BD81-0E251F1BE300}" type="datetime1">
               <a:rPr lang="en-US" smtClean="0">
                 <a:solidFill>
                   <a:prstClr val="black"/>
                 </a:solidFill>
               </a:rPr>
               <a:pPr/>
-              <a:t>3/3/2017</a:t>
+              <a:t>8/7/2017</a:t>
             </a:fld>
             <a:endParaRPr lang="en-US" dirty="0">
               <a:solidFill>
@@ -8791,12 +8766,12 @@
       </p:sp>
       <p:sp>
         <p:nvSpPr>
-          <p:cNvPr id="7" name="Slide Number Placeholder 6"/>
-          <p:cNvSpPr>
-            <a:spLocks noGrp="1"/>
-          </p:cNvSpPr>
-          <p:nvPr>
-            <p:ph type="sldNum" sz="quarter" idx="13"/>
+          <p:cNvPr id="6" name="Slide Number Placeholder 5"/>
+          <p:cNvSpPr>
+            <a:spLocks noGrp="1"/>
+          </p:cNvSpPr>
+          <p:nvPr>
+            <p:ph type="sldNum" sz="quarter" idx="12"/>
           </p:nvPr>
         </p:nvSpPr>
         <p:spPr/>
@@ -8812,6 +8787,247 @@
               </a:rPr>
               <a:pPr/>
               <a:t>44</a:t>
+            </a:fld>
+            <a:endParaRPr lang="en-US" dirty="0">
+              <a:solidFill>
+                <a:prstClr val="black"/>
+              </a:solidFill>
+            </a:endParaRPr>
+          </a:p>
+        </p:txBody>
+      </p:sp>
+      <p:sp>
+        <p:nvSpPr>
+          <p:cNvPr id="7" name="Header Placeholder 6"/>
+          <p:cNvSpPr>
+            <a:spLocks noGrp="1"/>
+          </p:cNvSpPr>
+          <p:nvPr>
+            <p:ph type="hdr" sz="quarter" idx="13"/>
+          </p:nvPr>
+        </p:nvSpPr>
+        <p:spPr/>
+        <p:txBody>
+          <a:bodyPr/>
+          <a:lstStyle/>
+          <a:p>
+            <a:r>
+              <a:rPr lang="en-US">
+                <a:solidFill>
+                  <a:prstClr val="black"/>
+                </a:solidFill>
+              </a:rPr>
+              <a:t>Build 2014</a:t>
+            </a:r>
+            <a:endParaRPr lang="en-US" dirty="0">
+              <a:solidFill>
+                <a:prstClr val="black"/>
+              </a:solidFill>
+            </a:endParaRPr>
+          </a:p>
+        </p:txBody>
+      </p:sp>
+    </p:spTree>
+    <p:extLst>
+      <p:ext uri="{BB962C8B-B14F-4D97-AF65-F5344CB8AC3E}">
+        <p14:creationId xmlns:p14="http://schemas.microsoft.com/office/powerpoint/2010/main" val="585965803"/>
+      </p:ext>
+    </p:extLst>
+  </p:cSld>
+  <p:clrMapOvr>
+    <a:masterClrMapping/>
+  </p:clrMapOvr>
+</p:notes>
+</file>
+
+<file path=ppt/notesSlides/notesSlide42.xml><?xml version="1.0" encoding="utf-8"?>
+<p:notes xmlns:a="http://schemas.openxmlformats.org/drawingml/2006/main" xmlns:r="http://schemas.openxmlformats.org/officeDocument/2006/relationships" xmlns:p="http://schemas.openxmlformats.org/presentationml/2006/main">
+  <p:cSld>
+    <p:spTree>
+      <p:nvGrpSpPr>
+        <p:cNvPr id="1" name=""/>
+        <p:cNvGrpSpPr/>
+        <p:nvPr/>
+      </p:nvGrpSpPr>
+      <p:grpSpPr>
+        <a:xfrm>
+          <a:off x="0" y="0"/>
+          <a:ext cx="0" cy="0"/>
+          <a:chOff x="0" y="0"/>
+          <a:chExt cx="0" cy="0"/>
+        </a:xfrm>
+      </p:grpSpPr>
+      <p:sp>
+        <p:nvSpPr>
+          <p:cNvPr id="2" name="Slide Image Placeholder 1"/>
+          <p:cNvSpPr>
+            <a:spLocks noGrp="1" noRot="1" noChangeAspect="1"/>
+          </p:cNvSpPr>
+          <p:nvPr>
+            <p:ph type="sldImg"/>
+          </p:nvPr>
+        </p:nvSpPr>
+        <p:spPr/>
+      </p:sp>
+      <p:sp>
+        <p:nvSpPr>
+          <p:cNvPr id="3" name="Notes Placeholder 2"/>
+          <p:cNvSpPr>
+            <a:spLocks noGrp="1"/>
+          </p:cNvSpPr>
+          <p:nvPr>
+            <p:ph type="body" idx="1"/>
+          </p:nvPr>
+        </p:nvSpPr>
+        <p:spPr/>
+        <p:txBody>
+          <a:bodyPr/>
+          <a:lstStyle/>
+          <a:p>
+            <a:endParaRPr lang="en-US"/>
+          </a:p>
+        </p:txBody>
+      </p:sp>
+      <p:sp>
+        <p:nvSpPr>
+          <p:cNvPr id="4" name="Header Placeholder 3"/>
+          <p:cNvSpPr>
+            <a:spLocks noGrp="1"/>
+          </p:cNvSpPr>
+          <p:nvPr>
+            <p:ph type="hdr" sz="quarter" idx="10"/>
+          </p:nvPr>
+        </p:nvSpPr>
+        <p:spPr/>
+        <p:txBody>
+          <a:bodyPr/>
+          <a:lstStyle/>
+          <a:p>
+            <a:r>
+              <a:rPr lang="en-US">
+                <a:solidFill>
+                  <a:prstClr val="black"/>
+                </a:solidFill>
+              </a:rPr>
+              <a:t>Build 2014</a:t>
+            </a:r>
+            <a:endParaRPr lang="en-US" dirty="0">
+              <a:solidFill>
+                <a:prstClr val="black"/>
+              </a:solidFill>
+            </a:endParaRPr>
+          </a:p>
+        </p:txBody>
+      </p:sp>
+      <p:sp>
+        <p:nvSpPr>
+          <p:cNvPr id="5" name="Footer Placeholder 4"/>
+          <p:cNvSpPr>
+            <a:spLocks noGrp="1"/>
+          </p:cNvSpPr>
+          <p:nvPr>
+            <p:ph type="ftr" sz="quarter" idx="11"/>
+          </p:nvPr>
+        </p:nvSpPr>
+        <p:spPr/>
+        <p:txBody>
+          <a:bodyPr/>
+          <a:lstStyle/>
+          <a:p>
+            <a:pPr defTabSz="914099" eaLnBrk="0" hangingPunct="0"/>
+            <a:r>
+              <a:rPr lang="en-US" sz="400">
+                <a:gradFill>
+                  <a:gsLst>
+                    <a:gs pos="0">
+                      <a:prstClr val="black"/>
+                    </a:gs>
+                    <a:gs pos="100000">
+                      <a:prstClr val="black"/>
+                    </a:gs>
+                  </a:gsLst>
+                  <a:lin ang="5400000" scaled="0"/>
+                </a:gradFill>
+                <a:latin typeface="Segoe UI" pitchFamily="34" charset="0"/>
+                <a:ea typeface="Segoe UI" pitchFamily="34" charset="0"/>
+                <a:cs typeface="Segoe UI" pitchFamily="34" charset="0"/>
+              </a:rPr>
+              <a:t>© 2014 Microsoft Corporation. All rights reserved. Microsoft, Windows, and other product names are or may be registered trademarks and/or trademarks in the U.S. and/or other countries. The information herein is for informational purposes only and represents the current view of Microsoft Corporation as of the date of this presentation.  Because Microsoft must respond to changing market conditions, it should not be interpreted to be a commitment on the part of Microsoft, and Microsoft cannot guarantee the accuracy of any information provided after the date of this presentation.  MICROSOFT MAKES NO WARRANTIES, EXPRESS, IMPLIED OR STATUTORY, AS TO THE INFORMATION IN THIS PRESENTATION.</a:t>
+            </a:r>
+            <a:endParaRPr lang="en-US" sz="400" dirty="0">
+              <a:gradFill>
+                <a:gsLst>
+                  <a:gs pos="0">
+                    <a:prstClr val="black"/>
+                  </a:gs>
+                  <a:gs pos="100000">
+                    <a:prstClr val="black"/>
+                  </a:gs>
+                </a:gsLst>
+                <a:lin ang="5400000" scaled="0"/>
+              </a:gradFill>
+              <a:latin typeface="Segoe UI" pitchFamily="34" charset="0"/>
+              <a:ea typeface="Segoe UI" pitchFamily="34" charset="0"/>
+              <a:cs typeface="Segoe UI" pitchFamily="34" charset="0"/>
+            </a:endParaRPr>
+          </a:p>
+        </p:txBody>
+      </p:sp>
+      <p:sp>
+        <p:nvSpPr>
+          <p:cNvPr id="6" name="Date Placeholder 5"/>
+          <p:cNvSpPr>
+            <a:spLocks noGrp="1"/>
+          </p:cNvSpPr>
+          <p:nvPr>
+            <p:ph type="dt" idx="12"/>
+          </p:nvPr>
+        </p:nvSpPr>
+        <p:spPr/>
+        <p:txBody>
+          <a:bodyPr/>
+          <a:lstStyle/>
+          <a:p>
+            <a:fld id="{9F00D60D-1703-4D24-8308-FEE06A50A69C}" type="datetime1">
+              <a:rPr lang="en-US" smtClean="0">
+                <a:solidFill>
+                  <a:prstClr val="black"/>
+                </a:solidFill>
+              </a:rPr>
+              <a:pPr/>
+              <a:t>8/7/2017</a:t>
+            </a:fld>
+            <a:endParaRPr lang="en-US" dirty="0">
+              <a:solidFill>
+                <a:prstClr val="black"/>
+              </a:solidFill>
+            </a:endParaRPr>
+          </a:p>
+        </p:txBody>
+      </p:sp>
+      <p:sp>
+        <p:nvSpPr>
+          <p:cNvPr id="7" name="Slide Number Placeholder 6"/>
+          <p:cNvSpPr>
+            <a:spLocks noGrp="1"/>
+          </p:cNvSpPr>
+          <p:nvPr>
+            <p:ph type="sldNum" sz="quarter" idx="13"/>
+          </p:nvPr>
+        </p:nvSpPr>
+        <p:spPr/>
+        <p:txBody>
+          <a:bodyPr/>
+          <a:lstStyle/>
+          <a:p>
+            <a:fld id="{B4008EB6-D09E-4580-8CD6-DDB14511944F}" type="slidenum">
+              <a:rPr lang="en-US" smtClean="0">
+                <a:solidFill>
+                  <a:prstClr val="black"/>
+                </a:solidFill>
+              </a:rPr>
+              <a:pPr/>
+              <a:t>45</a:t>
             </a:fld>
             <a:endParaRPr lang="en-US" dirty="0">
               <a:solidFill>
@@ -8989,7 +9205,7 @@
                 </a:solidFill>
               </a:rPr>
               <a:pPr/>
-              <a:t>3/3/2017</a:t>
+              <a:t>8/7/2017</a:t>
             </a:fld>
             <a:endParaRPr lang="en-US" dirty="0">
               <a:solidFill>
@@ -9199,7 +9415,7 @@
                 </a:solidFill>
               </a:rPr>
               <a:pPr/>
-              <a:t>3/3/2017</a:t>
+              <a:t>8/7/2017</a:t>
             </a:fld>
             <a:endParaRPr lang="en-US" dirty="0">
               <a:solidFill>
@@ -9409,7 +9625,7 @@
                 </a:solidFill>
               </a:rPr>
               <a:pPr/>
-              <a:t>3/3/2017</a:t>
+              <a:t>8/7/2017</a:t>
             </a:fld>
             <a:endParaRPr lang="en-US" dirty="0">
               <a:solidFill>
@@ -9619,7 +9835,7 @@
                 </a:solidFill>
               </a:rPr>
               <a:pPr/>
-              <a:t>3/3/2017</a:t>
+              <a:t>8/7/2017</a:t>
             </a:fld>
             <a:endParaRPr lang="en-US" dirty="0">
               <a:solidFill>
@@ -9829,7 +10045,7 @@
                 </a:solidFill>
               </a:rPr>
               <a:pPr/>
-              <a:t>3/3/2017</a:t>
+              <a:t>8/7/2017</a:t>
             </a:fld>
             <a:endParaRPr lang="en-US" dirty="0">
               <a:solidFill>
@@ -24860,6 +25076,151 @@
         </p:nvSpPr>
         <p:spPr>
           <a:xfrm>
+            <a:off x="503237" y="1744662"/>
+            <a:ext cx="11122837" cy="3505200"/>
+          </a:xfrm>
+        </p:spPr>
+        <p:txBody>
+          <a:bodyPr/>
+          <a:lstStyle/>
+          <a:p>
+            <a:pPr marL="571500" indent="-571500">
+              <a:buFont typeface="Arial" panose="020B0604020202020204" pitchFamily="34" charset="0"/>
+              <a:buChar char="•"/>
+            </a:pPr>
+            <a:r>
+              <a:rPr lang="en-US" dirty="0"/>
+              <a:t>Admin can click </a:t>
+            </a:r>
+            <a:r>
+              <a:rPr lang="en-US" b="1" dirty="0"/>
+              <a:t>Clear Login Cache</a:t>
+            </a:r>
+            <a:r>
+              <a:rPr lang="en-US" dirty="0"/>
+              <a:t> button to reset a login cache.</a:t>
+            </a:r>
+          </a:p>
+          <a:p>
+            <a:pPr marL="571500" indent="-571500">
+              <a:buFont typeface="Arial" panose="020B0604020202020204" pitchFamily="34" charset="0"/>
+              <a:buChar char="•"/>
+            </a:pPr>
+            <a:endParaRPr lang="en-US" dirty="0"/>
+          </a:p>
+        </p:txBody>
+      </p:sp>
+      <p:sp>
+        <p:nvSpPr>
+          <p:cNvPr id="3" name="Title 2"/>
+          <p:cNvSpPr>
+            <a:spLocks noGrp="1"/>
+          </p:cNvSpPr>
+          <p:nvPr>
+            <p:ph type="title"/>
+          </p:nvPr>
+        </p:nvSpPr>
+        <p:spPr/>
+        <p:txBody>
+          <a:bodyPr/>
+          <a:lstStyle/>
+          <a:p>
+            <a:r>
+              <a:rPr lang="en-US" dirty="0"/>
+              <a:t>Admin Panel – </a:t>
+            </a:r>
+            <a:r>
+              <a:rPr lang="en-US" altLang="zh-CN" dirty="0"/>
+              <a:t>Clear Login Cache</a:t>
+            </a:r>
+            <a:endParaRPr lang="en-US" dirty="0"/>
+          </a:p>
+        </p:txBody>
+      </p:sp>
+      <p:pic>
+        <p:nvPicPr>
+          <p:cNvPr id="4" name="Picture 3">
+            <a:extLst>
+              <a:ext uri="{FF2B5EF4-FFF2-40B4-BE49-F238E27FC236}">
+                <a16:creationId xmlns:a16="http://schemas.microsoft.com/office/drawing/2014/main" id="{2A193D34-CB9E-48D8-A27B-56E645C93C7F}"/>
+              </a:ext>
+            </a:extLst>
+          </p:cNvPr>
+          <p:cNvPicPr>
+            <a:picLocks noChangeAspect="1"/>
+          </p:cNvPicPr>
+          <p:nvPr/>
+        </p:nvPicPr>
+        <p:blipFill>
+          <a:blip r:embed="rId3"/>
+          <a:stretch>
+            <a:fillRect/>
+          </a:stretch>
+        </p:blipFill>
+        <p:spPr>
+          <a:xfrm>
+            <a:off x="1189037" y="4259262"/>
+            <a:ext cx="8923809" cy="800000"/>
+          </a:xfrm>
+          <a:prstGeom prst="rect">
+            <a:avLst/>
+          </a:prstGeom>
+        </p:spPr>
+      </p:pic>
+    </p:spTree>
+    <p:extLst>
+      <p:ext uri="{BB962C8B-B14F-4D97-AF65-F5344CB8AC3E}">
+        <p14:creationId xmlns:p14="http://schemas.microsoft.com/office/powerpoint/2010/main" val="2846073434"/>
+      </p:ext>
+    </p:extLst>
+  </p:cSld>
+  <p:clrMapOvr>
+    <a:masterClrMapping/>
+  </p:clrMapOvr>
+  <mc:AlternateContent xmlns:mc="http://schemas.openxmlformats.org/markup-compatibility/2006" xmlns:p14="http://schemas.microsoft.com/office/powerpoint/2010/main">
+    <mc:Choice Requires="p14">
+      <p:transition spd="med" p14:dur="700">
+        <p:fade/>
+      </p:transition>
+    </mc:Choice>
+    <mc:Fallback xmlns="">
+      <p:transition spd="med">
+        <p:fade/>
+      </p:transition>
+    </mc:Fallback>
+  </mc:AlternateContent>
+</p:sld>
+</file>
+
+<file path=ppt/slides/slide14.xml><?xml version="1.0" encoding="utf-8"?>
+<p:sld xmlns:a="http://schemas.openxmlformats.org/drawingml/2006/main" xmlns:r="http://schemas.openxmlformats.org/officeDocument/2006/relationships" xmlns:p="http://schemas.openxmlformats.org/presentationml/2006/main">
+  <p:cSld>
+    <p:spTree>
+      <p:nvGrpSpPr>
+        <p:cNvPr id="1" name=""/>
+        <p:cNvGrpSpPr/>
+        <p:nvPr/>
+      </p:nvGrpSpPr>
+      <p:grpSpPr>
+        <a:xfrm>
+          <a:off x="0" y="0"/>
+          <a:ext cx="0" cy="0"/>
+          <a:chOff x="0" y="0"/>
+          <a:chExt cx="0" cy="0"/>
+        </a:xfrm>
+      </p:grpSpPr>
+      <p:sp>
+        <p:nvSpPr>
+          <p:cNvPr id="2" name="Text Placeholder 1"/>
+          <p:cNvSpPr>
+            <a:spLocks noGrp="1"/>
+          </p:cNvSpPr>
+          <p:nvPr>
+            <p:ph type="body" sz="quarter" idx="15"/>
+          </p:nvPr>
+        </p:nvSpPr>
+        <p:spPr>
+          <a:xfrm>
             <a:off x="427037" y="1668462"/>
             <a:ext cx="6093637" cy="3505200"/>
           </a:xfrm>
@@ -24956,7 +25317,7 @@
 </p:sld>
 </file>
 
-<file path=ppt/slides/slide14.xml><?xml version="1.0" encoding="utf-8"?>
+<file path=ppt/slides/slide15.xml><?xml version="1.0" encoding="utf-8"?>
 <p:sld xmlns:a="http://schemas.openxmlformats.org/drawingml/2006/main" xmlns:r="http://schemas.openxmlformats.org/officeDocument/2006/relationships" xmlns:p="http://schemas.openxmlformats.org/presentationml/2006/main">
   <p:cSld>
     <p:bg>
@@ -25028,7 +25389,7 @@
 </p:sld>
 </file>
 
-<file path=ppt/slides/slide15.xml><?xml version="1.0" encoding="utf-8"?>
+<file path=ppt/slides/slide16.xml><?xml version="1.0" encoding="utf-8"?>
 <p:sld xmlns:a="http://schemas.openxmlformats.org/drawingml/2006/main" xmlns:r="http://schemas.openxmlformats.org/officeDocument/2006/relationships" xmlns:p="http://schemas.openxmlformats.org/presentationml/2006/main">
   <p:cSld>
     <p:spTree>
@@ -25107,7 +25468,7 @@
 </p:sld>
 </file>
 
-<file path=ppt/slides/slide16.xml><?xml version="1.0" encoding="utf-8"?>
+<file path=ppt/slides/slide17.xml><?xml version="1.0" encoding="utf-8"?>
 <p:sld xmlns:a="http://schemas.openxmlformats.org/drawingml/2006/main" xmlns:r="http://schemas.openxmlformats.org/officeDocument/2006/relationships" xmlns:p="http://schemas.openxmlformats.org/presentationml/2006/main">
   <p:cSld>
     <p:spTree>
@@ -25300,7 +25661,7 @@
 </p:sld>
 </file>
 
-<file path=ppt/slides/slide17.xml><?xml version="1.0" encoding="utf-8"?>
+<file path=ppt/slides/slide18.xml><?xml version="1.0" encoding="utf-8"?>
 <p:sld xmlns:a="http://schemas.openxmlformats.org/drawingml/2006/main" xmlns:r="http://schemas.openxmlformats.org/officeDocument/2006/relationships" xmlns:p="http://schemas.openxmlformats.org/presentationml/2006/main">
   <p:cSld>
     <p:spTree>
@@ -25438,7 +25799,7 @@
 </p:sld>
 </file>
 
-<file path=ppt/slides/slide18.xml><?xml version="1.0" encoding="utf-8"?>
+<file path=ppt/slides/slide19.xml><?xml version="1.0" encoding="utf-8"?>
 <p:sld xmlns:a="http://schemas.openxmlformats.org/drawingml/2006/main" xmlns:r="http://schemas.openxmlformats.org/officeDocument/2006/relationships" xmlns:p="http://schemas.openxmlformats.org/presentationml/2006/main">
   <p:cSld>
     <p:spTree>
@@ -25554,125 +25915,6 @@
     <p:extLst>
       <p:ext uri="{BB962C8B-B14F-4D97-AF65-F5344CB8AC3E}">
         <p14:creationId xmlns:p14="http://schemas.microsoft.com/office/powerpoint/2010/main" val="3356712560"/>
-      </p:ext>
-    </p:extLst>
-  </p:cSld>
-  <p:clrMapOvr>
-    <a:masterClrMapping/>
-  </p:clrMapOvr>
-  <mc:AlternateContent xmlns:mc="http://schemas.openxmlformats.org/markup-compatibility/2006" xmlns:p14="http://schemas.microsoft.com/office/powerpoint/2010/main">
-    <mc:Choice Requires="p14">
-      <p:transition spd="med" p14:dur="700">
-        <p:fade/>
-      </p:transition>
-    </mc:Choice>
-    <mc:Fallback xmlns="">
-      <p:transition spd="med">
-        <p:fade/>
-      </p:transition>
-    </mc:Fallback>
-  </mc:AlternateContent>
-</p:sld>
-</file>
-
-<file path=ppt/slides/slide19.xml><?xml version="1.0" encoding="utf-8"?>
-<p:sld xmlns:a="http://schemas.openxmlformats.org/drawingml/2006/main" xmlns:r="http://schemas.openxmlformats.org/officeDocument/2006/relationships" xmlns:p="http://schemas.openxmlformats.org/presentationml/2006/main">
-  <p:cSld>
-    <p:spTree>
-      <p:nvGrpSpPr>
-        <p:cNvPr id="1" name=""/>
-        <p:cNvGrpSpPr/>
-        <p:nvPr/>
-      </p:nvGrpSpPr>
-      <p:grpSpPr>
-        <a:xfrm>
-          <a:off x="0" y="0"/>
-          <a:ext cx="0" cy="0"/>
-          <a:chOff x="0" y="0"/>
-          <a:chExt cx="0" cy="0"/>
-        </a:xfrm>
-      </p:grpSpPr>
-      <p:sp>
-        <p:nvSpPr>
-          <p:cNvPr id="2" name="Text Placeholder 1"/>
-          <p:cNvSpPr>
-            <a:spLocks noGrp="1"/>
-          </p:cNvSpPr>
-          <p:nvPr>
-            <p:ph type="body" sz="quarter" idx="15"/>
-          </p:nvPr>
-        </p:nvSpPr>
-        <p:spPr>
-          <a:xfrm>
-            <a:off x="5303837" y="1919604"/>
-            <a:ext cx="7315203" cy="914400"/>
-          </a:xfrm>
-        </p:spPr>
-        <p:txBody>
-          <a:bodyPr/>
-          <a:lstStyle/>
-          <a:p>
-            <a:pPr marL="571500" indent="-571500">
-              <a:buFont typeface="Arial" panose="020B0604020202020204" pitchFamily="34" charset="0"/>
-              <a:buChar char="•"/>
-            </a:pPr>
-            <a:r>
-              <a:rPr lang="en-US" dirty="0"/>
-              <a:t>After linking the accounts succeeds the app displays all schools. </a:t>
-            </a:r>
-          </a:p>
-        </p:txBody>
-      </p:sp>
-      <p:sp>
-        <p:nvSpPr>
-          <p:cNvPr id="3" name="Title 2"/>
-          <p:cNvSpPr>
-            <a:spLocks noGrp="1"/>
-          </p:cNvSpPr>
-          <p:nvPr>
-            <p:ph type="title"/>
-          </p:nvPr>
-        </p:nvSpPr>
-        <p:spPr/>
-        <p:txBody>
-          <a:bodyPr/>
-          <a:lstStyle/>
-          <a:p>
-            <a:r>
-              <a:rPr lang="en-US" dirty="0"/>
-              <a:t>Login succeeded</a:t>
-            </a:r>
-          </a:p>
-        </p:txBody>
-      </p:sp>
-      <p:pic>
-        <p:nvPicPr>
-          <p:cNvPr id="4" name="Picture 3"/>
-          <p:cNvPicPr>
-            <a:picLocks noChangeAspect="1"/>
-          </p:cNvPicPr>
-          <p:nvPr/>
-        </p:nvPicPr>
-        <p:blipFill>
-          <a:blip r:embed="rId3"/>
-          <a:stretch>
-            <a:fillRect/>
-          </a:stretch>
-        </p:blipFill>
-        <p:spPr>
-          <a:xfrm>
-            <a:off x="503237" y="1744662"/>
-            <a:ext cx="4942189" cy="2453958"/>
-          </a:xfrm>
-          <a:prstGeom prst="rect">
-            <a:avLst/>
-          </a:prstGeom>
-        </p:spPr>
-      </p:pic>
-    </p:spTree>
-    <p:extLst>
-      <p:ext uri="{BB962C8B-B14F-4D97-AF65-F5344CB8AC3E}">
-        <p14:creationId xmlns:p14="http://schemas.microsoft.com/office/powerpoint/2010/main" val="2987509157"/>
       </p:ext>
     </p:extLst>
   </p:cSld>
@@ -25898,6 +26140,125 @@
       </p:grpSpPr>
       <p:sp>
         <p:nvSpPr>
+          <p:cNvPr id="2" name="Text Placeholder 1"/>
+          <p:cNvSpPr>
+            <a:spLocks noGrp="1"/>
+          </p:cNvSpPr>
+          <p:nvPr>
+            <p:ph type="body" sz="quarter" idx="15"/>
+          </p:nvPr>
+        </p:nvSpPr>
+        <p:spPr>
+          <a:xfrm>
+            <a:off x="5303837" y="1919604"/>
+            <a:ext cx="7315203" cy="914400"/>
+          </a:xfrm>
+        </p:spPr>
+        <p:txBody>
+          <a:bodyPr/>
+          <a:lstStyle/>
+          <a:p>
+            <a:pPr marL="571500" indent="-571500">
+              <a:buFont typeface="Arial" panose="020B0604020202020204" pitchFamily="34" charset="0"/>
+              <a:buChar char="•"/>
+            </a:pPr>
+            <a:r>
+              <a:rPr lang="en-US" dirty="0"/>
+              <a:t>After linking the accounts succeeds the app displays all schools. </a:t>
+            </a:r>
+          </a:p>
+        </p:txBody>
+      </p:sp>
+      <p:sp>
+        <p:nvSpPr>
+          <p:cNvPr id="3" name="Title 2"/>
+          <p:cNvSpPr>
+            <a:spLocks noGrp="1"/>
+          </p:cNvSpPr>
+          <p:nvPr>
+            <p:ph type="title"/>
+          </p:nvPr>
+        </p:nvSpPr>
+        <p:spPr/>
+        <p:txBody>
+          <a:bodyPr/>
+          <a:lstStyle/>
+          <a:p>
+            <a:r>
+              <a:rPr lang="en-US" dirty="0"/>
+              <a:t>Login succeeded</a:t>
+            </a:r>
+          </a:p>
+        </p:txBody>
+      </p:sp>
+      <p:pic>
+        <p:nvPicPr>
+          <p:cNvPr id="4" name="Picture 3"/>
+          <p:cNvPicPr>
+            <a:picLocks noChangeAspect="1"/>
+          </p:cNvPicPr>
+          <p:nvPr/>
+        </p:nvPicPr>
+        <p:blipFill>
+          <a:blip r:embed="rId3"/>
+          <a:stretch>
+            <a:fillRect/>
+          </a:stretch>
+        </p:blipFill>
+        <p:spPr>
+          <a:xfrm>
+            <a:off x="503237" y="1744662"/>
+            <a:ext cx="4942189" cy="2453958"/>
+          </a:xfrm>
+          <a:prstGeom prst="rect">
+            <a:avLst/>
+          </a:prstGeom>
+        </p:spPr>
+      </p:pic>
+    </p:spTree>
+    <p:extLst>
+      <p:ext uri="{BB962C8B-B14F-4D97-AF65-F5344CB8AC3E}">
+        <p14:creationId xmlns:p14="http://schemas.microsoft.com/office/powerpoint/2010/main" val="2987509157"/>
+      </p:ext>
+    </p:extLst>
+  </p:cSld>
+  <p:clrMapOvr>
+    <a:masterClrMapping/>
+  </p:clrMapOvr>
+  <mc:AlternateContent xmlns:mc="http://schemas.openxmlformats.org/markup-compatibility/2006" xmlns:p14="http://schemas.microsoft.com/office/powerpoint/2010/main">
+    <mc:Choice Requires="p14">
+      <p:transition spd="med" p14:dur="700">
+        <p:fade/>
+      </p:transition>
+    </mc:Choice>
+    <mc:Fallback xmlns="">
+      <p:transition spd="med">
+        <p:fade/>
+      </p:transition>
+    </mc:Fallback>
+  </mc:AlternateContent>
+</p:sld>
+</file>
+
+<file path=ppt/slides/slide21.xml><?xml version="1.0" encoding="utf-8"?>
+<p:sld xmlns:a="http://schemas.openxmlformats.org/drawingml/2006/main" xmlns:r="http://schemas.openxmlformats.org/officeDocument/2006/relationships" xmlns:p="http://schemas.openxmlformats.org/presentationml/2006/main">
+  <p:cSld>
+    <p:spTree>
+      <p:nvGrpSpPr>
+        <p:cNvPr id="1" name=""/>
+        <p:cNvGrpSpPr/>
+        <p:nvPr/>
+      </p:nvGrpSpPr>
+      <p:grpSpPr>
+        <a:xfrm>
+          <a:off x="0" y="0"/>
+          <a:ext cx="0" cy="0"/>
+          <a:chOff x="0" y="0"/>
+          <a:chExt cx="0" cy="0"/>
+        </a:xfrm>
+      </p:grpSpPr>
+      <p:sp>
+        <p:nvSpPr>
           <p:cNvPr id="3" name="Title 2"/>
           <p:cNvSpPr>
             <a:spLocks noGrp="1"/>
@@ -26040,7 +26401,7 @@
 </p:sld>
 </file>
 
-<file path=ppt/slides/slide21.xml><?xml version="1.0" encoding="utf-8"?>
+<file path=ppt/slides/slide22.xml><?xml version="1.0" encoding="utf-8"?>
 <p:sld xmlns:a="http://schemas.openxmlformats.org/drawingml/2006/main" xmlns:r="http://schemas.openxmlformats.org/officeDocument/2006/relationships" xmlns:p="http://schemas.openxmlformats.org/presentationml/2006/main">
   <p:cSld>
     <p:spTree>
@@ -26227,7 +26588,7 @@
 </p:sld>
 </file>
 
-<file path=ppt/slides/slide22.xml><?xml version="1.0" encoding="utf-8"?>
+<file path=ppt/slides/slide23.xml><?xml version="1.0" encoding="utf-8"?>
 <p:sld xmlns:a="http://schemas.openxmlformats.org/drawingml/2006/main" xmlns:r="http://schemas.openxmlformats.org/officeDocument/2006/relationships" xmlns:p="http://schemas.openxmlformats.org/presentationml/2006/main">
   <p:cSld>
     <p:spTree>
@@ -26348,7 +26709,7 @@
 </p:sld>
 </file>
 
-<file path=ppt/slides/slide23.xml><?xml version="1.0" encoding="utf-8"?>
+<file path=ppt/slides/slide24.xml><?xml version="1.0" encoding="utf-8"?>
 <p:sld xmlns:a="http://schemas.openxmlformats.org/drawingml/2006/main" xmlns:r="http://schemas.openxmlformats.org/officeDocument/2006/relationships" xmlns:p="http://schemas.openxmlformats.org/presentationml/2006/main">
   <p:cSld>
     <p:bg>
@@ -26420,7 +26781,7 @@
 </p:sld>
 </file>
 
-<file path=ppt/slides/slide24.xml><?xml version="1.0" encoding="utf-8"?>
+<file path=ppt/slides/slide25.xml><?xml version="1.0" encoding="utf-8"?>
 <p:sld xmlns:a="http://schemas.openxmlformats.org/drawingml/2006/main" xmlns:r="http://schemas.openxmlformats.org/officeDocument/2006/relationships" xmlns:p="http://schemas.openxmlformats.org/presentationml/2006/main">
   <p:cSld>
     <p:spTree>
@@ -26499,7 +26860,7 @@
 </p:sld>
 </file>
 
-<file path=ppt/slides/slide25.xml><?xml version="1.0" encoding="utf-8"?>
+<file path=ppt/slides/slide26.xml><?xml version="1.0" encoding="utf-8"?>
 <p:sld xmlns:a="http://schemas.openxmlformats.org/drawingml/2006/main" xmlns:r="http://schemas.openxmlformats.org/officeDocument/2006/relationships" xmlns:p="http://schemas.openxmlformats.org/presentationml/2006/main">
   <p:cSld>
     <p:spTree>
@@ -26637,7 +26998,7 @@
 </p:sld>
 </file>
 
-<file path=ppt/slides/slide26.xml><?xml version="1.0" encoding="utf-8"?>
+<file path=ppt/slides/slide27.xml><?xml version="1.0" encoding="utf-8"?>
 <p:sld xmlns:a="http://schemas.openxmlformats.org/drawingml/2006/main" xmlns:r="http://schemas.openxmlformats.org/officeDocument/2006/relationships" xmlns:p="http://schemas.openxmlformats.org/presentationml/2006/main">
   <p:cSld>
     <p:spTree>
@@ -26806,7 +27167,7 @@
 </p:sld>
 </file>
 
-<file path=ppt/slides/slide27.xml><?xml version="1.0" encoding="utf-8"?>
+<file path=ppt/slides/slide28.xml><?xml version="1.0" encoding="utf-8"?>
 <p:sld xmlns:a="http://schemas.openxmlformats.org/drawingml/2006/main" xmlns:r="http://schemas.openxmlformats.org/officeDocument/2006/relationships" xmlns:p="http://schemas.openxmlformats.org/presentationml/2006/main">
   <p:cSld>
     <p:spTree>
@@ -26938,7 +27299,7 @@
 </p:sld>
 </file>
 
-<file path=ppt/slides/slide28.xml><?xml version="1.0" encoding="utf-8"?>
+<file path=ppt/slides/slide29.xml><?xml version="1.0" encoding="utf-8"?>
 <p:sld xmlns:a="http://schemas.openxmlformats.org/drawingml/2006/main" xmlns:r="http://schemas.openxmlformats.org/officeDocument/2006/relationships" xmlns:p="http://schemas.openxmlformats.org/presentationml/2006/main">
   <p:cSld>
     <p:spTree>
@@ -27083,7 +27444,79 @@
 </p:sld>
 </file>
 
-<file path=ppt/slides/slide29.xml><?xml version="1.0" encoding="utf-8"?>
+<file path=ppt/slides/slide3.xml><?xml version="1.0" encoding="utf-8"?>
+<p:sld xmlns:a="http://schemas.openxmlformats.org/drawingml/2006/main" xmlns:r="http://schemas.openxmlformats.org/officeDocument/2006/relationships" xmlns:p="http://schemas.openxmlformats.org/presentationml/2006/main">
+  <p:cSld>
+    <p:bg>
+      <p:bgPr>
+        <a:solidFill>
+          <a:schemeClr val="bg2"/>
+        </a:solidFill>
+        <a:effectLst/>
+      </p:bgPr>
+    </p:bg>
+    <p:spTree>
+      <p:nvGrpSpPr>
+        <p:cNvPr id="1" name=""/>
+        <p:cNvGrpSpPr/>
+        <p:nvPr/>
+      </p:nvGrpSpPr>
+      <p:grpSpPr>
+        <a:xfrm>
+          <a:off x="0" y="0"/>
+          <a:ext cx="0" cy="0"/>
+          <a:chOff x="0" y="0"/>
+          <a:chExt cx="0" cy="0"/>
+        </a:xfrm>
+      </p:grpSpPr>
+      <p:sp>
+        <p:nvSpPr>
+          <p:cNvPr id="4" name="Title 3"/>
+          <p:cNvSpPr>
+            <a:spLocks noGrp="1"/>
+          </p:cNvSpPr>
+          <p:nvPr>
+            <p:ph type="title"/>
+          </p:nvPr>
+        </p:nvSpPr>
+        <p:spPr/>
+        <p:txBody>
+          <a:bodyPr/>
+          <a:lstStyle/>
+          <a:p>
+            <a:r>
+              <a:rPr lang="en-US" dirty="0"/>
+              <a:t>Admin Account Login Authentication Flow</a:t>
+            </a:r>
+          </a:p>
+        </p:txBody>
+      </p:sp>
+    </p:spTree>
+    <p:extLst>
+      <p:ext uri="{BB962C8B-B14F-4D97-AF65-F5344CB8AC3E}">
+        <p14:creationId xmlns:p14="http://schemas.microsoft.com/office/powerpoint/2010/main" val="141284340"/>
+      </p:ext>
+    </p:extLst>
+  </p:cSld>
+  <p:clrMapOvr>
+    <a:masterClrMapping/>
+  </p:clrMapOvr>
+  <mc:AlternateContent xmlns:mc="http://schemas.openxmlformats.org/markup-compatibility/2006" xmlns:p14="http://schemas.microsoft.com/office/powerpoint/2010/main">
+    <mc:Choice Requires="p14">
+      <p:transition spd="med" p14:dur="700">
+        <p:fade/>
+      </p:transition>
+    </mc:Choice>
+    <mc:Fallback xmlns="">
+      <p:transition spd="med">
+        <p:fade/>
+      </p:transition>
+    </mc:Fallback>
+  </mc:AlternateContent>
+</p:sld>
+</file>
+
+<file path=ppt/slides/slide30.xml><?xml version="1.0" encoding="utf-8"?>
 <p:sld xmlns:a="http://schemas.openxmlformats.org/drawingml/2006/main" xmlns:r="http://schemas.openxmlformats.org/officeDocument/2006/relationships" xmlns:p="http://schemas.openxmlformats.org/presentationml/2006/main">
   <p:cSld>
     <p:spTree>
@@ -27244,79 +27677,7 @@
 </p:sld>
 </file>
 
-<file path=ppt/slides/slide3.xml><?xml version="1.0" encoding="utf-8"?>
-<p:sld xmlns:a="http://schemas.openxmlformats.org/drawingml/2006/main" xmlns:r="http://schemas.openxmlformats.org/officeDocument/2006/relationships" xmlns:p="http://schemas.openxmlformats.org/presentationml/2006/main">
-  <p:cSld>
-    <p:bg>
-      <p:bgPr>
-        <a:solidFill>
-          <a:schemeClr val="bg2"/>
-        </a:solidFill>
-        <a:effectLst/>
-      </p:bgPr>
-    </p:bg>
-    <p:spTree>
-      <p:nvGrpSpPr>
-        <p:cNvPr id="1" name=""/>
-        <p:cNvGrpSpPr/>
-        <p:nvPr/>
-      </p:nvGrpSpPr>
-      <p:grpSpPr>
-        <a:xfrm>
-          <a:off x="0" y="0"/>
-          <a:ext cx="0" cy="0"/>
-          <a:chOff x="0" y="0"/>
-          <a:chExt cx="0" cy="0"/>
-        </a:xfrm>
-      </p:grpSpPr>
-      <p:sp>
-        <p:nvSpPr>
-          <p:cNvPr id="4" name="Title 3"/>
-          <p:cNvSpPr>
-            <a:spLocks noGrp="1"/>
-          </p:cNvSpPr>
-          <p:nvPr>
-            <p:ph type="title"/>
-          </p:nvPr>
-        </p:nvSpPr>
-        <p:spPr/>
-        <p:txBody>
-          <a:bodyPr/>
-          <a:lstStyle/>
-          <a:p>
-            <a:r>
-              <a:rPr lang="en-US" dirty="0"/>
-              <a:t>Admin Account Login Authentication Flow</a:t>
-            </a:r>
-          </a:p>
-        </p:txBody>
-      </p:sp>
-    </p:spTree>
-    <p:extLst>
-      <p:ext uri="{BB962C8B-B14F-4D97-AF65-F5344CB8AC3E}">
-        <p14:creationId xmlns:p14="http://schemas.microsoft.com/office/powerpoint/2010/main" val="141284340"/>
-      </p:ext>
-    </p:extLst>
-  </p:cSld>
-  <p:clrMapOvr>
-    <a:masterClrMapping/>
-  </p:clrMapOvr>
-  <mc:AlternateContent xmlns:mc="http://schemas.openxmlformats.org/markup-compatibility/2006" xmlns:p14="http://schemas.microsoft.com/office/powerpoint/2010/main">
-    <mc:Choice Requires="p14">
-      <p:transition spd="med" p14:dur="700">
-        <p:fade/>
-      </p:transition>
-    </mc:Choice>
-    <mc:Fallback xmlns="">
-      <p:transition spd="med">
-        <p:fade/>
-      </p:transition>
-    </mc:Fallback>
-  </mc:AlternateContent>
-</p:sld>
-</file>
-
-<file path=ppt/slides/slide30.xml><?xml version="1.0" encoding="utf-8"?>
+<file path=ppt/slides/slide31.xml><?xml version="1.0" encoding="utf-8"?>
 <p:sld xmlns:a="http://schemas.openxmlformats.org/drawingml/2006/main" xmlns:r="http://schemas.openxmlformats.org/officeDocument/2006/relationships" xmlns:p="http://schemas.openxmlformats.org/presentationml/2006/main">
   <p:cSld>
     <p:spTree>
@@ -27503,7 +27864,7 @@
 </p:sld>
 </file>
 
-<file path=ppt/slides/slide31.xml><?xml version="1.0" encoding="utf-8"?>
+<file path=ppt/slides/slide32.xml><?xml version="1.0" encoding="utf-8"?>
 <p:sld xmlns:a="http://schemas.openxmlformats.org/drawingml/2006/main" xmlns:r="http://schemas.openxmlformats.org/officeDocument/2006/relationships" xmlns:p="http://schemas.openxmlformats.org/presentationml/2006/main">
   <p:cSld>
     <p:spTree>
@@ -27624,7 +27985,7 @@
 </p:sld>
 </file>
 
-<file path=ppt/slides/slide32.xml><?xml version="1.0" encoding="utf-8"?>
+<file path=ppt/slides/slide33.xml><?xml version="1.0" encoding="utf-8"?>
 <p:sld xmlns:a="http://schemas.openxmlformats.org/drawingml/2006/main" xmlns:r="http://schemas.openxmlformats.org/officeDocument/2006/relationships" xmlns:p="http://schemas.openxmlformats.org/presentationml/2006/main">
   <p:cSld>
     <p:bg>
@@ -27696,7 +28057,7 @@
 </p:sld>
 </file>
 
-<file path=ppt/slides/slide33.xml><?xml version="1.0" encoding="utf-8"?>
+<file path=ppt/slides/slide34.xml><?xml version="1.0" encoding="utf-8"?>
 <p:sld xmlns:a="http://schemas.openxmlformats.org/drawingml/2006/main" xmlns:r="http://schemas.openxmlformats.org/officeDocument/2006/relationships" xmlns:p="http://schemas.openxmlformats.org/presentationml/2006/main">
   <p:cSld>
     <p:spTree>
@@ -27767,20 +28128,6 @@
           <a:p>
             <a:r>
               <a:rPr lang="en-US" sz="2800" dirty="0"/>
-              <a:t>Click the </a:t>
-            </a:r>
-            <a:r>
-              <a:rPr lang="en-US" sz="2800" b="1" dirty="0"/>
-              <a:t>Bing map icon </a:t>
-            </a:r>
-            <a:r>
-              <a:rPr lang="en-US" sz="2800" dirty="0"/>
-              <a:t>to show a map of the selected school. </a:t>
-            </a:r>
-          </a:p>
-          <a:p>
-            <a:r>
-              <a:rPr lang="en-US" sz="2800" dirty="0"/>
               <a:t>Click </a:t>
             </a:r>
             <a:r>
@@ -27818,7 +28165,13 @@
       </p:sp>
       <p:pic>
         <p:nvPicPr>
-          <p:cNvPr id="6" name="Picture 5"/>
+          <p:cNvPr id="4" name="Picture 3">
+            <a:extLst>
+              <a:ext uri="{FF2B5EF4-FFF2-40B4-BE49-F238E27FC236}">
+                <a16:creationId xmlns:a16="http://schemas.microsoft.com/office/drawing/2014/main" id="{24CE180C-8EA6-41DF-B235-126AFF042241}"/>
+              </a:ext>
+            </a:extLst>
+          </p:cNvPr>
           <p:cNvPicPr>
             <a:picLocks noChangeAspect="1"/>
           </p:cNvPicPr>
@@ -27832,8 +28185,8 @@
         </p:blipFill>
         <p:spPr>
           <a:xfrm>
-            <a:off x="1265237" y="4259262"/>
-            <a:ext cx="9047161" cy="2456691"/>
+            <a:off x="808037" y="3649662"/>
+            <a:ext cx="9158288" cy="3183111"/>
           </a:xfrm>
           <a:prstGeom prst="rect">
             <a:avLst/>
@@ -27865,7 +28218,7 @@
 </p:sld>
 </file>
 
-<file path=ppt/slides/slide34.xml><?xml version="1.0" encoding="utf-8"?>
+<file path=ppt/slides/slide35.xml><?xml version="1.0" encoding="utf-8"?>
 <p:sld xmlns:a="http://schemas.openxmlformats.org/drawingml/2006/main" xmlns:r="http://schemas.openxmlformats.org/officeDocument/2006/relationships" xmlns:p="http://schemas.openxmlformats.org/presentationml/2006/main">
   <p:cSld>
     <p:bg>
@@ -27937,7 +28290,7 @@
 </p:sld>
 </file>
 
-<file path=ppt/slides/slide35.xml><?xml version="1.0" encoding="utf-8"?>
+<file path=ppt/slides/slide36.xml><?xml version="1.0" encoding="utf-8"?>
 <p:sld xmlns:a="http://schemas.openxmlformats.org/drawingml/2006/main" xmlns:r="http://schemas.openxmlformats.org/officeDocument/2006/relationships" xmlns:p="http://schemas.openxmlformats.org/presentationml/2006/main">
   <p:cSld>
     <p:spTree>
@@ -28098,7 +28451,7 @@
 </p:sld>
 </file>
 
-<file path=ppt/slides/slide36.xml><?xml version="1.0" encoding="utf-8"?>
+<file path=ppt/slides/slide37.xml><?xml version="1.0" encoding="utf-8"?>
 <p:sld xmlns:a="http://schemas.openxmlformats.org/drawingml/2006/main" xmlns:r="http://schemas.openxmlformats.org/officeDocument/2006/relationships" xmlns:p="http://schemas.openxmlformats.org/presentationml/2006/main">
   <p:cSld>
     <p:spTree>
@@ -28217,7 +28570,7 @@
 </p:sld>
 </file>
 
-<file path=ppt/slides/slide37.xml><?xml version="1.0" encoding="utf-8"?>
+<file path=ppt/slides/slide38.xml><?xml version="1.0" encoding="utf-8"?>
 <p:sld xmlns:a="http://schemas.openxmlformats.org/drawingml/2006/main" xmlns:r="http://schemas.openxmlformats.org/officeDocument/2006/relationships" xmlns:p="http://schemas.openxmlformats.org/presentationml/2006/main">
   <p:cSld>
     <p:bg>
@@ -28289,7 +28642,7 @@
 </p:sld>
 </file>
 
-<file path=ppt/slides/slide38.xml><?xml version="1.0" encoding="utf-8"?>
+<file path=ppt/slides/slide39.xml><?xml version="1.0" encoding="utf-8"?>
 <p:sld xmlns:a="http://schemas.openxmlformats.org/drawingml/2006/main" xmlns:r="http://schemas.openxmlformats.org/officeDocument/2006/relationships" xmlns:p="http://schemas.openxmlformats.org/presentationml/2006/main">
   <p:cSld>
     <p:spTree>
@@ -28500,7 +28853,86 @@
 </p:sld>
 </file>
 
-<file path=ppt/slides/slide39.xml><?xml version="1.0" encoding="utf-8"?>
+<file path=ppt/slides/slide4.xml><?xml version="1.0" encoding="utf-8"?>
+<p:sld xmlns:a="http://schemas.openxmlformats.org/drawingml/2006/main" xmlns:r="http://schemas.openxmlformats.org/officeDocument/2006/relationships" xmlns:p="http://schemas.openxmlformats.org/presentationml/2006/main">
+  <p:cSld>
+    <p:spTree>
+      <p:nvGrpSpPr>
+        <p:cNvPr id="1" name=""/>
+        <p:cNvGrpSpPr/>
+        <p:nvPr/>
+      </p:nvGrpSpPr>
+      <p:grpSpPr>
+        <a:xfrm>
+          <a:off x="0" y="0"/>
+          <a:ext cx="0" cy="0"/>
+          <a:chOff x="0" y="0"/>
+          <a:chExt cx="0" cy="0"/>
+        </a:xfrm>
+      </p:grpSpPr>
+      <p:sp>
+        <p:nvSpPr>
+          <p:cNvPr id="3" name="Title 2"/>
+          <p:cNvSpPr>
+            <a:spLocks noGrp="1"/>
+          </p:cNvSpPr>
+          <p:nvPr>
+            <p:ph type="title"/>
+          </p:nvPr>
+        </p:nvSpPr>
+        <p:spPr/>
+        <p:txBody>
+          <a:bodyPr/>
+          <a:lstStyle/>
+          <a:p>
+            <a:r>
+              <a:rPr lang="en-US" dirty="0"/>
+              <a:t>Admin Account Login Authentication Flow</a:t>
+            </a:r>
+          </a:p>
+        </p:txBody>
+      </p:sp>
+      <p:pic>
+        <p:nvPicPr>
+          <p:cNvPr id="5" name="Picture 4"/>
+          <p:cNvPicPr>
+            <a:picLocks noChangeAspect="1"/>
+          </p:cNvPicPr>
+          <p:nvPr/>
+        </p:nvPicPr>
+        <p:blipFill>
+          <a:blip r:embed="rId2"/>
+          <a:stretch>
+            <a:fillRect/>
+          </a:stretch>
+        </p:blipFill>
+        <p:spPr>
+          <a:xfrm>
+            <a:off x="503236" y="1516062"/>
+            <a:ext cx="10783181" cy="4343400"/>
+          </a:xfrm>
+          <a:prstGeom prst="rect">
+            <a:avLst/>
+          </a:prstGeom>
+        </p:spPr>
+      </p:pic>
+    </p:spTree>
+    <p:extLst>
+      <p:ext uri="{BB962C8B-B14F-4D97-AF65-F5344CB8AC3E}">
+        <p14:creationId xmlns:p14="http://schemas.microsoft.com/office/powerpoint/2010/main" val="3169000962"/>
+      </p:ext>
+    </p:extLst>
+  </p:cSld>
+  <p:clrMapOvr>
+    <a:masterClrMapping/>
+  </p:clrMapOvr>
+  <p:transition>
+    <p:fade/>
+  </p:transition>
+</p:sld>
+</file>
+
+<file path=ppt/slides/slide40.xml><?xml version="1.0" encoding="utf-8"?>
 <p:sld xmlns:a="http://schemas.openxmlformats.org/drawingml/2006/main" xmlns:r="http://schemas.openxmlformats.org/officeDocument/2006/relationships" xmlns:p="http://schemas.openxmlformats.org/presentationml/2006/main">
   <p:cSld>
     <p:spTree>
@@ -28646,86 +29078,7 @@
 </p:sld>
 </file>
 
-<file path=ppt/slides/slide4.xml><?xml version="1.0" encoding="utf-8"?>
-<p:sld xmlns:a="http://schemas.openxmlformats.org/drawingml/2006/main" xmlns:r="http://schemas.openxmlformats.org/officeDocument/2006/relationships" xmlns:p="http://schemas.openxmlformats.org/presentationml/2006/main">
-  <p:cSld>
-    <p:spTree>
-      <p:nvGrpSpPr>
-        <p:cNvPr id="1" name=""/>
-        <p:cNvGrpSpPr/>
-        <p:nvPr/>
-      </p:nvGrpSpPr>
-      <p:grpSpPr>
-        <a:xfrm>
-          <a:off x="0" y="0"/>
-          <a:ext cx="0" cy="0"/>
-          <a:chOff x="0" y="0"/>
-          <a:chExt cx="0" cy="0"/>
-        </a:xfrm>
-      </p:grpSpPr>
-      <p:sp>
-        <p:nvSpPr>
-          <p:cNvPr id="3" name="Title 2"/>
-          <p:cNvSpPr>
-            <a:spLocks noGrp="1"/>
-          </p:cNvSpPr>
-          <p:nvPr>
-            <p:ph type="title"/>
-          </p:nvPr>
-        </p:nvSpPr>
-        <p:spPr/>
-        <p:txBody>
-          <a:bodyPr/>
-          <a:lstStyle/>
-          <a:p>
-            <a:r>
-              <a:rPr lang="en-US" dirty="0"/>
-              <a:t>Admin Account Login Authentication Flow</a:t>
-            </a:r>
-          </a:p>
-        </p:txBody>
-      </p:sp>
-      <p:pic>
-        <p:nvPicPr>
-          <p:cNvPr id="5" name="Picture 4"/>
-          <p:cNvPicPr>
-            <a:picLocks noChangeAspect="1"/>
-          </p:cNvPicPr>
-          <p:nvPr/>
-        </p:nvPicPr>
-        <p:blipFill>
-          <a:blip r:embed="rId2"/>
-          <a:stretch>
-            <a:fillRect/>
-          </a:stretch>
-        </p:blipFill>
-        <p:spPr>
-          <a:xfrm>
-            <a:off x="503236" y="1516062"/>
-            <a:ext cx="10783181" cy="4343400"/>
-          </a:xfrm>
-          <a:prstGeom prst="rect">
-            <a:avLst/>
-          </a:prstGeom>
-        </p:spPr>
-      </p:pic>
-    </p:spTree>
-    <p:extLst>
-      <p:ext uri="{BB962C8B-B14F-4D97-AF65-F5344CB8AC3E}">
-        <p14:creationId xmlns:p14="http://schemas.microsoft.com/office/powerpoint/2010/main" val="3169000962"/>
-      </p:ext>
-    </p:extLst>
-  </p:cSld>
-  <p:clrMapOvr>
-    <a:masterClrMapping/>
-  </p:clrMapOvr>
-  <p:transition>
-    <p:fade/>
-  </p:transition>
-</p:sld>
-</file>
-
-<file path=ppt/slides/slide40.xml><?xml version="1.0" encoding="utf-8"?>
+<file path=ppt/slides/slide41.xml><?xml version="1.0" encoding="utf-8"?>
 <p:sld xmlns:a="http://schemas.openxmlformats.org/drawingml/2006/main" xmlns:r="http://schemas.openxmlformats.org/officeDocument/2006/relationships" xmlns:p="http://schemas.openxmlformats.org/presentationml/2006/main">
   <p:cSld>
     <p:spTree>
@@ -28895,7 +29248,7 @@
 </p:sld>
 </file>
 
-<file path=ppt/slides/slide41.xml><?xml version="1.0" encoding="utf-8"?>
+<file path=ppt/slides/slide42.xml><?xml version="1.0" encoding="utf-8"?>
 <p:sld xmlns:a="http://schemas.openxmlformats.org/drawingml/2006/main" xmlns:r="http://schemas.openxmlformats.org/officeDocument/2006/relationships" xmlns:p="http://schemas.openxmlformats.org/presentationml/2006/main">
   <p:cSld>
     <p:bg>
@@ -28967,7 +29320,7 @@
 </p:sld>
 </file>
 
-<file path=ppt/slides/slide42.xml><?xml version="1.0" encoding="utf-8"?>
+<file path=ppt/slides/slide43.xml><?xml version="1.0" encoding="utf-8"?>
 <p:sld xmlns:a="http://schemas.openxmlformats.org/drawingml/2006/main" xmlns:r="http://schemas.openxmlformats.org/officeDocument/2006/relationships" xmlns:p="http://schemas.openxmlformats.org/presentationml/2006/main">
   <p:cSld>
     <p:spTree>
@@ -29108,7 +29461,7 @@
 </p:sld>
 </file>
 
-<file path=ppt/slides/slide43.xml><?xml version="1.0" encoding="utf-8"?>
+<file path=ppt/slides/slide44.xml><?xml version="1.0" encoding="utf-8"?>
 <p:sld xmlns:a="http://schemas.openxmlformats.org/drawingml/2006/main" xmlns:r="http://schemas.openxmlformats.org/officeDocument/2006/relationships" xmlns:p="http://schemas.openxmlformats.org/presentationml/2006/main">
   <p:cSld>
     <p:bg>
@@ -29180,7 +29533,7 @@
 </p:sld>
 </file>
 
-<file path=ppt/slides/slide44.xml><?xml version="1.0" encoding="utf-8"?>
+<file path=ppt/slides/slide45.xml><?xml version="1.0" encoding="utf-8"?>
 <p:sld xmlns:a="http://schemas.openxmlformats.org/drawingml/2006/main" xmlns:r="http://schemas.openxmlformats.org/officeDocument/2006/relationships" xmlns:p="http://schemas.openxmlformats.org/presentationml/2006/main">
   <p:cSld>
     <p:spTree>

</xml_diff>

<commit_message>
Add SyncData WebJob and update database to MySQL
</commit_message>
<xml_diff>
--- a/EDU GRAPH-API Demo Script.pptx
+++ b/EDU GRAPH-API Demo Script.pptx
@@ -7,10 +7,10 @@
     <p:sldMasterId id="2147484307" r:id="rId6"/>
   </p:sldMasterIdLst>
   <p:notesMasterIdLst>
-    <p:notesMasterId r:id="rId52"/>
+    <p:notesMasterId r:id="rId58"/>
   </p:notesMasterIdLst>
   <p:handoutMasterIdLst>
-    <p:handoutMasterId r:id="rId53"/>
+    <p:handoutMasterId r:id="rId59"/>
   </p:handoutMasterIdLst>
   <p:sldIdLst>
     <p:sldId id="258" r:id="rId7"/>
@@ -52,12 +52,18 @@
     <p:sldId id="321" r:id="rId43"/>
     <p:sldId id="322" r:id="rId44"/>
     <p:sldId id="323" r:id="rId45"/>
-    <p:sldId id="342" r:id="rId46"/>
-    <p:sldId id="343" r:id="rId47"/>
-    <p:sldId id="349" r:id="rId48"/>
-    <p:sldId id="350" r:id="rId49"/>
-    <p:sldId id="347" r:id="rId50"/>
-    <p:sldId id="348" r:id="rId51"/>
+    <p:sldId id="356" r:id="rId46"/>
+    <p:sldId id="342" r:id="rId47"/>
+    <p:sldId id="343" r:id="rId48"/>
+    <p:sldId id="347" r:id="rId49"/>
+    <p:sldId id="348" r:id="rId50"/>
+    <p:sldId id="358" r:id="rId51"/>
+    <p:sldId id="359" r:id="rId52"/>
+    <p:sldId id="360" r:id="rId53"/>
+    <p:sldId id="362" r:id="rId54"/>
+    <p:sldId id="361" r:id="rId55"/>
+    <p:sldId id="363" r:id="rId56"/>
+    <p:sldId id="364" r:id="rId57"/>
   </p:sldIdLst>
   <p:sldSz cx="12436475" cy="6994525"/>
   <p:notesSz cx="6858000" cy="9144000"/>
@@ -224,20 +230,26 @@
           <p14:sldIdLst>
             <p14:sldId id="322"/>
             <p14:sldId id="323"/>
+            <p14:sldId id="356"/>
             <p14:sldId id="342"/>
             <p14:sldId id="343"/>
-          </p14:sldIdLst>
-        </p14:section>
-        <p14:section name="Teachers/Students" id="{AEBB7434-39FE-44DA-9126-E46760E6BB80}">
-          <p14:sldIdLst>
-            <p14:sldId id="349"/>
-            <p14:sldId id="350"/>
           </p14:sldIdLst>
         </p14:section>
         <p14:section name="Demo Helper" id="{4E7ABD03-156A-423B-8919-765633C8C604}">
           <p14:sldIdLst>
             <p14:sldId id="347"/>
             <p14:sldId id="348"/>
+          </p14:sldIdLst>
+        </p14:section>
+        <p14:section name="Sync Data WebJob" id="{62895BE2-0C5F-4BCA-8435-5C12C05E7819}">
+          <p14:sldIdLst>
+            <p14:sldId id="358"/>
+            <p14:sldId id="359"/>
+            <p14:sldId id="360"/>
+            <p14:sldId id="362"/>
+            <p14:sldId id="361"/>
+            <p14:sldId id="363"/>
+            <p14:sldId id="364"/>
           </p14:sldIdLst>
         </p14:section>
       </p14:sectionLst>
@@ -269,10 +281,6 @@
 </p:cmAuthorLst>
 </file>
 
-<file path=ppt/revisionInfo.xml><?xml version="1.0" encoding="utf-8"?>
-<p1510:revInfo xmlns:a="http://schemas.openxmlformats.org/drawingml/2006/main" xmlns:r="http://schemas.openxmlformats.org/officeDocument/2006/relationships" xmlns:p1510="http://schemas.microsoft.com/office/powerpoint/2015/10/main"/>
-</file>
-
 <file path=ppt/handoutMasters/handoutMaster1.xml><?xml version="1.0" encoding="utf-8"?>
 <p:handoutMaster xmlns:a="http://schemas.openxmlformats.org/drawingml/2006/main" xmlns:r="http://schemas.openxmlformats.org/officeDocument/2006/relationships" xmlns:p="http://schemas.openxmlformats.org/presentationml/2006/main">
   <p:cSld>
@@ -362,7 +370,7 @@
               <a:rPr lang="en-US" smtClean="0">
                 <a:latin typeface="Segoe UI" pitchFamily="34" charset="0"/>
               </a:rPr>
-              <a:t>8/7/2017 9:05 AM</a:t>
+              <a:t>5/14/2018 10:27</a:t>
             </a:fld>
             <a:endParaRPr lang="en-US" dirty="0">
               <a:latin typeface="Segoe UI" pitchFamily="34" charset="0"/>
@@ -645,7 +653,7 @@
           <a:p>
             <a:fld id="{38EEC551-8CDA-4EB6-89BB-2A86C9F091C8}" type="datetime8">
               <a:rPr lang="en-US" smtClean="0"/>
-              <a:t>8/7/2017 9:05 AM</a:t>
+              <a:t>5/14/2018 10:27</a:t>
             </a:fld>
             <a:endParaRPr lang="en-US" dirty="0"/>
           </a:p>
@@ -1009,7 +1017,7 @@
           <a:p>
             <a:fld id="{C6996B83-60CF-42A8-BA06-F99D0BEC30B3}" type="datetime1">
               <a:rPr lang="en-US" smtClean="0"/>
-              <a:t>8/7/2017</a:t>
+              <a:t>5/14/2018</a:t>
             </a:fld>
             <a:endParaRPr lang="en-US" dirty="0"/>
           </a:p>
@@ -1229,7 +1237,7 @@
                 </a:solidFill>
               </a:rPr>
               <a:pPr/>
-              <a:t>8/7/2017</a:t>
+              <a:t>5/14/2018</a:t>
             </a:fld>
             <a:endParaRPr lang="en-US" dirty="0">
               <a:solidFill>
@@ -1439,7 +1447,7 @@
                 </a:solidFill>
               </a:rPr>
               <a:pPr/>
-              <a:t>8/7/2017</a:t>
+              <a:t>5/14/2018</a:t>
             </a:fld>
             <a:endParaRPr lang="en-US" dirty="0">
               <a:solidFill>
@@ -1649,7 +1657,7 @@
                 </a:solidFill>
               </a:rPr>
               <a:pPr/>
-              <a:t>8/7/2017</a:t>
+              <a:t>5/14/2018</a:t>
             </a:fld>
             <a:endParaRPr lang="en-US" dirty="0">
               <a:solidFill>
@@ -1955,7 +1963,7 @@
                 <a:tabLst/>
                 <a:defRPr/>
               </a:pPr>
-              <a:t>8/7/2017</a:t>
+              <a:t>5/14/2018</a:t>
             </a:fld>
             <a:endParaRPr kumimoji="0" lang="en-US" sz="1800" b="0" i="0" u="none" strike="noStrike" kern="0" cap="none" spc="0" normalizeH="0" baseline="0" noProof="0" dirty="0">
               <a:ln>
@@ -2185,7 +2193,7 @@
                 </a:solidFill>
               </a:rPr>
               <a:pPr/>
-              <a:t>8/7/2017</a:t>
+              <a:t>5/14/2018</a:t>
             </a:fld>
             <a:endParaRPr lang="en-US" dirty="0">
               <a:solidFill>
@@ -2426,7 +2434,7 @@
                 </a:solidFill>
               </a:rPr>
               <a:pPr/>
-              <a:t>8/7/2017</a:t>
+              <a:t>5/14/2018</a:t>
             </a:fld>
             <a:endParaRPr lang="en-US" dirty="0">
               <a:solidFill>
@@ -2636,7 +2644,7 @@
                 </a:solidFill>
               </a:rPr>
               <a:pPr/>
-              <a:t>8/7/2017</a:t>
+              <a:t>5/14/2018</a:t>
             </a:fld>
             <a:endParaRPr lang="en-US" dirty="0">
               <a:solidFill>
@@ -2846,7 +2854,7 @@
                 </a:solidFill>
               </a:rPr>
               <a:pPr/>
-              <a:t>8/7/2017</a:t>
+              <a:t>5/14/2018</a:t>
             </a:fld>
             <a:endParaRPr lang="en-US" dirty="0">
               <a:solidFill>
@@ -3056,7 +3064,7 @@
                 </a:solidFill>
               </a:rPr>
               <a:pPr/>
-              <a:t>8/7/2017</a:t>
+              <a:t>5/14/2018</a:t>
             </a:fld>
             <a:endParaRPr lang="en-US" dirty="0">
               <a:solidFill>
@@ -3266,7 +3274,7 @@
                 </a:solidFill>
               </a:rPr>
               <a:pPr/>
-              <a:t>8/7/2017</a:t>
+              <a:t>5/14/2018</a:t>
             </a:fld>
             <a:endParaRPr lang="en-US" dirty="0">
               <a:solidFill>
@@ -3440,7 +3448,7 @@
           <a:p>
             <a:fld id="{B079C3B8-7366-4A44-A34B-3977080C19E7}" type="datetime1">
               <a:rPr lang="en-US" smtClean="0"/>
-              <a:t>8/7/2017</a:t>
+              <a:t>5/14/2018</a:t>
             </a:fld>
             <a:endParaRPr lang="en-US" dirty="0"/>
           </a:p>
@@ -3661,7 +3669,7 @@
                 </a:solidFill>
               </a:rPr>
               <a:pPr/>
-              <a:t>8/7/2017</a:t>
+              <a:t>5/14/2018</a:t>
             </a:fld>
             <a:endParaRPr lang="en-US" dirty="0">
               <a:solidFill>
@@ -3967,7 +3975,7 @@
                 <a:tabLst/>
                 <a:defRPr/>
               </a:pPr>
-              <a:t>8/7/2017</a:t>
+              <a:t>5/14/2018</a:t>
             </a:fld>
             <a:endParaRPr kumimoji="0" lang="en-US" sz="1800" b="0" i="0" u="none" strike="noStrike" kern="0" cap="none" spc="0" normalizeH="0" baseline="0" noProof="0" dirty="0">
               <a:ln>
@@ -4197,7 +4205,7 @@
                 </a:solidFill>
               </a:rPr>
               <a:pPr/>
-              <a:t>8/7/2017</a:t>
+              <a:t>5/14/2018</a:t>
             </a:fld>
             <a:endParaRPr lang="en-US" dirty="0">
               <a:solidFill>
@@ -4438,7 +4446,7 @@
                 </a:solidFill>
               </a:rPr>
               <a:pPr/>
-              <a:t>8/7/2017</a:t>
+              <a:t>5/14/2018</a:t>
             </a:fld>
             <a:endParaRPr lang="en-US" dirty="0">
               <a:solidFill>
@@ -4648,7 +4656,7 @@
                 </a:solidFill>
               </a:rPr>
               <a:pPr/>
-              <a:t>8/7/2017</a:t>
+              <a:t>5/14/2018</a:t>
             </a:fld>
             <a:endParaRPr lang="en-US" dirty="0">
               <a:solidFill>
@@ -4858,7 +4866,7 @@
                 </a:solidFill>
               </a:rPr>
               <a:pPr/>
-              <a:t>8/7/2017</a:t>
+              <a:t>5/14/2018</a:t>
             </a:fld>
             <a:endParaRPr lang="en-US" dirty="0">
               <a:solidFill>
@@ -5068,7 +5076,7 @@
                 </a:solidFill>
               </a:rPr>
               <a:pPr/>
-              <a:t>8/7/2017</a:t>
+              <a:t>5/14/2018</a:t>
             </a:fld>
             <a:endParaRPr lang="en-US" dirty="0">
               <a:solidFill>
@@ -5278,7 +5286,7 @@
                 </a:solidFill>
               </a:rPr>
               <a:pPr/>
-              <a:t>8/7/2017</a:t>
+              <a:t>5/14/2018</a:t>
             </a:fld>
             <a:endParaRPr lang="en-US" dirty="0">
               <a:solidFill>
@@ -5488,7 +5496,7 @@
                 </a:solidFill>
               </a:rPr>
               <a:pPr/>
-              <a:t>8/7/2017</a:t>
+              <a:t>5/14/2018</a:t>
             </a:fld>
             <a:endParaRPr lang="en-US" dirty="0">
               <a:solidFill>
@@ -5794,7 +5802,7 @@
                 <a:tabLst/>
                 <a:defRPr/>
               </a:pPr>
-              <a:t>8/7/2017</a:t>
+              <a:t>5/14/2018</a:t>
             </a:fld>
             <a:endParaRPr kumimoji="0" lang="en-US" sz="1800" b="0" i="0" u="none" strike="noStrike" kern="0" cap="none" spc="0" normalizeH="0" baseline="0" noProof="0" dirty="0">
               <a:ln>
@@ -6024,7 +6032,7 @@
                 </a:solidFill>
               </a:rPr>
               <a:pPr/>
-              <a:t>8/7/2017</a:t>
+              <a:t>5/14/2018</a:t>
             </a:fld>
             <a:endParaRPr lang="en-US" dirty="0">
               <a:solidFill>
@@ -6234,7 +6242,7 @@
                 </a:solidFill>
               </a:rPr>
               <a:pPr/>
-              <a:t>8/7/2017</a:t>
+              <a:t>5/14/2018</a:t>
             </a:fld>
             <a:endParaRPr lang="en-US" dirty="0">
               <a:solidFill>
@@ -6475,7 +6483,7 @@
                 </a:solidFill>
               </a:rPr>
               <a:pPr/>
-              <a:t>8/7/2017</a:t>
+              <a:t>5/14/2018</a:t>
             </a:fld>
             <a:endParaRPr lang="en-US" dirty="0">
               <a:solidFill>
@@ -6654,7 +6662,7 @@
                 </a:solidFill>
               </a:rPr>
               <a:pPr/>
-              <a:t>8/7/2017</a:t>
+              <a:t>5/14/2018</a:t>
             </a:fld>
             <a:endParaRPr lang="en-US" dirty="0">
               <a:solidFill>
@@ -6895,7 +6903,7 @@
                 </a:solidFill>
               </a:rPr>
               <a:pPr/>
-              <a:t>8/7/2017</a:t>
+              <a:t>5/14/2018</a:t>
             </a:fld>
             <a:endParaRPr lang="en-US" dirty="0">
               <a:solidFill>
@@ -7105,7 +7113,7 @@
                 </a:solidFill>
               </a:rPr>
               <a:pPr/>
-              <a:t>8/7/2017</a:t>
+              <a:t>5/14/2018</a:t>
             </a:fld>
             <a:endParaRPr lang="en-US" dirty="0">
               <a:solidFill>
@@ -7284,7 +7292,7 @@
                 </a:solidFill>
               </a:rPr>
               <a:pPr/>
-              <a:t>8/7/2017</a:t>
+              <a:t>5/14/2018</a:t>
             </a:fld>
             <a:endParaRPr lang="en-US" dirty="0">
               <a:solidFill>
@@ -7525,7 +7533,7 @@
                 </a:solidFill>
               </a:rPr>
               <a:pPr/>
-              <a:t>8/7/2017</a:t>
+              <a:t>5/14/2018</a:t>
             </a:fld>
             <a:endParaRPr lang="en-US" dirty="0">
               <a:solidFill>
@@ -7735,7 +7743,7 @@
                 </a:solidFill>
               </a:rPr>
               <a:pPr/>
-              <a:t>8/7/2017</a:t>
+              <a:t>5/14/2018</a:t>
             </a:fld>
             <a:endParaRPr lang="en-US" dirty="0">
               <a:solidFill>
@@ -7780,7 +7788,7 @@
     </p:spTree>
     <p:extLst>
       <p:ext uri="{BB962C8B-B14F-4D97-AF65-F5344CB8AC3E}">
-        <p14:creationId xmlns:p14="http://schemas.microsoft.com/office/powerpoint/2010/main" val="3662995644"/>
+        <p14:creationId xmlns:p14="http://schemas.microsoft.com/office/powerpoint/2010/main" val="1119002506"/>
       </p:ext>
     </p:extLst>
   </p:cSld>
@@ -7945,7 +7953,7 @@
                 </a:solidFill>
               </a:rPr>
               <a:pPr/>
-              <a:t>8/7/2017</a:t>
+              <a:t>5/14/2018</a:t>
             </a:fld>
             <a:endParaRPr lang="en-US" dirty="0">
               <a:solidFill>
@@ -7990,7 +7998,7 @@
     </p:spTree>
     <p:extLst>
       <p:ext uri="{BB962C8B-B14F-4D97-AF65-F5344CB8AC3E}">
-        <p14:creationId xmlns:p14="http://schemas.microsoft.com/office/powerpoint/2010/main" val="2906120500"/>
+        <p14:creationId xmlns:p14="http://schemas.microsoft.com/office/powerpoint/2010/main" val="3662995644"/>
       </p:ext>
     </p:extLst>
   </p:cSld>
@@ -8050,12 +8058,43 @@
       </p:sp>
       <p:sp>
         <p:nvSpPr>
-          <p:cNvPr id="4" name="Footer Placeholder 3"/>
-          <p:cNvSpPr>
-            <a:spLocks noGrp="1"/>
-          </p:cNvSpPr>
-          <p:nvPr>
-            <p:ph type="ftr" sz="quarter" idx="10"/>
+          <p:cNvPr id="4" name="Header Placeholder 3"/>
+          <p:cNvSpPr>
+            <a:spLocks noGrp="1"/>
+          </p:cNvSpPr>
+          <p:nvPr>
+            <p:ph type="hdr" sz="quarter" idx="10"/>
+          </p:nvPr>
+        </p:nvSpPr>
+        <p:spPr/>
+        <p:txBody>
+          <a:bodyPr/>
+          <a:lstStyle/>
+          <a:p>
+            <a:r>
+              <a:rPr lang="en-US">
+                <a:solidFill>
+                  <a:prstClr val="black"/>
+                </a:solidFill>
+              </a:rPr>
+              <a:t>Build 2014</a:t>
+            </a:r>
+            <a:endParaRPr lang="en-US" dirty="0">
+              <a:solidFill>
+                <a:prstClr val="black"/>
+              </a:solidFill>
+            </a:endParaRPr>
+          </a:p>
+        </p:txBody>
+      </p:sp>
+      <p:sp>
+        <p:nvSpPr>
+          <p:cNvPr id="5" name="Footer Placeholder 4"/>
+          <p:cNvSpPr>
+            <a:spLocks noGrp="1"/>
+          </p:cNvSpPr>
+          <p:nvPr>
+            <p:ph type="ftr" sz="quarter" idx="11"/>
           </p:nvPr>
         </p:nvSpPr>
         <p:spPr/>
@@ -8104,12 +8143,12 @@
       </p:sp>
       <p:sp>
         <p:nvSpPr>
-          <p:cNvPr id="5" name="Date Placeholder 4"/>
-          <p:cNvSpPr>
-            <a:spLocks noGrp="1"/>
-          </p:cNvSpPr>
-          <p:nvPr>
-            <p:ph type="dt" idx="11"/>
+          <p:cNvPr id="6" name="Date Placeholder 5"/>
+          <p:cNvSpPr>
+            <a:spLocks noGrp="1"/>
+          </p:cNvSpPr>
+          <p:nvPr>
+            <p:ph type="dt" idx="12"/>
           </p:nvPr>
         </p:nvSpPr>
         <p:spPr/>
@@ -8117,14 +8156,14 @@
           <a:bodyPr/>
           <a:lstStyle/>
           <a:p>
-            <a:fld id="{FCF63DAE-D37E-4C44-BD81-0E251F1BE300}" type="datetime1">
+            <a:fld id="{9F00D60D-1703-4D24-8308-FEE06A50A69C}" type="datetime1">
               <a:rPr lang="en-US" smtClean="0">
                 <a:solidFill>
                   <a:prstClr val="black"/>
                 </a:solidFill>
               </a:rPr>
               <a:pPr/>
-              <a:t>8/7/2017</a:t>
+              <a:t>5/14/2018</a:t>
             </a:fld>
             <a:endParaRPr lang="en-US" dirty="0">
               <a:solidFill>
@@ -8136,12 +8175,12 @@
       </p:sp>
       <p:sp>
         <p:nvSpPr>
-          <p:cNvPr id="6" name="Slide Number Placeholder 5"/>
-          <p:cNvSpPr>
-            <a:spLocks noGrp="1"/>
-          </p:cNvSpPr>
-          <p:nvPr>
-            <p:ph type="sldNum" sz="quarter" idx="12"/>
+          <p:cNvPr id="7" name="Slide Number Placeholder 6"/>
+          <p:cNvSpPr>
+            <a:spLocks noGrp="1"/>
+          </p:cNvSpPr>
+          <p:nvPr>
+            <p:ph type="sldNum" sz="quarter" idx="13"/>
           </p:nvPr>
         </p:nvSpPr>
         <p:spPr/>
@@ -8166,41 +8205,10 @@
           </a:p>
         </p:txBody>
       </p:sp>
-      <p:sp>
-        <p:nvSpPr>
-          <p:cNvPr id="7" name="Header Placeholder 6"/>
-          <p:cNvSpPr>
-            <a:spLocks noGrp="1"/>
-          </p:cNvSpPr>
-          <p:nvPr>
-            <p:ph type="hdr" sz="quarter" idx="13"/>
-          </p:nvPr>
-        </p:nvSpPr>
-        <p:spPr/>
-        <p:txBody>
-          <a:bodyPr/>
-          <a:lstStyle/>
-          <a:p>
-            <a:r>
-              <a:rPr lang="en-US">
-                <a:solidFill>
-                  <a:prstClr val="black"/>
-                </a:solidFill>
-              </a:rPr>
-              <a:t>Build 2014</a:t>
-            </a:r>
-            <a:endParaRPr lang="en-US" dirty="0">
-              <a:solidFill>
-                <a:prstClr val="black"/>
-              </a:solidFill>
-            </a:endParaRPr>
-          </a:p>
-        </p:txBody>
-      </p:sp>
     </p:spTree>
     <p:extLst>
       <p:ext uri="{BB962C8B-B14F-4D97-AF65-F5344CB8AC3E}">
-        <p14:creationId xmlns:p14="http://schemas.microsoft.com/office/powerpoint/2010/main" val="472659781"/>
+        <p14:creationId xmlns:p14="http://schemas.microsoft.com/office/powerpoint/2010/main" val="2906120500"/>
       </p:ext>
     </p:extLst>
   </p:cSld>
@@ -8365,7 +8373,7 @@
                 </a:solidFill>
               </a:rPr>
               <a:pPr/>
-              <a:t>8/7/2017</a:t>
+              <a:t>5/14/2018</a:t>
             </a:fld>
             <a:endParaRPr lang="en-US" dirty="0">
               <a:solidFill>
@@ -8470,43 +8478,12 @@
       </p:sp>
       <p:sp>
         <p:nvSpPr>
-          <p:cNvPr id="4" name="Header Placeholder 3"/>
-          <p:cNvSpPr>
-            <a:spLocks noGrp="1"/>
-          </p:cNvSpPr>
-          <p:nvPr>
-            <p:ph type="hdr" sz="quarter" idx="10"/>
-          </p:nvPr>
-        </p:nvSpPr>
-        <p:spPr/>
-        <p:txBody>
-          <a:bodyPr/>
-          <a:lstStyle/>
-          <a:p>
-            <a:r>
-              <a:rPr lang="en-US">
-                <a:solidFill>
-                  <a:prstClr val="black"/>
-                </a:solidFill>
-              </a:rPr>
-              <a:t>Build 2014</a:t>
-            </a:r>
-            <a:endParaRPr lang="en-US" dirty="0">
-              <a:solidFill>
-                <a:prstClr val="black"/>
-              </a:solidFill>
-            </a:endParaRPr>
-          </a:p>
-        </p:txBody>
-      </p:sp>
-      <p:sp>
-        <p:nvSpPr>
-          <p:cNvPr id="5" name="Footer Placeholder 4"/>
-          <p:cNvSpPr>
-            <a:spLocks noGrp="1"/>
-          </p:cNvSpPr>
-          <p:nvPr>
-            <p:ph type="ftr" sz="quarter" idx="11"/>
+          <p:cNvPr id="4" name="Footer Placeholder 3"/>
+          <p:cNvSpPr>
+            <a:spLocks noGrp="1"/>
+          </p:cNvSpPr>
+          <p:nvPr>
+            <p:ph type="ftr" sz="quarter" idx="10"/>
           </p:nvPr>
         </p:nvSpPr>
         <p:spPr/>
@@ -8555,12 +8532,12 @@
       </p:sp>
       <p:sp>
         <p:nvSpPr>
-          <p:cNvPr id="6" name="Date Placeholder 5"/>
-          <p:cNvSpPr>
-            <a:spLocks noGrp="1"/>
-          </p:cNvSpPr>
-          <p:nvPr>
-            <p:ph type="dt" idx="12"/>
+          <p:cNvPr id="5" name="Date Placeholder 4"/>
+          <p:cNvSpPr>
+            <a:spLocks noGrp="1"/>
+          </p:cNvSpPr>
+          <p:nvPr>
+            <p:ph type="dt" idx="11"/>
           </p:nvPr>
         </p:nvSpPr>
         <p:spPr/>
@@ -8568,14 +8545,14 @@
           <a:bodyPr/>
           <a:lstStyle/>
           <a:p>
-            <a:fld id="{9F00D60D-1703-4D24-8308-FEE06A50A69C}" type="datetime1">
+            <a:fld id="{FCF63DAE-D37E-4C44-BD81-0E251F1BE300}" type="datetime1">
               <a:rPr lang="en-US" smtClean="0">
                 <a:solidFill>
                   <a:prstClr val="black"/>
                 </a:solidFill>
               </a:rPr>
               <a:pPr/>
-              <a:t>8/7/2017</a:t>
+              <a:t>5/14/2018</a:t>
             </a:fld>
             <a:endParaRPr lang="en-US" dirty="0">
               <a:solidFill>
@@ -8587,12 +8564,12 @@
       </p:sp>
       <p:sp>
         <p:nvSpPr>
-          <p:cNvPr id="7" name="Slide Number Placeholder 6"/>
-          <p:cNvSpPr>
-            <a:spLocks noGrp="1"/>
-          </p:cNvSpPr>
-          <p:nvPr>
-            <p:ph type="sldNum" sz="quarter" idx="13"/>
+          <p:cNvPr id="6" name="Slide Number Placeholder 5"/>
+          <p:cNvSpPr>
+            <a:spLocks noGrp="1"/>
+          </p:cNvSpPr>
+          <p:nvPr>
+            <p:ph type="sldNum" sz="quarter" idx="12"/>
           </p:nvPr>
         </p:nvSpPr>
         <p:spPr/>
@@ -8617,10 +8594,41 @@
           </a:p>
         </p:txBody>
       </p:sp>
+      <p:sp>
+        <p:nvSpPr>
+          <p:cNvPr id="7" name="Header Placeholder 6"/>
+          <p:cNvSpPr>
+            <a:spLocks noGrp="1"/>
+          </p:cNvSpPr>
+          <p:nvPr>
+            <p:ph type="hdr" sz="quarter" idx="13"/>
+          </p:nvPr>
+        </p:nvSpPr>
+        <p:spPr/>
+        <p:txBody>
+          <a:bodyPr/>
+          <a:lstStyle/>
+          <a:p>
+            <a:r>
+              <a:rPr lang="en-US">
+                <a:solidFill>
+                  <a:prstClr val="black"/>
+                </a:solidFill>
+              </a:rPr>
+              <a:t>Build 2014</a:t>
+            </a:r>
+            <a:endParaRPr lang="en-US" dirty="0">
+              <a:solidFill>
+                <a:prstClr val="black"/>
+              </a:solidFill>
+            </a:endParaRPr>
+          </a:p>
+        </p:txBody>
+      </p:sp>
     </p:spTree>
     <p:extLst>
       <p:ext uri="{BB962C8B-B14F-4D97-AF65-F5344CB8AC3E}">
-        <p14:creationId xmlns:p14="http://schemas.microsoft.com/office/powerpoint/2010/main" val="2639183544"/>
+        <p14:creationId xmlns:p14="http://schemas.microsoft.com/office/powerpoint/2010/main" val="585965803"/>
       </p:ext>
     </p:extLst>
   </p:cSld>
@@ -8680,12 +8688,43 @@
       </p:sp>
       <p:sp>
         <p:nvSpPr>
-          <p:cNvPr id="4" name="Footer Placeholder 3"/>
-          <p:cNvSpPr>
-            <a:spLocks noGrp="1"/>
-          </p:cNvSpPr>
-          <p:nvPr>
-            <p:ph type="ftr" sz="quarter" idx="10"/>
+          <p:cNvPr id="4" name="Header Placeholder 3"/>
+          <p:cNvSpPr>
+            <a:spLocks noGrp="1"/>
+          </p:cNvSpPr>
+          <p:nvPr>
+            <p:ph type="hdr" sz="quarter" idx="10"/>
+          </p:nvPr>
+        </p:nvSpPr>
+        <p:spPr/>
+        <p:txBody>
+          <a:bodyPr/>
+          <a:lstStyle/>
+          <a:p>
+            <a:r>
+              <a:rPr lang="en-US">
+                <a:solidFill>
+                  <a:prstClr val="black"/>
+                </a:solidFill>
+              </a:rPr>
+              <a:t>Build 2014</a:t>
+            </a:r>
+            <a:endParaRPr lang="en-US" dirty="0">
+              <a:solidFill>
+                <a:prstClr val="black"/>
+              </a:solidFill>
+            </a:endParaRPr>
+          </a:p>
+        </p:txBody>
+      </p:sp>
+      <p:sp>
+        <p:nvSpPr>
+          <p:cNvPr id="5" name="Footer Placeholder 4"/>
+          <p:cNvSpPr>
+            <a:spLocks noGrp="1"/>
+          </p:cNvSpPr>
+          <p:nvPr>
+            <p:ph type="ftr" sz="quarter" idx="11"/>
           </p:nvPr>
         </p:nvSpPr>
         <p:spPr/>
@@ -8734,12 +8773,12 @@
       </p:sp>
       <p:sp>
         <p:nvSpPr>
-          <p:cNvPr id="5" name="Date Placeholder 4"/>
-          <p:cNvSpPr>
-            <a:spLocks noGrp="1"/>
-          </p:cNvSpPr>
-          <p:nvPr>
-            <p:ph type="dt" idx="11"/>
+          <p:cNvPr id="6" name="Date Placeholder 5"/>
+          <p:cNvSpPr>
+            <a:spLocks noGrp="1"/>
+          </p:cNvSpPr>
+          <p:nvPr>
+            <p:ph type="dt" idx="12"/>
           </p:nvPr>
         </p:nvSpPr>
         <p:spPr/>
@@ -8747,14 +8786,14 @@
           <a:bodyPr/>
           <a:lstStyle/>
           <a:p>
-            <a:fld id="{FCF63DAE-D37E-4C44-BD81-0E251F1BE300}" type="datetime1">
+            <a:fld id="{9F00D60D-1703-4D24-8308-FEE06A50A69C}" type="datetime1">
               <a:rPr lang="en-US" smtClean="0">
                 <a:solidFill>
                   <a:prstClr val="black"/>
                 </a:solidFill>
               </a:rPr>
               <a:pPr/>
-              <a:t>8/7/2017</a:t>
+              <a:t>5/14/2018</a:t>
             </a:fld>
             <a:endParaRPr lang="en-US" dirty="0">
               <a:solidFill>
@@ -8766,12 +8805,12 @@
       </p:sp>
       <p:sp>
         <p:nvSpPr>
-          <p:cNvPr id="6" name="Slide Number Placeholder 5"/>
-          <p:cNvSpPr>
-            <a:spLocks noGrp="1"/>
-          </p:cNvSpPr>
-          <p:nvPr>
-            <p:ph type="sldNum" sz="quarter" idx="12"/>
+          <p:cNvPr id="7" name="Slide Number Placeholder 6"/>
+          <p:cNvSpPr>
+            <a:spLocks noGrp="1"/>
+          </p:cNvSpPr>
+          <p:nvPr>
+            <p:ph type="sldNum" sz="quarter" idx="13"/>
           </p:nvPr>
         </p:nvSpPr>
         <p:spPr/>
@@ -8796,41 +8835,10 @@
           </a:p>
         </p:txBody>
       </p:sp>
-      <p:sp>
-        <p:nvSpPr>
-          <p:cNvPr id="7" name="Header Placeholder 6"/>
-          <p:cNvSpPr>
-            <a:spLocks noGrp="1"/>
-          </p:cNvSpPr>
-          <p:nvPr>
-            <p:ph type="hdr" sz="quarter" idx="13"/>
-          </p:nvPr>
-        </p:nvSpPr>
-        <p:spPr/>
-        <p:txBody>
-          <a:bodyPr/>
-          <a:lstStyle/>
-          <a:p>
-            <a:r>
-              <a:rPr lang="en-US">
-                <a:solidFill>
-                  <a:prstClr val="black"/>
-                </a:solidFill>
-              </a:rPr>
-              <a:t>Build 2014</a:t>
-            </a:r>
-            <a:endParaRPr lang="en-US" dirty="0">
-              <a:solidFill>
-                <a:prstClr val="black"/>
-              </a:solidFill>
-            </a:endParaRPr>
-          </a:p>
-        </p:txBody>
-      </p:sp>
     </p:spTree>
     <p:extLst>
       <p:ext uri="{BB962C8B-B14F-4D97-AF65-F5344CB8AC3E}">
-        <p14:creationId xmlns:p14="http://schemas.microsoft.com/office/powerpoint/2010/main" val="585965803"/>
+        <p14:creationId xmlns:p14="http://schemas.microsoft.com/office/powerpoint/2010/main" val="1304618400"/>
       </p:ext>
     </p:extLst>
   </p:cSld>
@@ -8890,43 +8898,12 @@
       </p:sp>
       <p:sp>
         <p:nvSpPr>
-          <p:cNvPr id="4" name="Header Placeholder 3"/>
-          <p:cNvSpPr>
-            <a:spLocks noGrp="1"/>
-          </p:cNvSpPr>
-          <p:nvPr>
-            <p:ph type="hdr" sz="quarter" idx="10"/>
-          </p:nvPr>
-        </p:nvSpPr>
-        <p:spPr/>
-        <p:txBody>
-          <a:bodyPr/>
-          <a:lstStyle/>
-          <a:p>
-            <a:r>
-              <a:rPr lang="en-US">
-                <a:solidFill>
-                  <a:prstClr val="black"/>
-                </a:solidFill>
-              </a:rPr>
-              <a:t>Build 2014</a:t>
-            </a:r>
-            <a:endParaRPr lang="en-US" dirty="0">
-              <a:solidFill>
-                <a:prstClr val="black"/>
-              </a:solidFill>
-            </a:endParaRPr>
-          </a:p>
-        </p:txBody>
-      </p:sp>
-      <p:sp>
-        <p:nvSpPr>
-          <p:cNvPr id="5" name="Footer Placeholder 4"/>
-          <p:cNvSpPr>
-            <a:spLocks noGrp="1"/>
-          </p:cNvSpPr>
-          <p:nvPr>
-            <p:ph type="ftr" sz="quarter" idx="11"/>
+          <p:cNvPr id="4" name="Footer Placeholder 3"/>
+          <p:cNvSpPr>
+            <a:spLocks noGrp="1"/>
+          </p:cNvSpPr>
+          <p:nvPr>
+            <p:ph type="ftr" sz="quarter" idx="10"/>
           </p:nvPr>
         </p:nvSpPr>
         <p:spPr/>
@@ -8975,12 +8952,12 @@
       </p:sp>
       <p:sp>
         <p:nvSpPr>
-          <p:cNvPr id="6" name="Date Placeholder 5"/>
-          <p:cNvSpPr>
-            <a:spLocks noGrp="1"/>
-          </p:cNvSpPr>
-          <p:nvPr>
-            <p:ph type="dt" idx="12"/>
+          <p:cNvPr id="5" name="Date Placeholder 4"/>
+          <p:cNvSpPr>
+            <a:spLocks noGrp="1"/>
+          </p:cNvSpPr>
+          <p:nvPr>
+            <p:ph type="dt" idx="11"/>
           </p:nvPr>
         </p:nvSpPr>
         <p:spPr/>
@@ -8988,14 +8965,14 @@
           <a:bodyPr/>
           <a:lstStyle/>
           <a:p>
-            <a:fld id="{9F00D60D-1703-4D24-8308-FEE06A50A69C}" type="datetime1">
+            <a:fld id="{FCF63DAE-D37E-4C44-BD81-0E251F1BE300}" type="datetime1">
               <a:rPr lang="en-US" smtClean="0">
                 <a:solidFill>
                   <a:prstClr val="black"/>
                 </a:solidFill>
               </a:rPr>
               <a:pPr/>
-              <a:t>8/7/2017</a:t>
+              <a:t>5/14/2018</a:t>
             </a:fld>
             <a:endParaRPr lang="en-US" dirty="0">
               <a:solidFill>
@@ -9007,12 +8984,12 @@
       </p:sp>
       <p:sp>
         <p:nvSpPr>
-          <p:cNvPr id="7" name="Slide Number Placeholder 6"/>
-          <p:cNvSpPr>
-            <a:spLocks noGrp="1"/>
-          </p:cNvSpPr>
-          <p:nvPr>
-            <p:ph type="sldNum" sz="quarter" idx="13"/>
+          <p:cNvPr id="6" name="Slide Number Placeholder 5"/>
+          <p:cNvSpPr>
+            <a:spLocks noGrp="1"/>
+          </p:cNvSpPr>
+          <p:nvPr>
+            <p:ph type="sldNum" sz="quarter" idx="12"/>
           </p:nvPr>
         </p:nvSpPr>
         <p:spPr/>
@@ -9037,10 +9014,251 @@
           </a:p>
         </p:txBody>
       </p:sp>
+      <p:sp>
+        <p:nvSpPr>
+          <p:cNvPr id="7" name="Header Placeholder 6"/>
+          <p:cNvSpPr>
+            <a:spLocks noGrp="1"/>
+          </p:cNvSpPr>
+          <p:nvPr>
+            <p:ph type="hdr" sz="quarter" idx="13"/>
+          </p:nvPr>
+        </p:nvSpPr>
+        <p:spPr/>
+        <p:txBody>
+          <a:bodyPr/>
+          <a:lstStyle/>
+          <a:p>
+            <a:r>
+              <a:rPr lang="en-US">
+                <a:solidFill>
+                  <a:prstClr val="black"/>
+                </a:solidFill>
+              </a:rPr>
+              <a:t>Build 2014</a:t>
+            </a:r>
+            <a:endParaRPr lang="en-US" dirty="0">
+              <a:solidFill>
+                <a:prstClr val="black"/>
+              </a:solidFill>
+            </a:endParaRPr>
+          </a:p>
+        </p:txBody>
+      </p:sp>
     </p:spTree>
     <p:extLst>
       <p:ext uri="{BB962C8B-B14F-4D97-AF65-F5344CB8AC3E}">
-        <p14:creationId xmlns:p14="http://schemas.microsoft.com/office/powerpoint/2010/main" val="1304618400"/>
+        <p14:creationId xmlns:p14="http://schemas.microsoft.com/office/powerpoint/2010/main" val="1040945079"/>
+      </p:ext>
+    </p:extLst>
+  </p:cSld>
+  <p:clrMapOvr>
+    <a:masterClrMapping/>
+  </p:clrMapOvr>
+</p:notes>
+</file>
+
+<file path=ppt/notesSlides/notesSlide43.xml><?xml version="1.0" encoding="utf-8"?>
+<p:notes xmlns:a="http://schemas.openxmlformats.org/drawingml/2006/main" xmlns:r="http://schemas.openxmlformats.org/officeDocument/2006/relationships" xmlns:p="http://schemas.openxmlformats.org/presentationml/2006/main">
+  <p:cSld>
+    <p:spTree>
+      <p:nvGrpSpPr>
+        <p:cNvPr id="1" name=""/>
+        <p:cNvGrpSpPr/>
+        <p:nvPr/>
+      </p:nvGrpSpPr>
+      <p:grpSpPr>
+        <a:xfrm>
+          <a:off x="0" y="0"/>
+          <a:ext cx="0" cy="0"/>
+          <a:chOff x="0" y="0"/>
+          <a:chExt cx="0" cy="0"/>
+        </a:xfrm>
+      </p:grpSpPr>
+      <p:sp>
+        <p:nvSpPr>
+          <p:cNvPr id="2" name="Slide Image Placeholder 1"/>
+          <p:cNvSpPr>
+            <a:spLocks noGrp="1" noRot="1" noChangeAspect="1"/>
+          </p:cNvSpPr>
+          <p:nvPr>
+            <p:ph type="sldImg"/>
+          </p:nvPr>
+        </p:nvSpPr>
+        <p:spPr/>
+      </p:sp>
+      <p:sp>
+        <p:nvSpPr>
+          <p:cNvPr id="3" name="Notes Placeholder 2"/>
+          <p:cNvSpPr>
+            <a:spLocks noGrp="1"/>
+          </p:cNvSpPr>
+          <p:nvPr>
+            <p:ph type="body" idx="1"/>
+          </p:nvPr>
+        </p:nvSpPr>
+        <p:spPr/>
+        <p:txBody>
+          <a:bodyPr/>
+          <a:lstStyle/>
+          <a:p>
+            <a:endParaRPr lang="en-US"/>
+          </a:p>
+        </p:txBody>
+      </p:sp>
+      <p:sp>
+        <p:nvSpPr>
+          <p:cNvPr id="4" name="Header Placeholder 3"/>
+          <p:cNvSpPr>
+            <a:spLocks noGrp="1"/>
+          </p:cNvSpPr>
+          <p:nvPr>
+            <p:ph type="hdr" sz="quarter" idx="10"/>
+          </p:nvPr>
+        </p:nvSpPr>
+        <p:spPr/>
+        <p:txBody>
+          <a:bodyPr/>
+          <a:lstStyle/>
+          <a:p>
+            <a:r>
+              <a:rPr lang="en-US">
+                <a:solidFill>
+                  <a:prstClr val="black"/>
+                </a:solidFill>
+              </a:rPr>
+              <a:t>Build 2014</a:t>
+            </a:r>
+            <a:endParaRPr lang="en-US" dirty="0">
+              <a:solidFill>
+                <a:prstClr val="black"/>
+              </a:solidFill>
+            </a:endParaRPr>
+          </a:p>
+        </p:txBody>
+      </p:sp>
+      <p:sp>
+        <p:nvSpPr>
+          <p:cNvPr id="5" name="Footer Placeholder 4"/>
+          <p:cNvSpPr>
+            <a:spLocks noGrp="1"/>
+          </p:cNvSpPr>
+          <p:nvPr>
+            <p:ph type="ftr" sz="quarter" idx="11"/>
+          </p:nvPr>
+        </p:nvSpPr>
+        <p:spPr/>
+        <p:txBody>
+          <a:bodyPr/>
+          <a:lstStyle/>
+          <a:p>
+            <a:pPr defTabSz="914099" eaLnBrk="0" hangingPunct="0"/>
+            <a:r>
+              <a:rPr lang="en-US" sz="400">
+                <a:gradFill>
+                  <a:gsLst>
+                    <a:gs pos="0">
+                      <a:prstClr val="black"/>
+                    </a:gs>
+                    <a:gs pos="100000">
+                      <a:prstClr val="black"/>
+                    </a:gs>
+                  </a:gsLst>
+                  <a:lin ang="5400000" scaled="0"/>
+                </a:gradFill>
+                <a:latin typeface="Segoe UI" pitchFamily="34" charset="0"/>
+                <a:ea typeface="Segoe UI" pitchFamily="34" charset="0"/>
+                <a:cs typeface="Segoe UI" pitchFamily="34" charset="0"/>
+              </a:rPr>
+              <a:t>© 2014 Microsoft Corporation. All rights reserved. Microsoft, Windows, and other product names are or may be registered trademarks and/or trademarks in the U.S. and/or other countries. The information herein is for informational purposes only and represents the current view of Microsoft Corporation as of the date of this presentation.  Because Microsoft must respond to changing market conditions, it should not be interpreted to be a commitment on the part of Microsoft, and Microsoft cannot guarantee the accuracy of any information provided after the date of this presentation.  MICROSOFT MAKES NO WARRANTIES, EXPRESS, IMPLIED OR STATUTORY, AS TO THE INFORMATION IN THIS PRESENTATION.</a:t>
+            </a:r>
+            <a:endParaRPr lang="en-US" sz="400" dirty="0">
+              <a:gradFill>
+                <a:gsLst>
+                  <a:gs pos="0">
+                    <a:prstClr val="black"/>
+                  </a:gs>
+                  <a:gs pos="100000">
+                    <a:prstClr val="black"/>
+                  </a:gs>
+                </a:gsLst>
+                <a:lin ang="5400000" scaled="0"/>
+              </a:gradFill>
+              <a:latin typeface="Segoe UI" pitchFamily="34" charset="0"/>
+              <a:ea typeface="Segoe UI" pitchFamily="34" charset="0"/>
+              <a:cs typeface="Segoe UI" pitchFamily="34" charset="0"/>
+            </a:endParaRPr>
+          </a:p>
+        </p:txBody>
+      </p:sp>
+      <p:sp>
+        <p:nvSpPr>
+          <p:cNvPr id="6" name="Date Placeholder 5"/>
+          <p:cNvSpPr>
+            <a:spLocks noGrp="1"/>
+          </p:cNvSpPr>
+          <p:nvPr>
+            <p:ph type="dt" idx="12"/>
+          </p:nvPr>
+        </p:nvSpPr>
+        <p:spPr/>
+        <p:txBody>
+          <a:bodyPr/>
+          <a:lstStyle/>
+          <a:p>
+            <a:fld id="{9F00D60D-1703-4D24-8308-FEE06A50A69C}" type="datetime1">
+              <a:rPr lang="en-US" smtClean="0">
+                <a:solidFill>
+                  <a:prstClr val="black"/>
+                </a:solidFill>
+              </a:rPr>
+              <a:pPr/>
+              <a:t>5/14/2018</a:t>
+            </a:fld>
+            <a:endParaRPr lang="en-US" dirty="0">
+              <a:solidFill>
+                <a:prstClr val="black"/>
+              </a:solidFill>
+            </a:endParaRPr>
+          </a:p>
+        </p:txBody>
+      </p:sp>
+      <p:sp>
+        <p:nvSpPr>
+          <p:cNvPr id="7" name="Slide Number Placeholder 6"/>
+          <p:cNvSpPr>
+            <a:spLocks noGrp="1"/>
+          </p:cNvSpPr>
+          <p:nvPr>
+            <p:ph type="sldNum" sz="quarter" idx="13"/>
+          </p:nvPr>
+        </p:nvSpPr>
+        <p:spPr/>
+        <p:txBody>
+          <a:bodyPr/>
+          <a:lstStyle/>
+          <a:p>
+            <a:fld id="{B4008EB6-D09E-4580-8CD6-DDB14511944F}" type="slidenum">
+              <a:rPr lang="en-US" smtClean="0">
+                <a:solidFill>
+                  <a:prstClr val="black"/>
+                </a:solidFill>
+              </a:rPr>
+              <a:pPr/>
+              <a:t>46</a:t>
+            </a:fld>
+            <a:endParaRPr lang="en-US" dirty="0">
+              <a:solidFill>
+                <a:prstClr val="black"/>
+              </a:solidFill>
+            </a:endParaRPr>
+          </a:p>
+        </p:txBody>
+      </p:sp>
+    </p:spTree>
+    <p:extLst>
+      <p:ext uri="{BB962C8B-B14F-4D97-AF65-F5344CB8AC3E}">
+        <p14:creationId xmlns:p14="http://schemas.microsoft.com/office/powerpoint/2010/main" val="2338386375"/>
       </p:ext>
     </p:extLst>
   </p:cSld>
@@ -9205,7 +9423,7 @@
                 </a:solidFill>
               </a:rPr>
               <a:pPr/>
-              <a:t>8/7/2017</a:t>
+              <a:t>5/14/2018</a:t>
             </a:fld>
             <a:endParaRPr lang="en-US" dirty="0">
               <a:solidFill>
@@ -9415,7 +9633,7 @@
                 </a:solidFill>
               </a:rPr>
               <a:pPr/>
-              <a:t>8/7/2017</a:t>
+              <a:t>5/14/2018</a:t>
             </a:fld>
             <a:endParaRPr lang="en-US" dirty="0">
               <a:solidFill>
@@ -9625,7 +9843,7 @@
                 </a:solidFill>
               </a:rPr>
               <a:pPr/>
-              <a:t>8/7/2017</a:t>
+              <a:t>5/14/2018</a:t>
             </a:fld>
             <a:endParaRPr lang="en-US" dirty="0">
               <a:solidFill>
@@ -9835,7 +10053,7 @@
                 </a:solidFill>
               </a:rPr>
               <a:pPr/>
-              <a:t>8/7/2017</a:t>
+              <a:t>5/14/2018</a:t>
             </a:fld>
             <a:endParaRPr lang="en-US" dirty="0">
               <a:solidFill>
@@ -10045,7 +10263,7 @@
                 </a:solidFill>
               </a:rPr>
               <a:pPr/>
-              <a:t>8/7/2017</a:t>
+              <a:t>5/14/2018</a:t>
             </a:fld>
             <a:endParaRPr lang="en-US" dirty="0">
               <a:solidFill>
@@ -26010,13 +26228,6 @@
           </a:p>
           <a:p>
             <a:r>
-              <a:rPr lang="en-US" altLang="zh-CN" dirty="0"/>
-              <a:t>Teachers/Students</a:t>
-            </a:r>
-            <a:endParaRPr lang="en-US" dirty="0"/>
-          </a:p>
-          <a:p>
-            <a:r>
               <a:rPr lang="en-US" dirty="0"/>
               <a:t>Demo Helper</a:t>
             </a:r>
@@ -26193,7 +26404,13 @@
       </p:sp>
       <p:pic>
         <p:nvPicPr>
-          <p:cNvPr id="4" name="Picture 3"/>
+          <p:cNvPr id="6" name="Picture 5">
+            <a:extLst>
+              <a:ext uri="{FF2B5EF4-FFF2-40B4-BE49-F238E27FC236}">
+                <a16:creationId xmlns:a16="http://schemas.microsoft.com/office/drawing/2014/main" id="{B0A01391-03CF-4ED7-A2A7-F7710AD130A3}"/>
+              </a:ext>
+            </a:extLst>
+          </p:cNvPr>
           <p:cNvPicPr>
             <a:picLocks noChangeAspect="1"/>
           </p:cNvPicPr>
@@ -26207,8 +26424,8 @@
         </p:blipFill>
         <p:spPr>
           <a:xfrm>
-            <a:off x="503237" y="1744662"/>
-            <a:ext cx="4942189" cy="2453958"/>
+            <a:off x="294283" y="1668462"/>
+            <a:ext cx="5009554" cy="1720886"/>
           </a:xfrm>
           <a:prstGeom prst="rect">
             <a:avLst/>
@@ -28125,20 +28342,6 @@
               <a:t> to go to the classes page.</a:t>
             </a:r>
           </a:p>
-          <a:p>
-            <a:r>
-              <a:rPr lang="en-US" sz="2800" dirty="0"/>
-              <a:t>Click </a:t>
-            </a:r>
-            <a:r>
-              <a:rPr lang="en-US" sz="2800" b="1" dirty="0"/>
-              <a:t>Teachers/students</a:t>
-            </a:r>
-            <a:r>
-              <a:rPr lang="en-US" sz="2800" dirty="0"/>
-              <a:t> to show teachers/students of current school.</a:t>
-            </a:r>
-          </a:p>
         </p:txBody>
       </p:sp>
       <p:sp>
@@ -28165,10 +28368,10 @@
       </p:sp>
       <p:pic>
         <p:nvPicPr>
-          <p:cNvPr id="4" name="Picture 3">
+          <p:cNvPr id="5" name="Picture 4">
             <a:extLst>
               <a:ext uri="{FF2B5EF4-FFF2-40B4-BE49-F238E27FC236}">
-                <a16:creationId xmlns:a16="http://schemas.microsoft.com/office/drawing/2014/main" id="{24CE180C-8EA6-41DF-B235-126AFF042241}"/>
+                <a16:creationId xmlns:a16="http://schemas.microsoft.com/office/drawing/2014/main" id="{0AD1B9E5-0679-4BAB-966D-A7716253818D}"/>
               </a:ext>
             </a:extLst>
           </p:cNvPr>
@@ -28185,8 +28388,8 @@
         </p:blipFill>
         <p:spPr>
           <a:xfrm>
-            <a:off x="808037" y="3649662"/>
-            <a:ext cx="9158288" cy="3183111"/>
+            <a:off x="641349" y="3497262"/>
+            <a:ext cx="11153775" cy="2819400"/>
           </a:xfrm>
           <a:prstGeom prst="rect">
             <a:avLst/>
@@ -28523,7 +28726,13 @@
       </p:sp>
       <p:pic>
         <p:nvPicPr>
-          <p:cNvPr id="4" name="Picture 3"/>
+          <p:cNvPr id="5" name="Picture 4">
+            <a:extLst>
+              <a:ext uri="{FF2B5EF4-FFF2-40B4-BE49-F238E27FC236}">
+                <a16:creationId xmlns:a16="http://schemas.microsoft.com/office/drawing/2014/main" id="{00CD81B2-992D-4754-B547-724555D268BE}"/>
+              </a:ext>
+            </a:extLst>
+          </p:cNvPr>
           <p:cNvPicPr>
             <a:picLocks noChangeAspect="1"/>
           </p:cNvPicPr>
@@ -28537,8 +28746,8 @@
         </p:blipFill>
         <p:spPr>
           <a:xfrm>
-            <a:off x="244476" y="1744662"/>
-            <a:ext cx="4407910" cy="2590800"/>
+            <a:off x="274639" y="1750301"/>
+            <a:ext cx="4647729" cy="2415859"/>
           </a:xfrm>
           <a:prstGeom prst="rect">
             <a:avLst/>
@@ -28671,7 +28880,7 @@
         </p:nvSpPr>
         <p:spPr>
           <a:xfrm>
-            <a:off x="4819906" y="2735262"/>
+            <a:off x="4819906" y="3268662"/>
             <a:ext cx="7315203" cy="914400"/>
           </a:xfrm>
         </p:spPr>
@@ -28695,7 +28904,7 @@
             </a:pPr>
             <a:r>
               <a:rPr lang="en-US" dirty="0"/>
-              <a:t>There are 4 tabs containing  students, class documents, conversations and seating chart. </a:t>
+              <a:t>There are 5 tabs containing  students, Assignments, class documents, conversations and seating chart. </a:t>
             </a:r>
           </a:p>
           <a:p>
@@ -28708,6 +28917,16 @@
               <a:t>Click each tab to see detailed information.</a:t>
             </a:r>
           </a:p>
+          <a:p>
+            <a:pPr marL="571500" indent="-571500">
+              <a:buFont typeface="Arial" panose="020B0604020202020204" pitchFamily="34" charset="0"/>
+              <a:buChar char="•"/>
+            </a:pPr>
+            <a:r>
+              <a:rPr lang="en-US" dirty="0"/>
+              <a:t>The owner can add a co-teacher to the class.</a:t>
+            </a:r>
+          </a:p>
         </p:txBody>
       </p:sp>
       <p:sp>
@@ -28734,7 +28953,13 @@
       </p:sp>
       <p:pic>
         <p:nvPicPr>
-          <p:cNvPr id="7" name="Picture 6"/>
+          <p:cNvPr id="5" name="Picture 4">
+            <a:extLst>
+              <a:ext uri="{FF2B5EF4-FFF2-40B4-BE49-F238E27FC236}">
+                <a16:creationId xmlns:a16="http://schemas.microsoft.com/office/drawing/2014/main" id="{AB901AAD-543A-4B4A-8C80-7A1C2FAC3E7E}"/>
+              </a:ext>
+            </a:extLst>
+          </p:cNvPr>
           <p:cNvPicPr>
             <a:picLocks noChangeAspect="1"/>
           </p:cNvPicPr>
@@ -28748,80 +28973,8 @@
         </p:blipFill>
         <p:spPr>
           <a:xfrm>
-            <a:off x="298905" y="1394743"/>
-            <a:ext cx="4347459" cy="1805021"/>
-          </a:xfrm>
-          <a:prstGeom prst="rect">
-            <a:avLst/>
-          </a:prstGeom>
-        </p:spPr>
-      </p:pic>
-      <p:pic>
-        <p:nvPicPr>
-          <p:cNvPr id="8" name="Picture 7"/>
-          <p:cNvPicPr>
-            <a:picLocks noChangeAspect="1"/>
-          </p:cNvPicPr>
-          <p:nvPr/>
-        </p:nvPicPr>
-        <p:blipFill>
-          <a:blip r:embed="rId4"/>
-          <a:stretch>
-            <a:fillRect/>
-          </a:stretch>
-        </p:blipFill>
-        <p:spPr>
-          <a:xfrm>
-            <a:off x="248830" y="3341225"/>
-            <a:ext cx="4397534" cy="1075282"/>
-          </a:xfrm>
-          <a:prstGeom prst="rect">
-            <a:avLst/>
-          </a:prstGeom>
-        </p:spPr>
-      </p:pic>
-      <p:pic>
-        <p:nvPicPr>
-          <p:cNvPr id="9" name="Picture 8"/>
-          <p:cNvPicPr>
-            <a:picLocks noChangeAspect="1"/>
-          </p:cNvPicPr>
-          <p:nvPr/>
-        </p:nvPicPr>
-        <p:blipFill>
-          <a:blip r:embed="rId5"/>
-          <a:stretch>
-            <a:fillRect/>
-          </a:stretch>
-        </p:blipFill>
-        <p:spPr>
-          <a:xfrm>
-            <a:off x="283982" y="4557331"/>
-            <a:ext cx="4362382" cy="859875"/>
-          </a:xfrm>
-          <a:prstGeom prst="rect">
-            <a:avLst/>
-          </a:prstGeom>
-        </p:spPr>
-      </p:pic>
-      <p:pic>
-        <p:nvPicPr>
-          <p:cNvPr id="10" name="Picture 9"/>
-          <p:cNvPicPr>
-            <a:picLocks noChangeAspect="1"/>
-          </p:cNvPicPr>
-          <p:nvPr/>
-        </p:nvPicPr>
-        <p:blipFill>
-          <a:blip r:embed="rId6"/>
-          <a:stretch>
-            <a:fillRect/>
-          </a:stretch>
-        </p:blipFill>
-        <p:spPr>
-          <a:xfrm>
-            <a:off x="298905" y="5707062"/>
-            <a:ext cx="4371725" cy="1063090"/>
+            <a:off x="302579" y="1264136"/>
+            <a:ext cx="4406547" cy="2019000"/>
           </a:xfrm>
           <a:prstGeom prst="rect">
             <a:avLst/>
@@ -28961,6 +29114,146 @@
         </p:nvSpPr>
         <p:spPr>
           <a:xfrm>
+            <a:off x="427038" y="1439862"/>
+            <a:ext cx="11708072" cy="2057400"/>
+          </a:xfrm>
+        </p:spPr>
+        <p:txBody>
+          <a:bodyPr/>
+          <a:lstStyle/>
+          <a:p>
+            <a:pPr marL="571500" indent="-571500">
+              <a:buFont typeface="Arial" panose="020B0604020202020204" pitchFamily="34" charset="0"/>
+              <a:buChar char="•"/>
+            </a:pPr>
+            <a:r>
+              <a:rPr lang="en-US" dirty="0"/>
+              <a:t>A teacher can add/publish an assignment.</a:t>
+            </a:r>
+          </a:p>
+          <a:p>
+            <a:pPr marL="571500" indent="-571500">
+              <a:buFont typeface="Arial" panose="020B0604020202020204" pitchFamily="34" charset="0"/>
+              <a:buChar char="•"/>
+            </a:pPr>
+            <a:r>
+              <a:rPr lang="en-US" dirty="0"/>
+              <a:t>A student can add hand ins for an assignment</a:t>
+            </a:r>
+            <a:r>
+              <a:rPr lang="en-US"/>
+              <a:t>.  </a:t>
+            </a:r>
+            <a:endParaRPr lang="en-US" dirty="0"/>
+          </a:p>
+        </p:txBody>
+      </p:sp>
+      <p:sp>
+        <p:nvSpPr>
+          <p:cNvPr id="3" name="Title 2"/>
+          <p:cNvSpPr>
+            <a:spLocks noGrp="1"/>
+          </p:cNvSpPr>
+          <p:nvPr>
+            <p:ph type="title"/>
+          </p:nvPr>
+        </p:nvSpPr>
+        <p:spPr/>
+        <p:txBody>
+          <a:bodyPr/>
+          <a:lstStyle/>
+          <a:p>
+            <a:r>
+              <a:rPr lang="en-US" dirty="0"/>
+              <a:t>Class detail - Assignment</a:t>
+            </a:r>
+          </a:p>
+        </p:txBody>
+      </p:sp>
+      <p:pic>
+        <p:nvPicPr>
+          <p:cNvPr id="4" name="Picture 3">
+            <a:extLst>
+              <a:ext uri="{FF2B5EF4-FFF2-40B4-BE49-F238E27FC236}">
+                <a16:creationId xmlns:a16="http://schemas.microsoft.com/office/drawing/2014/main" id="{583A2740-8D16-4CA2-B06B-FCE15CAB4CDB}"/>
+              </a:ext>
+            </a:extLst>
+          </p:cNvPr>
+          <p:cNvPicPr>
+            <a:picLocks noChangeAspect="1"/>
+          </p:cNvPicPr>
+          <p:nvPr/>
+        </p:nvPicPr>
+        <p:blipFill>
+          <a:blip r:embed="rId3"/>
+          <a:stretch>
+            <a:fillRect/>
+          </a:stretch>
+        </p:blipFill>
+        <p:spPr>
+          <a:xfrm>
+            <a:off x="632523" y="3344862"/>
+            <a:ext cx="11171428" cy="2685714"/>
+          </a:xfrm>
+          <a:prstGeom prst="rect">
+            <a:avLst/>
+          </a:prstGeom>
+        </p:spPr>
+      </p:pic>
+    </p:spTree>
+    <p:extLst>
+      <p:ext uri="{BB962C8B-B14F-4D97-AF65-F5344CB8AC3E}">
+        <p14:creationId xmlns:p14="http://schemas.microsoft.com/office/powerpoint/2010/main" val="1346763997"/>
+      </p:ext>
+    </p:extLst>
+  </p:cSld>
+  <p:clrMapOvr>
+    <a:masterClrMapping/>
+  </p:clrMapOvr>
+  <mc:AlternateContent xmlns:mc="http://schemas.openxmlformats.org/markup-compatibility/2006" xmlns:p14="http://schemas.microsoft.com/office/powerpoint/2010/main">
+    <mc:Choice Requires="p14">
+      <p:transition spd="med" p14:dur="700">
+        <p:fade/>
+      </p:transition>
+    </mc:Choice>
+    <mc:Fallback xmlns="">
+      <p:transition spd="med">
+        <p:fade/>
+      </p:transition>
+    </mc:Fallback>
+  </mc:AlternateContent>
+</p:sld>
+</file>
+
+<file path=ppt/slides/slide41.xml><?xml version="1.0" encoding="utf-8"?>
+<p:sld xmlns:a="http://schemas.openxmlformats.org/drawingml/2006/main" xmlns:r="http://schemas.openxmlformats.org/officeDocument/2006/relationships" xmlns:p="http://schemas.openxmlformats.org/presentationml/2006/main">
+  <p:cSld>
+    <p:spTree>
+      <p:nvGrpSpPr>
+        <p:cNvPr id="1" name=""/>
+        <p:cNvGrpSpPr/>
+        <p:nvPr/>
+      </p:nvGrpSpPr>
+      <p:grpSpPr>
+        <a:xfrm>
+          <a:off x="0" y="0"/>
+          <a:ext cx="0" cy="0"/>
+          <a:chOff x="0" y="0"/>
+          <a:chExt cx="0" cy="0"/>
+        </a:xfrm>
+      </p:grpSpPr>
+      <p:sp>
+        <p:nvSpPr>
+          <p:cNvPr id="2" name="Text Placeholder 1"/>
+          <p:cNvSpPr>
+            <a:spLocks noGrp="1"/>
+          </p:cNvSpPr>
+          <p:nvPr>
+            <p:ph type="body" sz="quarter" idx="15"/>
+          </p:nvPr>
+        </p:nvSpPr>
+        <p:spPr>
+          <a:xfrm>
             <a:off x="5108526" y="3532002"/>
             <a:ext cx="7315203" cy="914400"/>
           </a:xfrm>
@@ -29045,7 +29338,7 @@
         </p:blipFill>
         <p:spPr>
           <a:xfrm>
-            <a:off x="553966" y="1529355"/>
+            <a:off x="553966" y="1668462"/>
             <a:ext cx="4554560" cy="1652334"/>
           </a:xfrm>
           <a:prstGeom prst="rect">
@@ -29078,7 +29371,7 @@
 </p:sld>
 </file>
 
-<file path=ppt/slides/slide41.xml><?xml version="1.0" encoding="utf-8"?>
+<file path=ppt/slides/slide42.xml><?xml version="1.0" encoding="utf-8"?>
 <p:sld xmlns:a="http://schemas.openxmlformats.org/drawingml/2006/main" xmlns:r="http://schemas.openxmlformats.org/officeDocument/2006/relationships" xmlns:p="http://schemas.openxmlformats.org/presentationml/2006/main">
   <p:cSld>
     <p:spTree>
@@ -29248,220 +29541,7 @@
 </p:sld>
 </file>
 
-<file path=ppt/slides/slide42.xml><?xml version="1.0" encoding="utf-8"?>
-<p:sld xmlns:a="http://schemas.openxmlformats.org/drawingml/2006/main" xmlns:r="http://schemas.openxmlformats.org/officeDocument/2006/relationships" xmlns:p="http://schemas.openxmlformats.org/presentationml/2006/main">
-  <p:cSld>
-    <p:bg>
-      <p:bgPr>
-        <a:solidFill>
-          <a:schemeClr val="bg2"/>
-        </a:solidFill>
-        <a:effectLst/>
-      </p:bgPr>
-    </p:bg>
-    <p:spTree>
-      <p:nvGrpSpPr>
-        <p:cNvPr id="1" name=""/>
-        <p:cNvGrpSpPr/>
-        <p:nvPr/>
-      </p:nvGrpSpPr>
-      <p:grpSpPr>
-        <a:xfrm>
-          <a:off x="0" y="0"/>
-          <a:ext cx="0" cy="0"/>
-          <a:chOff x="0" y="0"/>
-          <a:chExt cx="0" cy="0"/>
-        </a:xfrm>
-      </p:grpSpPr>
-      <p:sp>
-        <p:nvSpPr>
-          <p:cNvPr id="4" name="Title 3"/>
-          <p:cNvSpPr>
-            <a:spLocks noGrp="1"/>
-          </p:cNvSpPr>
-          <p:nvPr>
-            <p:ph type="title"/>
-          </p:nvPr>
-        </p:nvSpPr>
-        <p:spPr/>
-        <p:txBody>
-          <a:bodyPr/>
-          <a:lstStyle/>
-          <a:p>
-            <a:r>
-              <a:rPr lang="en-US" dirty="0"/>
-              <a:t>Teachers/Students</a:t>
-            </a:r>
-          </a:p>
-        </p:txBody>
-      </p:sp>
-    </p:spTree>
-    <p:extLst>
-      <p:ext uri="{BB962C8B-B14F-4D97-AF65-F5344CB8AC3E}">
-        <p14:creationId xmlns:p14="http://schemas.microsoft.com/office/powerpoint/2010/main" val="2204471322"/>
-      </p:ext>
-    </p:extLst>
-  </p:cSld>
-  <p:clrMapOvr>
-    <a:masterClrMapping/>
-  </p:clrMapOvr>
-  <mc:AlternateContent xmlns:mc="http://schemas.openxmlformats.org/markup-compatibility/2006" xmlns:p14="http://schemas.microsoft.com/office/powerpoint/2010/main">
-    <mc:Choice Requires="p14">
-      <p:transition spd="med" p14:dur="700">
-        <p:fade/>
-      </p:transition>
-    </mc:Choice>
-    <mc:Fallback xmlns="">
-      <p:transition spd="med">
-        <p:fade/>
-      </p:transition>
-    </mc:Fallback>
-  </mc:AlternateContent>
-</p:sld>
-</file>
-
 <file path=ppt/slides/slide43.xml><?xml version="1.0" encoding="utf-8"?>
-<p:sld xmlns:a="http://schemas.openxmlformats.org/drawingml/2006/main" xmlns:r="http://schemas.openxmlformats.org/officeDocument/2006/relationships" xmlns:p="http://schemas.openxmlformats.org/presentationml/2006/main">
-  <p:cSld>
-    <p:spTree>
-      <p:nvGrpSpPr>
-        <p:cNvPr id="1" name=""/>
-        <p:cNvGrpSpPr/>
-        <p:nvPr/>
-      </p:nvGrpSpPr>
-      <p:grpSpPr>
-        <a:xfrm>
-          <a:off x="0" y="0"/>
-          <a:ext cx="0" cy="0"/>
-          <a:chOff x="0" y="0"/>
-          <a:chExt cx="0" cy="0"/>
-        </a:xfrm>
-      </p:grpSpPr>
-      <p:sp>
-        <p:nvSpPr>
-          <p:cNvPr id="2" name="Text Placeholder 1"/>
-          <p:cNvSpPr>
-            <a:spLocks noGrp="1"/>
-          </p:cNvSpPr>
-          <p:nvPr>
-            <p:ph type="body" sz="quarter" idx="10"/>
-          </p:nvPr>
-        </p:nvSpPr>
-        <p:spPr>
-          <a:xfrm>
-            <a:off x="274639" y="1265046"/>
-            <a:ext cx="11887199" cy="2743199"/>
-          </a:xfrm>
-        </p:spPr>
-        <p:txBody>
-          <a:bodyPr/>
-          <a:lstStyle/>
-          <a:p>
-            <a:r>
-              <a:rPr lang="en-US" sz="2800" dirty="0"/>
-              <a:t>Click </a:t>
-            </a:r>
-            <a:r>
-              <a:rPr lang="en-US" sz="2800" b="1" dirty="0"/>
-              <a:t>Teachers/students</a:t>
-            </a:r>
-            <a:r>
-              <a:rPr lang="en-US" sz="2800" dirty="0"/>
-              <a:t>  on all schools page and then go to  all users page.</a:t>
-            </a:r>
-          </a:p>
-          <a:p>
-            <a:r>
-              <a:rPr lang="en-US" sz="2800" dirty="0"/>
-              <a:t>All teachers/students will list here. </a:t>
-            </a:r>
-          </a:p>
-          <a:p>
-            <a:r>
-              <a:rPr lang="en-US" sz="2800" dirty="0"/>
-              <a:t>Click the filter on top right corn to filer teachers/students.</a:t>
-            </a:r>
-          </a:p>
-          <a:p>
-            <a:r>
-              <a:rPr lang="en-US" sz="2800" dirty="0"/>
-              <a:t> teachers/students will be displayed with paginations.</a:t>
-            </a:r>
-          </a:p>
-        </p:txBody>
-      </p:sp>
-      <p:sp>
-        <p:nvSpPr>
-          <p:cNvPr id="3" name="Title 2"/>
-          <p:cNvSpPr>
-            <a:spLocks noGrp="1"/>
-          </p:cNvSpPr>
-          <p:nvPr>
-            <p:ph type="title"/>
-          </p:nvPr>
-        </p:nvSpPr>
-        <p:spPr/>
-        <p:txBody>
-          <a:bodyPr/>
-          <a:lstStyle/>
-          <a:p>
-            <a:r>
-              <a:rPr lang="en-US" dirty="0"/>
-              <a:t>ALL SCHOOLS – Teachers/Students</a:t>
-            </a:r>
-          </a:p>
-        </p:txBody>
-      </p:sp>
-      <p:pic>
-        <p:nvPicPr>
-          <p:cNvPr id="5" name="Picture 4"/>
-          <p:cNvPicPr>
-            <a:picLocks noChangeAspect="1"/>
-          </p:cNvPicPr>
-          <p:nvPr/>
-        </p:nvPicPr>
-        <p:blipFill>
-          <a:blip r:embed="rId3"/>
-          <a:stretch>
-            <a:fillRect/>
-          </a:stretch>
-        </p:blipFill>
-        <p:spPr>
-          <a:xfrm>
-            <a:off x="731837" y="3344862"/>
-            <a:ext cx="6866124" cy="3412645"/>
-          </a:xfrm>
-          <a:prstGeom prst="rect">
-            <a:avLst/>
-          </a:prstGeom>
-        </p:spPr>
-      </p:pic>
-    </p:spTree>
-    <p:extLst>
-      <p:ext uri="{BB962C8B-B14F-4D97-AF65-F5344CB8AC3E}">
-        <p14:creationId xmlns:p14="http://schemas.microsoft.com/office/powerpoint/2010/main" val="3773680944"/>
-      </p:ext>
-    </p:extLst>
-  </p:cSld>
-  <p:clrMapOvr>
-    <a:masterClrMapping/>
-  </p:clrMapOvr>
-  <mc:AlternateContent xmlns:mc="http://schemas.openxmlformats.org/markup-compatibility/2006" xmlns:p14="http://schemas.microsoft.com/office/powerpoint/2010/main">
-    <mc:Choice Requires="p14">
-      <p:transition spd="med" p14:dur="700">
-        <p:fade/>
-      </p:transition>
-    </mc:Choice>
-    <mc:Fallback xmlns="">
-      <p:transition spd="med">
-        <p:fade/>
-      </p:transition>
-    </mc:Fallback>
-  </mc:AlternateContent>
-</p:sld>
-</file>
-
-<file path=ppt/slides/slide44.xml><?xml version="1.0" encoding="utf-8"?>
 <p:sld xmlns:a="http://schemas.openxmlformats.org/drawingml/2006/main" xmlns:r="http://schemas.openxmlformats.org/officeDocument/2006/relationships" xmlns:p="http://schemas.openxmlformats.org/presentationml/2006/main">
   <p:cSld>
     <p:bg>
@@ -29533,7 +29613,7 @@
 </p:sld>
 </file>
 
-<file path=ppt/slides/slide45.xml><?xml version="1.0" encoding="utf-8"?>
+<file path=ppt/slides/slide44.xml><?xml version="1.0" encoding="utf-8"?>
 <p:sld xmlns:a="http://schemas.openxmlformats.org/drawingml/2006/main" xmlns:r="http://schemas.openxmlformats.org/officeDocument/2006/relationships" xmlns:p="http://schemas.openxmlformats.org/presentationml/2006/main">
   <p:cSld>
     <p:spTree>
@@ -29720,6 +29800,801 @@
 </p:sld>
 </file>
 
+<file path=ppt/slides/slide45.xml><?xml version="1.0" encoding="utf-8"?>
+<p:sld xmlns:a="http://schemas.openxmlformats.org/drawingml/2006/main" xmlns:r="http://schemas.openxmlformats.org/officeDocument/2006/relationships" xmlns:p="http://schemas.openxmlformats.org/presentationml/2006/main">
+  <p:cSld>
+    <p:bg>
+      <p:bgPr>
+        <a:solidFill>
+          <a:schemeClr val="bg2"/>
+        </a:solidFill>
+        <a:effectLst/>
+      </p:bgPr>
+    </p:bg>
+    <p:spTree>
+      <p:nvGrpSpPr>
+        <p:cNvPr id="1" name=""/>
+        <p:cNvGrpSpPr/>
+        <p:nvPr/>
+      </p:nvGrpSpPr>
+      <p:grpSpPr>
+        <a:xfrm>
+          <a:off x="0" y="0"/>
+          <a:ext cx="0" cy="0"/>
+          <a:chOff x="0" y="0"/>
+          <a:chExt cx="0" cy="0"/>
+        </a:xfrm>
+      </p:grpSpPr>
+      <p:sp>
+        <p:nvSpPr>
+          <p:cNvPr id="4" name="Title 3"/>
+          <p:cNvSpPr>
+            <a:spLocks noGrp="1"/>
+          </p:cNvSpPr>
+          <p:nvPr>
+            <p:ph type="title"/>
+          </p:nvPr>
+        </p:nvSpPr>
+        <p:spPr/>
+        <p:txBody>
+          <a:bodyPr/>
+          <a:lstStyle/>
+          <a:p>
+            <a:r>
+              <a:rPr lang="en-US" dirty="0"/>
+              <a:t>Sync Data </a:t>
+            </a:r>
+            <a:r>
+              <a:rPr lang="en-US" dirty="0" err="1"/>
+              <a:t>WebJob</a:t>
+            </a:r>
+            <a:endParaRPr lang="en-US" dirty="0"/>
+          </a:p>
+        </p:txBody>
+      </p:sp>
+    </p:spTree>
+    <p:extLst>
+      <p:ext uri="{BB962C8B-B14F-4D97-AF65-F5344CB8AC3E}">
+        <p14:creationId xmlns:p14="http://schemas.microsoft.com/office/powerpoint/2010/main" val="597906474"/>
+      </p:ext>
+    </p:extLst>
+  </p:cSld>
+  <p:clrMapOvr>
+    <a:masterClrMapping/>
+  </p:clrMapOvr>
+  <mc:AlternateContent xmlns:mc="http://schemas.openxmlformats.org/markup-compatibility/2006" xmlns:p14="http://schemas.microsoft.com/office/powerpoint/2010/main">
+    <mc:Choice Requires="p14">
+      <p:transition spd="med" p14:dur="700">
+        <p:fade/>
+      </p:transition>
+    </mc:Choice>
+    <mc:Fallback xmlns="">
+      <p:transition spd="med">
+        <p:fade/>
+      </p:transition>
+    </mc:Fallback>
+  </mc:AlternateContent>
+</p:sld>
+</file>
+
+<file path=ppt/slides/slide46.xml><?xml version="1.0" encoding="utf-8"?>
+<p:sld xmlns:a="http://schemas.openxmlformats.org/drawingml/2006/main" xmlns:r="http://schemas.openxmlformats.org/officeDocument/2006/relationships" xmlns:p="http://schemas.openxmlformats.org/presentationml/2006/main">
+  <p:cSld>
+    <p:spTree>
+      <p:nvGrpSpPr>
+        <p:cNvPr id="1" name=""/>
+        <p:cNvGrpSpPr/>
+        <p:nvPr/>
+      </p:nvGrpSpPr>
+      <p:grpSpPr>
+        <a:xfrm>
+          <a:off x="0" y="0"/>
+          <a:ext cx="0" cy="0"/>
+          <a:chOff x="0" y="0"/>
+          <a:chExt cx="0" cy="0"/>
+        </a:xfrm>
+      </p:grpSpPr>
+      <p:sp>
+        <p:nvSpPr>
+          <p:cNvPr id="2" name="Text Placeholder 1"/>
+          <p:cNvSpPr>
+            <a:spLocks noGrp="1"/>
+          </p:cNvSpPr>
+          <p:nvPr>
+            <p:ph type="body" sz="quarter" idx="15"/>
+          </p:nvPr>
+        </p:nvSpPr>
+        <p:spPr>
+          <a:xfrm>
+            <a:off x="1765088" y="4856604"/>
+            <a:ext cx="9253749" cy="1993457"/>
+          </a:xfrm>
+        </p:spPr>
+        <p:txBody>
+          <a:bodyPr/>
+          <a:lstStyle/>
+          <a:p>
+            <a:pPr marL="571500" indent="-571500">
+              <a:buFont typeface="Arial" panose="020B0604020202020204" pitchFamily="34" charset="0"/>
+              <a:buChar char="•"/>
+            </a:pPr>
+            <a:r>
+              <a:rPr lang="en-US" dirty="0"/>
+              <a:t>Navigate to the Web App in Azure Portal.</a:t>
+            </a:r>
+          </a:p>
+          <a:p>
+            <a:pPr marL="571500" indent="-571500">
+              <a:buFont typeface="Arial" panose="020B0604020202020204" pitchFamily="34" charset="0"/>
+              <a:buChar char="•"/>
+            </a:pPr>
+            <a:r>
+              <a:rPr lang="en-US" dirty="0"/>
+              <a:t>Click </a:t>
+            </a:r>
+            <a:r>
+              <a:rPr lang="en-US" b="1" dirty="0" err="1"/>
+              <a:t>WebJobs</a:t>
+            </a:r>
+            <a:r>
+              <a:rPr lang="en-US" dirty="0"/>
+              <a:t> at the left side.</a:t>
+            </a:r>
+          </a:p>
+          <a:p>
+            <a:pPr marL="571500" indent="-571500">
+              <a:buFont typeface="Arial" panose="020B0604020202020204" pitchFamily="34" charset="0"/>
+              <a:buChar char="•"/>
+            </a:pPr>
+            <a:r>
+              <a:rPr lang="en-US" dirty="0"/>
+              <a:t>Click </a:t>
+            </a:r>
+            <a:r>
+              <a:rPr lang="en-US" b="1" dirty="0" err="1"/>
+              <a:t>sync_data</a:t>
+            </a:r>
+            <a:r>
+              <a:rPr lang="en-US" b="1" dirty="0"/>
+              <a:t> </a:t>
+            </a:r>
+            <a:r>
+              <a:rPr lang="en-US" dirty="0"/>
+              <a:t>at the right, then click </a:t>
+            </a:r>
+            <a:r>
+              <a:rPr lang="en-US" b="1" dirty="0"/>
+              <a:t>Logs</a:t>
+            </a:r>
+            <a:r>
+              <a:rPr lang="en-US" dirty="0"/>
+              <a:t>.</a:t>
+            </a:r>
+          </a:p>
+        </p:txBody>
+      </p:sp>
+      <p:sp>
+        <p:nvSpPr>
+          <p:cNvPr id="3" name="Title 2"/>
+          <p:cNvSpPr>
+            <a:spLocks noGrp="1"/>
+          </p:cNvSpPr>
+          <p:nvPr>
+            <p:ph type="title"/>
+          </p:nvPr>
+        </p:nvSpPr>
+        <p:spPr/>
+        <p:txBody>
+          <a:bodyPr/>
+          <a:lstStyle/>
+          <a:p>
+            <a:r>
+              <a:rPr lang="en-US" dirty="0"/>
+              <a:t>Web App - </a:t>
+            </a:r>
+            <a:r>
+              <a:rPr lang="en-US" dirty="0" err="1"/>
+              <a:t>WebJobs</a:t>
+            </a:r>
+            <a:endParaRPr lang="en-US" dirty="0"/>
+          </a:p>
+        </p:txBody>
+      </p:sp>
+      <p:pic>
+        <p:nvPicPr>
+          <p:cNvPr id="7" name="Picture 6">
+            <a:extLst>
+              <a:ext uri="{FF2B5EF4-FFF2-40B4-BE49-F238E27FC236}">
+                <a16:creationId xmlns:a16="http://schemas.microsoft.com/office/drawing/2014/main" id="{5A6777C8-6DF9-424A-9B99-437E984A9BA5}"/>
+              </a:ext>
+            </a:extLst>
+          </p:cNvPr>
+          <p:cNvPicPr>
+            <a:picLocks noChangeAspect="1"/>
+          </p:cNvPicPr>
+          <p:nvPr/>
+        </p:nvPicPr>
+        <p:blipFill>
+          <a:blip r:embed="rId3"/>
+          <a:stretch>
+            <a:fillRect/>
+          </a:stretch>
+        </p:blipFill>
+        <p:spPr>
+          <a:xfrm>
+            <a:off x="1765088" y="1212849"/>
+            <a:ext cx="8906298" cy="3470140"/>
+          </a:xfrm>
+          <a:prstGeom prst="rect">
+            <a:avLst/>
+          </a:prstGeom>
+          <a:ln>
+            <a:solidFill>
+              <a:schemeClr val="bg1">
+                <a:lumMod val="65000"/>
+              </a:schemeClr>
+            </a:solidFill>
+          </a:ln>
+        </p:spPr>
+      </p:pic>
+    </p:spTree>
+    <p:extLst>
+      <p:ext uri="{BB962C8B-B14F-4D97-AF65-F5344CB8AC3E}">
+        <p14:creationId xmlns:p14="http://schemas.microsoft.com/office/powerpoint/2010/main" val="2382776637"/>
+      </p:ext>
+    </p:extLst>
+  </p:cSld>
+  <p:clrMapOvr>
+    <a:masterClrMapping/>
+  </p:clrMapOvr>
+  <mc:AlternateContent xmlns:mc="http://schemas.openxmlformats.org/markup-compatibility/2006" xmlns:p14="http://schemas.microsoft.com/office/powerpoint/2010/main">
+    <mc:Choice Requires="p14">
+      <p:transition spd="med" p14:dur="700">
+        <p:fade/>
+      </p:transition>
+    </mc:Choice>
+    <mc:Fallback xmlns="">
+      <p:transition spd="med">
+        <p:fade/>
+      </p:transition>
+    </mc:Fallback>
+  </mc:AlternateContent>
+</p:sld>
+</file>
+
+<file path=ppt/slides/slide47.xml><?xml version="1.0" encoding="utf-8"?>
+<p:sld xmlns:a="http://schemas.openxmlformats.org/drawingml/2006/main" xmlns:r="http://schemas.openxmlformats.org/officeDocument/2006/relationships" xmlns:p="http://schemas.openxmlformats.org/presentationml/2006/main">
+  <p:cSld>
+    <p:spTree>
+      <p:nvGrpSpPr>
+        <p:cNvPr id="1" name=""/>
+        <p:cNvGrpSpPr/>
+        <p:nvPr/>
+      </p:nvGrpSpPr>
+      <p:grpSpPr>
+        <a:xfrm>
+          <a:off x="0" y="0"/>
+          <a:ext cx="0" cy="0"/>
+          <a:chOff x="0" y="0"/>
+          <a:chExt cx="0" cy="0"/>
+        </a:xfrm>
+      </p:grpSpPr>
+      <p:sp>
+        <p:nvSpPr>
+          <p:cNvPr id="4" name="Title 3">
+            <a:extLst>
+              <a:ext uri="{FF2B5EF4-FFF2-40B4-BE49-F238E27FC236}">
+                <a16:creationId xmlns:a16="http://schemas.microsoft.com/office/drawing/2014/main" id="{E338ED9B-F9C6-4F5A-92E0-FD379EB0790C}"/>
+              </a:ext>
+            </a:extLst>
+          </p:cNvPr>
+          <p:cNvSpPr>
+            <a:spLocks noGrp="1"/>
+          </p:cNvSpPr>
+          <p:nvPr>
+            <p:ph type="title"/>
+          </p:nvPr>
+        </p:nvSpPr>
+        <p:spPr/>
+        <p:txBody>
+          <a:bodyPr/>
+          <a:lstStyle/>
+          <a:p>
+            <a:r>
+              <a:rPr lang="en-US" dirty="0"/>
+              <a:t>Sync Data </a:t>
+            </a:r>
+            <a:r>
+              <a:rPr lang="en-US" dirty="0" err="1"/>
+              <a:t>WebJob</a:t>
+            </a:r>
+            <a:r>
+              <a:rPr lang="en-US" dirty="0"/>
+              <a:t> - Details</a:t>
+            </a:r>
+            <a:br>
+              <a:rPr lang="en-US" dirty="0"/>
+            </a:br>
+            <a:endParaRPr lang="en-US" dirty="0"/>
+          </a:p>
+        </p:txBody>
+      </p:sp>
+      <p:pic>
+        <p:nvPicPr>
+          <p:cNvPr id="6" name="Picture 5">
+            <a:extLst>
+              <a:ext uri="{FF2B5EF4-FFF2-40B4-BE49-F238E27FC236}">
+                <a16:creationId xmlns:a16="http://schemas.microsoft.com/office/drawing/2014/main" id="{23D1BE82-A294-4259-8912-F579511BD2BF}"/>
+              </a:ext>
+            </a:extLst>
+          </p:cNvPr>
+          <p:cNvPicPr>
+            <a:picLocks noChangeAspect="1"/>
+          </p:cNvPicPr>
+          <p:nvPr/>
+        </p:nvPicPr>
+        <p:blipFill>
+          <a:blip r:embed="rId2"/>
+          <a:stretch>
+            <a:fillRect/>
+          </a:stretch>
+        </p:blipFill>
+        <p:spPr>
+          <a:xfrm>
+            <a:off x="1680142" y="1326678"/>
+            <a:ext cx="9076190" cy="2000000"/>
+          </a:xfrm>
+          <a:prstGeom prst="rect">
+            <a:avLst/>
+          </a:prstGeom>
+          <a:ln>
+            <a:solidFill>
+              <a:schemeClr val="bg1">
+                <a:lumMod val="65000"/>
+              </a:schemeClr>
+            </a:solidFill>
+          </a:ln>
+        </p:spPr>
+      </p:pic>
+      <p:pic>
+        <p:nvPicPr>
+          <p:cNvPr id="7" name="Picture 6">
+            <a:extLst>
+              <a:ext uri="{FF2B5EF4-FFF2-40B4-BE49-F238E27FC236}">
+                <a16:creationId xmlns:a16="http://schemas.microsoft.com/office/drawing/2014/main" id="{59FCC01E-63BE-4DB1-9F33-65325BF0AF10}"/>
+              </a:ext>
+            </a:extLst>
+          </p:cNvPr>
+          <p:cNvPicPr>
+            <a:picLocks noChangeAspect="1"/>
+          </p:cNvPicPr>
+          <p:nvPr/>
+        </p:nvPicPr>
+        <p:blipFill rotWithShape="1">
+          <a:blip r:embed="rId3"/>
+          <a:srcRect t="15669" b="16590"/>
+          <a:stretch/>
+        </p:blipFill>
+        <p:spPr>
+          <a:xfrm>
+            <a:off x="1713475" y="4121098"/>
+            <a:ext cx="9009524" cy="2728964"/>
+          </a:xfrm>
+          <a:prstGeom prst="rect">
+            <a:avLst/>
+          </a:prstGeom>
+          <a:ln>
+            <a:solidFill>
+              <a:schemeClr val="bg1">
+                <a:lumMod val="65000"/>
+              </a:schemeClr>
+            </a:solidFill>
+          </a:ln>
+        </p:spPr>
+      </p:pic>
+      <p:sp>
+        <p:nvSpPr>
+          <p:cNvPr id="8" name="Rectangle 7">
+            <a:extLst>
+              <a:ext uri="{FF2B5EF4-FFF2-40B4-BE49-F238E27FC236}">
+                <a16:creationId xmlns:a16="http://schemas.microsoft.com/office/drawing/2014/main" id="{7A8E2BB1-C397-48D9-9D4E-2EF9CF4FA104}"/>
+              </a:ext>
+            </a:extLst>
+          </p:cNvPr>
+          <p:cNvSpPr/>
+          <p:nvPr/>
+        </p:nvSpPr>
+        <p:spPr>
+          <a:xfrm>
+            <a:off x="1570037" y="3440508"/>
+            <a:ext cx="3108543" cy="584775"/>
+          </a:xfrm>
+          <a:prstGeom prst="rect">
+            <a:avLst/>
+          </a:prstGeom>
+        </p:spPr>
+        <p:txBody>
+          <a:bodyPr wrap="none">
+            <a:spAutoFit/>
+          </a:bodyPr>
+          <a:lstStyle/>
+          <a:p>
+            <a:r>
+              <a:rPr lang="en-US" sz="3200" dirty="0"/>
+              <a:t>Click </a:t>
+            </a:r>
+            <a:r>
+              <a:rPr lang="en-US" sz="3200" b="1" dirty="0" err="1"/>
+              <a:t>sync_data</a:t>
+            </a:r>
+            <a:r>
+              <a:rPr lang="en-US" sz="3200" dirty="0"/>
+              <a:t>.</a:t>
+            </a:r>
+          </a:p>
+        </p:txBody>
+      </p:sp>
+    </p:spTree>
+    <p:extLst>
+      <p:ext uri="{BB962C8B-B14F-4D97-AF65-F5344CB8AC3E}">
+        <p14:creationId xmlns:p14="http://schemas.microsoft.com/office/powerpoint/2010/main" val="666881387"/>
+      </p:ext>
+    </p:extLst>
+  </p:cSld>
+  <p:clrMapOvr>
+    <a:masterClrMapping/>
+  </p:clrMapOvr>
+  <p:transition>
+    <p:fade/>
+  </p:transition>
+</p:sld>
+</file>
+
+<file path=ppt/slides/slide48.xml><?xml version="1.0" encoding="utf-8"?>
+<p:sld xmlns:a="http://schemas.openxmlformats.org/drawingml/2006/main" xmlns:r="http://schemas.openxmlformats.org/officeDocument/2006/relationships" xmlns:p="http://schemas.openxmlformats.org/presentationml/2006/main">
+  <p:cSld>
+    <p:spTree>
+      <p:nvGrpSpPr>
+        <p:cNvPr id="1" name=""/>
+        <p:cNvGrpSpPr/>
+        <p:nvPr/>
+      </p:nvGrpSpPr>
+      <p:grpSpPr>
+        <a:xfrm>
+          <a:off x="0" y="0"/>
+          <a:ext cx="0" cy="0"/>
+          <a:chOff x="0" y="0"/>
+          <a:chExt cx="0" cy="0"/>
+        </a:xfrm>
+      </p:grpSpPr>
+      <p:sp>
+        <p:nvSpPr>
+          <p:cNvPr id="4" name="Title 3">
+            <a:extLst>
+              <a:ext uri="{FF2B5EF4-FFF2-40B4-BE49-F238E27FC236}">
+                <a16:creationId xmlns:a16="http://schemas.microsoft.com/office/drawing/2014/main" id="{62B15B1F-AD22-4EAF-B464-286DE3AA8848}"/>
+              </a:ext>
+            </a:extLst>
+          </p:cNvPr>
+          <p:cNvSpPr>
+            <a:spLocks noGrp="1"/>
+          </p:cNvSpPr>
+          <p:nvPr>
+            <p:ph type="title"/>
+          </p:nvPr>
+        </p:nvSpPr>
+        <p:spPr/>
+        <p:txBody>
+          <a:bodyPr/>
+          <a:lstStyle/>
+          <a:p>
+            <a:r>
+              <a:rPr lang="en-US" dirty="0"/>
+              <a:t>Azure AD – All users</a:t>
+            </a:r>
+          </a:p>
+        </p:txBody>
+      </p:sp>
+      <p:pic>
+        <p:nvPicPr>
+          <p:cNvPr id="5" name="Picture 4">
+            <a:extLst>
+              <a:ext uri="{FF2B5EF4-FFF2-40B4-BE49-F238E27FC236}">
+                <a16:creationId xmlns:a16="http://schemas.microsoft.com/office/drawing/2014/main" id="{E8FBF580-EA6C-4D4E-9978-455AE664B44C}"/>
+              </a:ext>
+            </a:extLst>
+          </p:cNvPr>
+          <p:cNvPicPr>
+            <a:picLocks noChangeAspect="1"/>
+          </p:cNvPicPr>
+          <p:nvPr/>
+        </p:nvPicPr>
+        <p:blipFill>
+          <a:blip r:embed="rId2"/>
+          <a:stretch>
+            <a:fillRect/>
+          </a:stretch>
+        </p:blipFill>
+        <p:spPr>
+          <a:xfrm>
+            <a:off x="1036107" y="1439862"/>
+            <a:ext cx="10364260" cy="2857248"/>
+          </a:xfrm>
+          <a:prstGeom prst="rect">
+            <a:avLst/>
+          </a:prstGeom>
+        </p:spPr>
+      </p:pic>
+      <p:sp>
+        <p:nvSpPr>
+          <p:cNvPr id="7" name="Text Placeholder 1">
+            <a:extLst>
+              <a:ext uri="{FF2B5EF4-FFF2-40B4-BE49-F238E27FC236}">
+                <a16:creationId xmlns:a16="http://schemas.microsoft.com/office/drawing/2014/main" id="{E3417818-B0E1-4B8C-8772-D3A576D3CF46}"/>
+              </a:ext>
+            </a:extLst>
+          </p:cNvPr>
+          <p:cNvSpPr>
+            <a:spLocks noGrp="1"/>
+          </p:cNvSpPr>
+          <p:nvPr>
+            <p:ph type="body" sz="quarter" idx="15"/>
+          </p:nvPr>
+        </p:nvSpPr>
+        <p:spPr>
+          <a:xfrm>
+            <a:off x="1036107" y="4557934"/>
+            <a:ext cx="10364260" cy="1993457"/>
+          </a:xfrm>
+        </p:spPr>
+        <p:txBody>
+          <a:bodyPr/>
+          <a:lstStyle/>
+          <a:p>
+            <a:pPr marL="571500" indent="-571500">
+              <a:buFont typeface="Arial" panose="020B0604020202020204" pitchFamily="34" charset="0"/>
+              <a:buChar char="•"/>
+            </a:pPr>
+            <a:r>
+              <a:rPr lang="en-US" dirty="0"/>
+              <a:t>Navigate to the Azure Active Directory.</a:t>
+            </a:r>
+          </a:p>
+          <a:p>
+            <a:pPr marL="571500" indent="-571500">
+              <a:buFont typeface="Arial" panose="020B0604020202020204" pitchFamily="34" charset="0"/>
+              <a:buChar char="•"/>
+            </a:pPr>
+            <a:r>
+              <a:rPr lang="en-US" dirty="0"/>
+              <a:t>Find the user used for admin consent. </a:t>
+            </a:r>
+          </a:p>
+          <a:p>
+            <a:pPr marL="571500" indent="-571500">
+              <a:buFont typeface="Arial" panose="020B0604020202020204" pitchFamily="34" charset="0"/>
+              <a:buChar char="•"/>
+            </a:pPr>
+            <a:r>
+              <a:rPr lang="en-US" dirty="0"/>
+              <a:t>Click the user.</a:t>
+            </a:r>
+          </a:p>
+        </p:txBody>
+      </p:sp>
+    </p:spTree>
+    <p:extLst>
+      <p:ext uri="{BB962C8B-B14F-4D97-AF65-F5344CB8AC3E}">
+        <p14:creationId xmlns:p14="http://schemas.microsoft.com/office/powerpoint/2010/main" val="2657354164"/>
+      </p:ext>
+    </p:extLst>
+  </p:cSld>
+  <p:clrMapOvr>
+    <a:masterClrMapping/>
+  </p:clrMapOvr>
+  <p:transition>
+    <p:fade/>
+  </p:transition>
+</p:sld>
+</file>
+
+<file path=ppt/slides/slide49.xml><?xml version="1.0" encoding="utf-8"?>
+<p:sld xmlns:a="http://schemas.openxmlformats.org/drawingml/2006/main" xmlns:r="http://schemas.openxmlformats.org/officeDocument/2006/relationships" xmlns:p="http://schemas.openxmlformats.org/presentationml/2006/main">
+  <p:cSld>
+    <p:spTree>
+      <p:nvGrpSpPr>
+        <p:cNvPr id="1" name=""/>
+        <p:cNvGrpSpPr/>
+        <p:nvPr/>
+      </p:nvGrpSpPr>
+      <p:grpSpPr>
+        <a:xfrm>
+          <a:off x="0" y="0"/>
+          <a:ext cx="0" cy="0"/>
+          <a:chOff x="0" y="0"/>
+          <a:chExt cx="0" cy="0"/>
+        </a:xfrm>
+      </p:grpSpPr>
+      <p:sp>
+        <p:nvSpPr>
+          <p:cNvPr id="4" name="Title 3">
+            <a:extLst>
+              <a:ext uri="{FF2B5EF4-FFF2-40B4-BE49-F238E27FC236}">
+                <a16:creationId xmlns:a16="http://schemas.microsoft.com/office/drawing/2014/main" id="{8AE59B19-81F0-4308-872A-8249CFAA311D}"/>
+              </a:ext>
+            </a:extLst>
+          </p:cNvPr>
+          <p:cNvSpPr>
+            <a:spLocks noGrp="1"/>
+          </p:cNvSpPr>
+          <p:nvPr>
+            <p:ph type="title"/>
+          </p:nvPr>
+        </p:nvSpPr>
+        <p:spPr/>
+        <p:txBody>
+          <a:bodyPr/>
+          <a:lstStyle/>
+          <a:p>
+            <a:r>
+              <a:rPr lang="en-US" dirty="0"/>
+              <a:t>Azure AD - Update User Profile</a:t>
+            </a:r>
+          </a:p>
+        </p:txBody>
+      </p:sp>
+      <p:sp>
+        <p:nvSpPr>
+          <p:cNvPr id="8" name="Text Placeholder 1">
+            <a:extLst>
+              <a:ext uri="{FF2B5EF4-FFF2-40B4-BE49-F238E27FC236}">
+                <a16:creationId xmlns:a16="http://schemas.microsoft.com/office/drawing/2014/main" id="{38D81695-7302-4131-B036-930A99E0B7B7}"/>
+              </a:ext>
+            </a:extLst>
+          </p:cNvPr>
+          <p:cNvSpPr>
+            <a:spLocks noGrp="1"/>
+          </p:cNvSpPr>
+          <p:nvPr>
+            <p:ph type="body" sz="quarter" idx="15"/>
+          </p:nvPr>
+        </p:nvSpPr>
+        <p:spPr>
+          <a:xfrm>
+            <a:off x="5456237" y="1405320"/>
+            <a:ext cx="6678873" cy="5444742"/>
+          </a:xfrm>
+        </p:spPr>
+        <p:txBody>
+          <a:bodyPr/>
+          <a:lstStyle/>
+          <a:p>
+            <a:pPr marL="571500" indent="-571500">
+              <a:buFont typeface="Arial" panose="020B0604020202020204" pitchFamily="34" charset="0"/>
+              <a:buChar char="•"/>
+            </a:pPr>
+            <a:r>
+              <a:rPr lang="en-US" dirty="0"/>
+              <a:t>Update </a:t>
+            </a:r>
+            <a:r>
+              <a:rPr lang="en-US" b="1" dirty="0"/>
+              <a:t>Job title </a:t>
+            </a:r>
+            <a:r>
+              <a:rPr lang="en-US" dirty="0"/>
+              <a:t>field.</a:t>
+            </a:r>
+          </a:p>
+          <a:p>
+            <a:pPr marL="571500" indent="-571500">
+              <a:buFont typeface="Arial" panose="020B0604020202020204" pitchFamily="34" charset="0"/>
+              <a:buChar char="•"/>
+            </a:pPr>
+            <a:r>
+              <a:rPr lang="en-US" dirty="0"/>
+              <a:t>Update </a:t>
+            </a:r>
+            <a:r>
+              <a:rPr lang="en-US" b="1" dirty="0"/>
+              <a:t>Department </a:t>
+            </a:r>
+            <a:r>
+              <a:rPr lang="en-US" dirty="0"/>
+              <a:t>field.</a:t>
+            </a:r>
+          </a:p>
+          <a:p>
+            <a:pPr marL="571500" indent="-571500">
+              <a:buFont typeface="Arial" panose="020B0604020202020204" pitchFamily="34" charset="0"/>
+              <a:buChar char="•"/>
+            </a:pPr>
+            <a:r>
+              <a:rPr lang="en-US" dirty="0"/>
+              <a:t>Update </a:t>
+            </a:r>
+            <a:r>
+              <a:rPr lang="en-US" b="1" dirty="0"/>
+              <a:t>Mobile phone </a:t>
+            </a:r>
+            <a:r>
+              <a:rPr lang="en-US" dirty="0"/>
+              <a:t>field.</a:t>
+            </a:r>
+          </a:p>
+          <a:p>
+            <a:pPr marL="571500" indent="-571500">
+              <a:buFont typeface="Arial" panose="020B0604020202020204" pitchFamily="34" charset="0"/>
+              <a:buChar char="•"/>
+            </a:pPr>
+            <a:r>
+              <a:rPr lang="en-US" dirty="0"/>
+              <a:t>Click </a:t>
+            </a:r>
+            <a:r>
+              <a:rPr lang="en-US" b="1" dirty="0"/>
+              <a:t>Save</a:t>
+            </a:r>
+            <a:r>
+              <a:rPr lang="en-US" dirty="0"/>
+              <a:t>.</a:t>
+            </a:r>
+          </a:p>
+        </p:txBody>
+      </p:sp>
+      <p:pic>
+        <p:nvPicPr>
+          <p:cNvPr id="10" name="Picture 9">
+            <a:extLst>
+              <a:ext uri="{FF2B5EF4-FFF2-40B4-BE49-F238E27FC236}">
+                <a16:creationId xmlns:a16="http://schemas.microsoft.com/office/drawing/2014/main" id="{B6B5D91E-3595-4C1B-9E7B-E9D52E7D1FB7}"/>
+              </a:ext>
+            </a:extLst>
+          </p:cNvPr>
+          <p:cNvPicPr>
+            <a:picLocks noChangeAspect="1"/>
+          </p:cNvPicPr>
+          <p:nvPr/>
+        </p:nvPicPr>
+        <p:blipFill>
+          <a:blip r:embed="rId2"/>
+          <a:stretch>
+            <a:fillRect/>
+          </a:stretch>
+        </p:blipFill>
+        <p:spPr>
+          <a:xfrm>
+            <a:off x="579437" y="1405319"/>
+            <a:ext cx="4667250" cy="5353050"/>
+          </a:xfrm>
+          <a:prstGeom prst="rect">
+            <a:avLst/>
+          </a:prstGeom>
+          <a:ln>
+            <a:solidFill>
+              <a:schemeClr val="bg1">
+                <a:lumMod val="65000"/>
+              </a:schemeClr>
+            </a:solidFill>
+          </a:ln>
+        </p:spPr>
+      </p:pic>
+    </p:spTree>
+    <p:extLst>
+      <p:ext uri="{BB962C8B-B14F-4D97-AF65-F5344CB8AC3E}">
+        <p14:creationId xmlns:p14="http://schemas.microsoft.com/office/powerpoint/2010/main" val="712225756"/>
+      </p:ext>
+    </p:extLst>
+  </p:cSld>
+  <p:clrMapOvr>
+    <a:masterClrMapping/>
+  </p:clrMapOvr>
+  <p:transition>
+    <p:fade/>
+  </p:transition>
+</p:sld>
+</file>
+
 <file path=ppt/slides/slide5.xml><?xml version="1.0" encoding="utf-8"?>
 <p:sld xmlns:a="http://schemas.openxmlformats.org/drawingml/2006/main" xmlns:r="http://schemas.openxmlformats.org/officeDocument/2006/relationships" xmlns:p="http://schemas.openxmlformats.org/presentationml/2006/main">
   <p:cSld>
@@ -29855,6 +30730,270 @@
       </p:transition>
     </mc:Fallback>
   </mc:AlternateContent>
+</p:sld>
+</file>
+
+<file path=ppt/slides/slide50.xml><?xml version="1.0" encoding="utf-8"?>
+<p:sld xmlns:a="http://schemas.openxmlformats.org/drawingml/2006/main" xmlns:r="http://schemas.openxmlformats.org/officeDocument/2006/relationships" xmlns:p="http://schemas.openxmlformats.org/presentationml/2006/main">
+  <p:cSld>
+    <p:spTree>
+      <p:nvGrpSpPr>
+        <p:cNvPr id="1" name=""/>
+        <p:cNvGrpSpPr/>
+        <p:nvPr/>
+      </p:nvGrpSpPr>
+      <p:grpSpPr>
+        <a:xfrm>
+          <a:off x="0" y="0"/>
+          <a:ext cx="0" cy="0"/>
+          <a:chOff x="0" y="0"/>
+          <a:chExt cx="0" cy="0"/>
+        </a:xfrm>
+      </p:grpSpPr>
+      <p:sp>
+        <p:nvSpPr>
+          <p:cNvPr id="4" name="Title 3">
+            <a:extLst>
+              <a:ext uri="{FF2B5EF4-FFF2-40B4-BE49-F238E27FC236}">
+                <a16:creationId xmlns:a16="http://schemas.microsoft.com/office/drawing/2014/main" id="{720F7275-02EC-496C-90A3-A9DE33118C8D}"/>
+              </a:ext>
+            </a:extLst>
+          </p:cNvPr>
+          <p:cNvSpPr>
+            <a:spLocks noGrp="1"/>
+          </p:cNvSpPr>
+          <p:nvPr>
+            <p:ph type="title"/>
+          </p:nvPr>
+        </p:nvSpPr>
+        <p:spPr/>
+        <p:txBody>
+          <a:bodyPr/>
+          <a:lstStyle/>
+          <a:p>
+            <a:r>
+              <a:rPr lang="en-US" dirty="0"/>
+              <a:t>Sync Data </a:t>
+            </a:r>
+            <a:r>
+              <a:rPr lang="en-US" dirty="0" err="1"/>
+              <a:t>WebJob</a:t>
+            </a:r>
+            <a:r>
+              <a:rPr lang="en-US" dirty="0"/>
+              <a:t> - Runs</a:t>
+            </a:r>
+          </a:p>
+        </p:txBody>
+      </p:sp>
+      <p:sp>
+        <p:nvSpPr>
+          <p:cNvPr id="7" name="Text Placeholder 1">
+            <a:extLst>
+              <a:ext uri="{FF2B5EF4-FFF2-40B4-BE49-F238E27FC236}">
+                <a16:creationId xmlns:a16="http://schemas.microsoft.com/office/drawing/2014/main" id="{ED8034F1-A61D-45DF-942A-A5EA1E6B899B}"/>
+              </a:ext>
+            </a:extLst>
+          </p:cNvPr>
+          <p:cNvSpPr>
+            <a:spLocks noGrp="1"/>
+          </p:cNvSpPr>
+          <p:nvPr>
+            <p:ph type="body" sz="quarter" idx="15"/>
+          </p:nvPr>
+        </p:nvSpPr>
+        <p:spPr>
+          <a:xfrm>
+            <a:off x="699189" y="4868862"/>
+            <a:ext cx="11038095" cy="1981200"/>
+          </a:xfrm>
+        </p:spPr>
+        <p:txBody>
+          <a:bodyPr/>
+          <a:lstStyle/>
+          <a:p>
+            <a:pPr marL="571500" indent="-571500">
+              <a:buFont typeface="Arial" panose="020B0604020202020204" pitchFamily="34" charset="0"/>
+              <a:buChar char="•"/>
+            </a:pPr>
+            <a:r>
+              <a:rPr lang="en-US" dirty="0"/>
+              <a:t>Return to the Sync Data </a:t>
+            </a:r>
+            <a:r>
+              <a:rPr lang="en-US" dirty="0" err="1"/>
+              <a:t>WebJob</a:t>
+            </a:r>
+            <a:r>
+              <a:rPr lang="en-US" dirty="0"/>
+              <a:t> Details page.</a:t>
+            </a:r>
+          </a:p>
+          <a:p>
+            <a:pPr marL="571500" indent="-571500">
+              <a:buFont typeface="Arial" panose="020B0604020202020204" pitchFamily="34" charset="0"/>
+              <a:buChar char="•"/>
+            </a:pPr>
+            <a:r>
+              <a:rPr lang="en-US" dirty="0"/>
+              <a:t>Click the last job run.</a:t>
+            </a:r>
+          </a:p>
+          <a:p>
+            <a:r>
+              <a:rPr lang="en-US" dirty="0"/>
+              <a:t>     </a:t>
+            </a:r>
+            <a:r>
+              <a:rPr lang="en-US" sz="2800" dirty="0"/>
+              <a:t>Note: sometimes, you should wait and click the upcoming one.</a:t>
+            </a:r>
+            <a:endParaRPr lang="en-US" dirty="0"/>
+          </a:p>
+        </p:txBody>
+      </p:sp>
+      <p:pic>
+        <p:nvPicPr>
+          <p:cNvPr id="8" name="Picture 7">
+            <a:extLst>
+              <a:ext uri="{FF2B5EF4-FFF2-40B4-BE49-F238E27FC236}">
+                <a16:creationId xmlns:a16="http://schemas.microsoft.com/office/drawing/2014/main" id="{81FDD3B3-2713-4311-BA07-7B4FC935B8EB}"/>
+              </a:ext>
+            </a:extLst>
+          </p:cNvPr>
+          <p:cNvPicPr>
+            <a:picLocks noChangeAspect="1"/>
+          </p:cNvPicPr>
+          <p:nvPr/>
+        </p:nvPicPr>
+        <p:blipFill>
+          <a:blip r:embed="rId2"/>
+          <a:stretch>
+            <a:fillRect/>
+          </a:stretch>
+        </p:blipFill>
+        <p:spPr>
+          <a:xfrm>
+            <a:off x="699189" y="1688474"/>
+            <a:ext cx="11038095" cy="2704762"/>
+          </a:xfrm>
+          <a:prstGeom prst="rect">
+            <a:avLst/>
+          </a:prstGeom>
+        </p:spPr>
+      </p:pic>
+    </p:spTree>
+    <p:extLst>
+      <p:ext uri="{BB962C8B-B14F-4D97-AF65-F5344CB8AC3E}">
+        <p14:creationId xmlns:p14="http://schemas.microsoft.com/office/powerpoint/2010/main" val="2347586515"/>
+      </p:ext>
+    </p:extLst>
+  </p:cSld>
+  <p:clrMapOvr>
+    <a:masterClrMapping/>
+  </p:clrMapOvr>
+  <p:transition>
+    <p:fade/>
+  </p:transition>
+</p:sld>
+</file>
+
+<file path=ppt/slides/slide51.xml><?xml version="1.0" encoding="utf-8"?>
+<p:sld xmlns:a="http://schemas.openxmlformats.org/drawingml/2006/main" xmlns:r="http://schemas.openxmlformats.org/officeDocument/2006/relationships" xmlns:p="http://schemas.openxmlformats.org/presentationml/2006/main">
+  <p:cSld>
+    <p:spTree>
+      <p:nvGrpSpPr>
+        <p:cNvPr id="1" name=""/>
+        <p:cNvGrpSpPr/>
+        <p:nvPr/>
+      </p:nvGrpSpPr>
+      <p:grpSpPr>
+        <a:xfrm>
+          <a:off x="0" y="0"/>
+          <a:ext cx="0" cy="0"/>
+          <a:chOff x="0" y="0"/>
+          <a:chExt cx="0" cy="0"/>
+        </a:xfrm>
+      </p:grpSpPr>
+      <p:sp>
+        <p:nvSpPr>
+          <p:cNvPr id="4" name="Title 3">
+            <a:extLst>
+              <a:ext uri="{FF2B5EF4-FFF2-40B4-BE49-F238E27FC236}">
+                <a16:creationId xmlns:a16="http://schemas.microsoft.com/office/drawing/2014/main" id="{C8259DB8-4F16-44C3-8845-6ADE36C40D9A}"/>
+              </a:ext>
+            </a:extLst>
+          </p:cNvPr>
+          <p:cNvSpPr>
+            <a:spLocks noGrp="1"/>
+          </p:cNvSpPr>
+          <p:nvPr>
+            <p:ph type="title"/>
+          </p:nvPr>
+        </p:nvSpPr>
+        <p:spPr/>
+        <p:txBody>
+          <a:bodyPr/>
+          <a:lstStyle/>
+          <a:p>
+            <a:r>
+              <a:rPr lang="en-US" dirty="0"/>
+              <a:t>Sync Data </a:t>
+            </a:r>
+            <a:r>
+              <a:rPr lang="en-US" dirty="0" err="1"/>
+              <a:t>WebJob</a:t>
+            </a:r>
+            <a:r>
+              <a:rPr lang="en-US" dirty="0"/>
+              <a:t> - Log</a:t>
+            </a:r>
+          </a:p>
+        </p:txBody>
+      </p:sp>
+      <p:pic>
+        <p:nvPicPr>
+          <p:cNvPr id="5" name="Picture 4">
+            <a:extLst>
+              <a:ext uri="{FF2B5EF4-FFF2-40B4-BE49-F238E27FC236}">
+                <a16:creationId xmlns:a16="http://schemas.microsoft.com/office/drawing/2014/main" id="{AA1D7D59-7071-4C28-B6E6-832EE3C1A12F}"/>
+              </a:ext>
+            </a:extLst>
+          </p:cNvPr>
+          <p:cNvPicPr>
+            <a:picLocks noChangeAspect="1"/>
+          </p:cNvPicPr>
+          <p:nvPr/>
+        </p:nvPicPr>
+        <p:blipFill>
+          <a:blip r:embed="rId2"/>
+          <a:stretch>
+            <a:fillRect/>
+          </a:stretch>
+        </p:blipFill>
+        <p:spPr>
+          <a:xfrm>
+            <a:off x="699189" y="1973262"/>
+            <a:ext cx="11038095" cy="3885714"/>
+          </a:xfrm>
+          <a:prstGeom prst="rect">
+            <a:avLst/>
+          </a:prstGeom>
+        </p:spPr>
+      </p:pic>
+    </p:spTree>
+    <p:extLst>
+      <p:ext uri="{BB962C8B-B14F-4D97-AF65-F5344CB8AC3E}">
+        <p14:creationId xmlns:p14="http://schemas.microsoft.com/office/powerpoint/2010/main" val="2904911014"/>
+      </p:ext>
+    </p:extLst>
+  </p:cSld>
+  <p:clrMapOvr>
+    <a:masterClrMapping/>
+  </p:clrMapOvr>
+  <p:transition>
+    <p:fade/>
+  </p:transition>
 </p:sld>
 </file>
 
@@ -31879,6 +33018,21 @@
 </file>
 
 <file path=customXml/item1.xml><?xml version="1.0" encoding="utf-8"?>
+<?mso-contentType ?>
+<FormTemplates xmlns="http://schemas.microsoft.com/sharepoint/v3/contenttype/forms">
+  <Display>DocumentLibraryForm</Display>
+  <Edit>DocumentLibraryForm</Edit>
+  <New>DocumentLibraryForm</New>
+</FormTemplates>
+</file>
+
+<file path=customXml/item2.xml><?xml version="1.0" encoding="utf-8"?>
+<p:properties xmlns:p="http://schemas.microsoft.com/office/2006/metadata/properties" xmlns:xsi="http://www.w3.org/2001/XMLSchema-instance" xmlns:pc="http://schemas.microsoft.com/office/infopath/2007/PartnerControls">
+  <documentManagement/>
+</p:properties>
+</file>
+
+<file path=customXml/item3.xml><?xml version="1.0" encoding="utf-8"?>
 <ct:contentTypeSchema xmlns:ct="http://schemas.microsoft.com/office/2006/metadata/contentType" xmlns:ma="http://schemas.microsoft.com/office/2006/metadata/properties/metaAttributes" ct:_="" ma:_="" ma:contentTypeName="Document" ma:contentTypeID="0x01010053433B08FA9EE742BB667ECEF5AA0226" ma:contentTypeVersion="4" ma:contentTypeDescription="Create a new document." ma:contentTypeScope="" ma:versionID="898350153c3cb7409c9d00c11df4aa1a">
   <xsd:schema xmlns:xsd="http://www.w3.org/2001/XMLSchema" xmlns:xs="http://www.w3.org/2001/XMLSchema" xmlns:p="http://schemas.microsoft.com/office/2006/metadata/properties" xmlns:ns2="09eba053-c572-4474-974d-b0bef0e9174f" targetNamespace="http://schemas.microsoft.com/office/2006/metadata/properties" ma:root="true" ma:fieldsID="f69afda497831ad76ed280df00c0bf48" ns2:_="">
     <xsd:import namespace="09eba053-c572-4474-974d-b0bef0e9174f"/>
@@ -32040,22 +33194,31 @@
 </ct:contentTypeSchema>
 </file>
 
-<file path=customXml/item2.xml><?xml version="1.0" encoding="utf-8"?>
-<?mso-contentType ?>
-<FormTemplates xmlns="http://schemas.microsoft.com/sharepoint/v3/contenttype/forms">
-  <Display>DocumentLibraryForm</Display>
-  <Edit>DocumentLibraryForm</Edit>
-  <New>DocumentLibraryForm</New>
-</FormTemplates>
+<file path=customXml/itemProps1.xml><?xml version="1.0" encoding="utf-8"?>
+<ds:datastoreItem xmlns:ds="http://schemas.openxmlformats.org/officeDocument/2006/customXml" ds:itemID="{41543473-98BF-41A8-AEE8-AF1C274C4DD8}">
+  <ds:schemaRefs>
+    <ds:schemaRef ds:uri="http://schemas.microsoft.com/sharepoint/v3/contenttype/forms"/>
+  </ds:schemaRefs>
+</ds:datastoreItem>
 </file>
 
-<file path=customXml/item3.xml><?xml version="1.0" encoding="utf-8"?>
-<p:properties xmlns:p="http://schemas.microsoft.com/office/2006/metadata/properties" xmlns:xsi="http://www.w3.org/2001/XMLSchema-instance" xmlns:pc="http://schemas.microsoft.com/office/infopath/2007/PartnerControls">
-  <documentManagement/>
-</p:properties>
+<file path=customXml/itemProps2.xml><?xml version="1.0" encoding="utf-8"?>
+<ds:datastoreItem xmlns:ds="http://schemas.openxmlformats.org/officeDocument/2006/customXml" ds:itemID="{479EF7F2-79F0-4950-9137-4016BE64CE46}">
+  <ds:schemaRefs>
+    <ds:schemaRef ds:uri="http://purl.org/dc/elements/1.1/"/>
+    <ds:schemaRef ds:uri="http://schemas.microsoft.com/office/2006/metadata/properties"/>
+    <ds:schemaRef ds:uri="09eba053-c572-4474-974d-b0bef0e9174f"/>
+    <ds:schemaRef ds:uri="http://schemas.microsoft.com/office/2006/documentManagement/types"/>
+    <ds:schemaRef ds:uri="http://purl.org/dc/terms/"/>
+    <ds:schemaRef ds:uri="http://schemas.openxmlformats.org/package/2006/metadata/core-properties"/>
+    <ds:schemaRef ds:uri="http://purl.org/dc/dcmitype/"/>
+    <ds:schemaRef ds:uri="http://schemas.microsoft.com/office/infopath/2007/PartnerControls"/>
+    <ds:schemaRef ds:uri="http://www.w3.org/XML/1998/namespace"/>
+  </ds:schemaRefs>
+</ds:datastoreItem>
 </file>
 
-<file path=customXml/itemProps1.xml><?xml version="1.0" encoding="utf-8"?>
+<file path=customXml/itemProps3.xml><?xml version="1.0" encoding="utf-8"?>
 <ds:datastoreItem xmlns:ds="http://schemas.openxmlformats.org/officeDocument/2006/customXml" ds:itemID="{55F7FE33-E5CA-47B4-B8F6-126891A96CF6}">
   <ds:schemaRefs>
     <ds:schemaRef ds:uri="http://schemas.microsoft.com/office/2006/metadata/contentType"/>
@@ -32071,28 +33234,4 @@
     <ds:schemaRef ds:uri="http://schemas.microsoft.com/internal/obd"/>
   </ds:schemaRefs>
 </ds:datastoreItem>
-</file>
-
-<file path=customXml/itemProps2.xml><?xml version="1.0" encoding="utf-8"?>
-<ds:datastoreItem xmlns:ds="http://schemas.openxmlformats.org/officeDocument/2006/customXml" ds:itemID="{41543473-98BF-41A8-AEE8-AF1C274C4DD8}">
-  <ds:schemaRefs>
-    <ds:schemaRef ds:uri="http://schemas.microsoft.com/sharepoint/v3/contenttype/forms"/>
-  </ds:schemaRefs>
-</ds:datastoreItem>
-</file>
-
-<file path=customXml/itemProps3.xml><?xml version="1.0" encoding="utf-8"?>
-<ds:datastoreItem xmlns:ds="http://schemas.openxmlformats.org/officeDocument/2006/customXml" ds:itemID="{479EF7F2-79F0-4950-9137-4016BE64CE46}">
-  <ds:schemaRefs>
-    <ds:schemaRef ds:uri="http://purl.org/dc/elements/1.1/"/>
-    <ds:schemaRef ds:uri="http://schemas.microsoft.com/office/2006/metadata/properties"/>
-    <ds:schemaRef ds:uri="09eba053-c572-4474-974d-b0bef0e9174f"/>
-    <ds:schemaRef ds:uri="http://schemas.microsoft.com/office/2006/documentManagement/types"/>
-    <ds:schemaRef ds:uri="http://purl.org/dc/terms/"/>
-    <ds:schemaRef ds:uri="http://schemas.openxmlformats.org/package/2006/metadata/core-properties"/>
-    <ds:schemaRef ds:uri="http://purl.org/dc/dcmitype/"/>
-    <ds:schemaRef ds:uri="http://schemas.microsoft.com/office/infopath/2007/PartnerControls"/>
-    <ds:schemaRef ds:uri="http://www.w3.org/XML/1998/namespace"/>
-  </ds:schemaRefs>
-</ds:datastoreItem>
 </file>
</xml_diff>